<commit_message>
Updated power block diagram
</commit_message>
<xml_diff>
--- a/Power (PWR)/Rascal PWR Block Diagram.pptx
+++ b/Power (PWR)/Rascal PWR Block Diagram.pptx
@@ -288,7 +288,8 @@
           <a:p>
             <a:fld id="{B37282C9-ACB7-4ED3-9F9E-A830402F701A}" type="datetimeFigureOut">
               <a:rPr lang="en-US" smtClean="0"/>
-              <a:t>4/24/2014</a:t>
+              <a:pPr/>
+              <a:t>4/27/2014</a:t>
             </a:fld>
             <a:endParaRPr lang="en-US"/>
           </a:p>
@@ -330,6 +331,7 @@
           <a:p>
             <a:fld id="{B5CA94ED-83C9-4BF0-B9EB-07DEEF1E202C}" type="slidenum">
               <a:rPr lang="en-US" smtClean="0"/>
+              <a:pPr/>
               <a:t>‹#›</a:t>
             </a:fld>
             <a:endParaRPr lang="en-US"/>
@@ -339,7 +341,7 @@
     </p:spTree>
     <p:extLst>
       <p:ext uri="{BB962C8B-B14F-4D97-AF65-F5344CB8AC3E}">
-        <p14:creationId xmlns:p14="http://schemas.microsoft.com/office/powerpoint/2010/main" val="3132499268"/>
+        <p14:creationId xmlns:p14="http://schemas.microsoft.com/office/powerpoint/2010/main" xmlns="" val="3132499268"/>
       </p:ext>
     </p:extLst>
   </p:cSld>
@@ -458,7 +460,8 @@
           <a:p>
             <a:fld id="{B37282C9-ACB7-4ED3-9F9E-A830402F701A}" type="datetimeFigureOut">
               <a:rPr lang="en-US" smtClean="0"/>
-              <a:t>4/24/2014</a:t>
+              <a:pPr/>
+              <a:t>4/27/2014</a:t>
             </a:fld>
             <a:endParaRPr lang="en-US"/>
           </a:p>
@@ -500,6 +503,7 @@
           <a:p>
             <a:fld id="{B5CA94ED-83C9-4BF0-B9EB-07DEEF1E202C}" type="slidenum">
               <a:rPr lang="en-US" smtClean="0"/>
+              <a:pPr/>
               <a:t>‹#›</a:t>
             </a:fld>
             <a:endParaRPr lang="en-US"/>
@@ -509,7 +513,7 @@
     </p:spTree>
     <p:extLst>
       <p:ext uri="{BB962C8B-B14F-4D97-AF65-F5344CB8AC3E}">
-        <p14:creationId xmlns:p14="http://schemas.microsoft.com/office/powerpoint/2010/main" val="234990191"/>
+        <p14:creationId xmlns:p14="http://schemas.microsoft.com/office/powerpoint/2010/main" xmlns="" val="234990191"/>
       </p:ext>
     </p:extLst>
   </p:cSld>
@@ -638,7 +642,8 @@
           <a:p>
             <a:fld id="{B37282C9-ACB7-4ED3-9F9E-A830402F701A}" type="datetimeFigureOut">
               <a:rPr lang="en-US" smtClean="0"/>
-              <a:t>4/24/2014</a:t>
+              <a:pPr/>
+              <a:t>4/27/2014</a:t>
             </a:fld>
             <a:endParaRPr lang="en-US"/>
           </a:p>
@@ -680,6 +685,7 @@
           <a:p>
             <a:fld id="{B5CA94ED-83C9-4BF0-B9EB-07DEEF1E202C}" type="slidenum">
               <a:rPr lang="en-US" smtClean="0"/>
+              <a:pPr/>
               <a:t>‹#›</a:t>
             </a:fld>
             <a:endParaRPr lang="en-US"/>
@@ -689,7 +695,7 @@
     </p:spTree>
     <p:extLst>
       <p:ext uri="{BB962C8B-B14F-4D97-AF65-F5344CB8AC3E}">
-        <p14:creationId xmlns:p14="http://schemas.microsoft.com/office/powerpoint/2010/main" val="962562945"/>
+        <p14:creationId xmlns:p14="http://schemas.microsoft.com/office/powerpoint/2010/main" xmlns="" val="962562945"/>
       </p:ext>
     </p:extLst>
   </p:cSld>
@@ -808,7 +814,8 @@
           <a:p>
             <a:fld id="{B37282C9-ACB7-4ED3-9F9E-A830402F701A}" type="datetimeFigureOut">
               <a:rPr lang="en-US" smtClean="0"/>
-              <a:t>4/24/2014</a:t>
+              <a:pPr/>
+              <a:t>4/27/2014</a:t>
             </a:fld>
             <a:endParaRPr lang="en-US"/>
           </a:p>
@@ -850,6 +857,7 @@
           <a:p>
             <a:fld id="{B5CA94ED-83C9-4BF0-B9EB-07DEEF1E202C}" type="slidenum">
               <a:rPr lang="en-US" smtClean="0"/>
+              <a:pPr/>
               <a:t>‹#›</a:t>
             </a:fld>
             <a:endParaRPr lang="en-US"/>
@@ -859,7 +867,7 @@
     </p:spTree>
     <p:extLst>
       <p:ext uri="{BB962C8B-B14F-4D97-AF65-F5344CB8AC3E}">
-        <p14:creationId xmlns:p14="http://schemas.microsoft.com/office/powerpoint/2010/main" val="1814049684"/>
+        <p14:creationId xmlns:p14="http://schemas.microsoft.com/office/powerpoint/2010/main" xmlns="" val="1814049684"/>
       </p:ext>
     </p:extLst>
   </p:cSld>
@@ -1054,7 +1062,8 @@
           <a:p>
             <a:fld id="{B37282C9-ACB7-4ED3-9F9E-A830402F701A}" type="datetimeFigureOut">
               <a:rPr lang="en-US" smtClean="0"/>
-              <a:t>4/24/2014</a:t>
+              <a:pPr/>
+              <a:t>4/27/2014</a:t>
             </a:fld>
             <a:endParaRPr lang="en-US"/>
           </a:p>
@@ -1096,6 +1105,7 @@
           <a:p>
             <a:fld id="{B5CA94ED-83C9-4BF0-B9EB-07DEEF1E202C}" type="slidenum">
               <a:rPr lang="en-US" smtClean="0"/>
+              <a:pPr/>
               <a:t>‹#›</a:t>
             </a:fld>
             <a:endParaRPr lang="en-US"/>
@@ -1105,7 +1115,7 @@
     </p:spTree>
     <p:extLst>
       <p:ext uri="{BB962C8B-B14F-4D97-AF65-F5344CB8AC3E}">
-        <p14:creationId xmlns:p14="http://schemas.microsoft.com/office/powerpoint/2010/main" val="1647174925"/>
+        <p14:creationId xmlns:p14="http://schemas.microsoft.com/office/powerpoint/2010/main" xmlns="" val="1647174925"/>
       </p:ext>
     </p:extLst>
   </p:cSld>
@@ -1342,7 +1352,8 @@
           <a:p>
             <a:fld id="{B37282C9-ACB7-4ED3-9F9E-A830402F701A}" type="datetimeFigureOut">
               <a:rPr lang="en-US" smtClean="0"/>
-              <a:t>4/24/2014</a:t>
+              <a:pPr/>
+              <a:t>4/27/2014</a:t>
             </a:fld>
             <a:endParaRPr lang="en-US"/>
           </a:p>
@@ -1384,6 +1395,7 @@
           <a:p>
             <a:fld id="{B5CA94ED-83C9-4BF0-B9EB-07DEEF1E202C}" type="slidenum">
               <a:rPr lang="en-US" smtClean="0"/>
+              <a:pPr/>
               <a:t>‹#›</a:t>
             </a:fld>
             <a:endParaRPr lang="en-US"/>
@@ -1393,7 +1405,7 @@
     </p:spTree>
     <p:extLst>
       <p:ext uri="{BB962C8B-B14F-4D97-AF65-F5344CB8AC3E}">
-        <p14:creationId xmlns:p14="http://schemas.microsoft.com/office/powerpoint/2010/main" val="1771441365"/>
+        <p14:creationId xmlns:p14="http://schemas.microsoft.com/office/powerpoint/2010/main" xmlns="" val="1771441365"/>
       </p:ext>
     </p:extLst>
   </p:cSld>
@@ -1764,7 +1776,8 @@
           <a:p>
             <a:fld id="{B37282C9-ACB7-4ED3-9F9E-A830402F701A}" type="datetimeFigureOut">
               <a:rPr lang="en-US" smtClean="0"/>
-              <a:t>4/24/2014</a:t>
+              <a:pPr/>
+              <a:t>4/27/2014</a:t>
             </a:fld>
             <a:endParaRPr lang="en-US"/>
           </a:p>
@@ -1806,6 +1819,7 @@
           <a:p>
             <a:fld id="{B5CA94ED-83C9-4BF0-B9EB-07DEEF1E202C}" type="slidenum">
               <a:rPr lang="en-US" smtClean="0"/>
+              <a:pPr/>
               <a:t>‹#›</a:t>
             </a:fld>
             <a:endParaRPr lang="en-US"/>
@@ -1815,7 +1829,7 @@
     </p:spTree>
     <p:extLst>
       <p:ext uri="{BB962C8B-B14F-4D97-AF65-F5344CB8AC3E}">
-        <p14:creationId xmlns:p14="http://schemas.microsoft.com/office/powerpoint/2010/main" val="3591719551"/>
+        <p14:creationId xmlns:p14="http://schemas.microsoft.com/office/powerpoint/2010/main" xmlns="" val="3591719551"/>
       </p:ext>
     </p:extLst>
   </p:cSld>
@@ -1882,7 +1896,8 @@
           <a:p>
             <a:fld id="{B37282C9-ACB7-4ED3-9F9E-A830402F701A}" type="datetimeFigureOut">
               <a:rPr lang="en-US" smtClean="0"/>
-              <a:t>4/24/2014</a:t>
+              <a:pPr/>
+              <a:t>4/27/2014</a:t>
             </a:fld>
             <a:endParaRPr lang="en-US"/>
           </a:p>
@@ -1924,6 +1939,7 @@
           <a:p>
             <a:fld id="{B5CA94ED-83C9-4BF0-B9EB-07DEEF1E202C}" type="slidenum">
               <a:rPr lang="en-US" smtClean="0"/>
+              <a:pPr/>
               <a:t>‹#›</a:t>
             </a:fld>
             <a:endParaRPr lang="en-US"/>
@@ -1933,7 +1949,7 @@
     </p:spTree>
     <p:extLst>
       <p:ext uri="{BB962C8B-B14F-4D97-AF65-F5344CB8AC3E}">
-        <p14:creationId xmlns:p14="http://schemas.microsoft.com/office/powerpoint/2010/main" val="1413189106"/>
+        <p14:creationId xmlns:p14="http://schemas.microsoft.com/office/powerpoint/2010/main" xmlns="" val="1413189106"/>
       </p:ext>
     </p:extLst>
   </p:cSld>
@@ -1977,7 +1993,8 @@
           <a:p>
             <a:fld id="{B37282C9-ACB7-4ED3-9F9E-A830402F701A}" type="datetimeFigureOut">
               <a:rPr lang="en-US" smtClean="0"/>
-              <a:t>4/24/2014</a:t>
+              <a:pPr/>
+              <a:t>4/27/2014</a:t>
             </a:fld>
             <a:endParaRPr lang="en-US"/>
           </a:p>
@@ -2019,6 +2036,7 @@
           <a:p>
             <a:fld id="{B5CA94ED-83C9-4BF0-B9EB-07DEEF1E202C}" type="slidenum">
               <a:rPr lang="en-US" smtClean="0"/>
+              <a:pPr/>
               <a:t>‹#›</a:t>
             </a:fld>
             <a:endParaRPr lang="en-US"/>
@@ -2028,7 +2046,7 @@
     </p:spTree>
     <p:extLst>
       <p:ext uri="{BB962C8B-B14F-4D97-AF65-F5344CB8AC3E}">
-        <p14:creationId xmlns:p14="http://schemas.microsoft.com/office/powerpoint/2010/main" val="550514011"/>
+        <p14:creationId xmlns:p14="http://schemas.microsoft.com/office/powerpoint/2010/main" xmlns="" val="550514011"/>
       </p:ext>
     </p:extLst>
   </p:cSld>
@@ -2254,7 +2272,8 @@
           <a:p>
             <a:fld id="{B37282C9-ACB7-4ED3-9F9E-A830402F701A}" type="datetimeFigureOut">
               <a:rPr lang="en-US" smtClean="0"/>
-              <a:t>4/24/2014</a:t>
+              <a:pPr/>
+              <a:t>4/27/2014</a:t>
             </a:fld>
             <a:endParaRPr lang="en-US"/>
           </a:p>
@@ -2296,6 +2315,7 @@
           <a:p>
             <a:fld id="{B5CA94ED-83C9-4BF0-B9EB-07DEEF1E202C}" type="slidenum">
               <a:rPr lang="en-US" smtClean="0"/>
+              <a:pPr/>
               <a:t>‹#›</a:t>
             </a:fld>
             <a:endParaRPr lang="en-US"/>
@@ -2305,7 +2325,7 @@
     </p:spTree>
     <p:extLst>
       <p:ext uri="{BB962C8B-B14F-4D97-AF65-F5344CB8AC3E}">
-        <p14:creationId xmlns:p14="http://schemas.microsoft.com/office/powerpoint/2010/main" val="670902114"/>
+        <p14:creationId xmlns:p14="http://schemas.microsoft.com/office/powerpoint/2010/main" xmlns="" val="670902114"/>
       </p:ext>
     </p:extLst>
   </p:cSld>
@@ -2507,7 +2527,8 @@
           <a:p>
             <a:fld id="{B37282C9-ACB7-4ED3-9F9E-A830402F701A}" type="datetimeFigureOut">
               <a:rPr lang="en-US" smtClean="0"/>
-              <a:t>4/24/2014</a:t>
+              <a:pPr/>
+              <a:t>4/27/2014</a:t>
             </a:fld>
             <a:endParaRPr lang="en-US"/>
           </a:p>
@@ -2549,6 +2570,7 @@
           <a:p>
             <a:fld id="{B5CA94ED-83C9-4BF0-B9EB-07DEEF1E202C}" type="slidenum">
               <a:rPr lang="en-US" smtClean="0"/>
+              <a:pPr/>
               <a:t>‹#›</a:t>
             </a:fld>
             <a:endParaRPr lang="en-US"/>
@@ -2558,7 +2580,7 @@
     </p:spTree>
     <p:extLst>
       <p:ext uri="{BB962C8B-B14F-4D97-AF65-F5344CB8AC3E}">
-        <p14:creationId xmlns:p14="http://schemas.microsoft.com/office/powerpoint/2010/main" val="555320746"/>
+        <p14:creationId xmlns:p14="http://schemas.microsoft.com/office/powerpoint/2010/main" xmlns="" val="555320746"/>
       </p:ext>
     </p:extLst>
   </p:cSld>
@@ -2720,7 +2742,8 @@
           <a:p>
             <a:fld id="{B37282C9-ACB7-4ED3-9F9E-A830402F701A}" type="datetimeFigureOut">
               <a:rPr lang="en-US" smtClean="0"/>
-              <a:t>4/24/2014</a:t>
+              <a:pPr/>
+              <a:t>4/27/2014</a:t>
             </a:fld>
             <a:endParaRPr lang="en-US"/>
           </a:p>
@@ -2798,6 +2821,7 @@
           <a:p>
             <a:fld id="{B5CA94ED-83C9-4BF0-B9EB-07DEEF1E202C}" type="slidenum">
               <a:rPr lang="en-US" smtClean="0"/>
+              <a:pPr/>
               <a:t>‹#›</a:t>
             </a:fld>
             <a:endParaRPr lang="en-US"/>
@@ -2807,7 +2831,7 @@
     </p:spTree>
     <p:extLst>
       <p:ext uri="{BB962C8B-B14F-4D97-AF65-F5344CB8AC3E}">
-        <p14:creationId xmlns:p14="http://schemas.microsoft.com/office/powerpoint/2010/main" val="90044204"/>
+        <p14:creationId xmlns:p14="http://schemas.microsoft.com/office/powerpoint/2010/main" xmlns="" val="90044204"/>
       </p:ext>
     </p:extLst>
   </p:cSld>
@@ -3373,7 +3397,7 @@
         </p:nvSpPr>
         <p:spPr>
           <a:xfrm>
-            <a:off x="861060" y="1447800"/>
+            <a:off x="861060" y="2514600"/>
             <a:ext cx="2110740" cy="457200"/>
           </a:xfrm>
           <a:prstGeom prst="rect">
@@ -3419,7 +3443,17 @@
                 <a:latin typeface="Times New Roman" panose="02020603050405020304" pitchFamily="18" charset="0"/>
                 <a:cs typeface="Times New Roman" panose="02020603050405020304" pitchFamily="18" charset="0"/>
               </a:rPr>
-              <a:t>6AA Series 1.5 Volt Lithium Batteries</a:t>
+              <a:t>9-C Parallel 3.5 </a:t>
+            </a:r>
+            <a:r>
+              <a:rPr lang="en-US" sz="1400" dirty="0" smtClean="0">
+                <a:solidFill>
+                  <a:schemeClr val="tx1"/>
+                </a:solidFill>
+                <a:latin typeface="Times New Roman" panose="02020603050405020304" pitchFamily="18" charset="0"/>
+                <a:cs typeface="Times New Roman" panose="02020603050405020304" pitchFamily="18" charset="0"/>
+              </a:rPr>
+              <a:t>Volt Lithium Batteries</a:t>
             </a:r>
             <a:endParaRPr lang="en-US" sz="1400" dirty="0">
               <a:solidFill>
@@ -3439,7 +3473,7 @@
         </p:nvSpPr>
         <p:spPr>
           <a:xfrm>
-            <a:off x="861060" y="1978819"/>
+            <a:off x="861060" y="3045619"/>
             <a:ext cx="2110740" cy="457200"/>
           </a:xfrm>
           <a:prstGeom prst="rect">
@@ -3485,7 +3519,17 @@
                 <a:latin typeface="Times New Roman" panose="02020603050405020304" pitchFamily="18" charset="0"/>
                 <a:cs typeface="Times New Roman" panose="02020603050405020304" pitchFamily="18" charset="0"/>
               </a:rPr>
-              <a:t>6AA Series 1.5 Volt Lithium Batteries</a:t>
+              <a:t>9-C Parallel 3.5 </a:t>
+            </a:r>
+            <a:r>
+              <a:rPr lang="en-US" sz="1400" dirty="0" smtClean="0">
+                <a:solidFill>
+                  <a:schemeClr val="tx1"/>
+                </a:solidFill>
+                <a:latin typeface="Times New Roman" panose="02020603050405020304" pitchFamily="18" charset="0"/>
+                <a:cs typeface="Times New Roman" panose="02020603050405020304" pitchFamily="18" charset="0"/>
+              </a:rPr>
+              <a:t>Volt Lithium Batteries</a:t>
             </a:r>
             <a:endParaRPr lang="en-US" sz="1400" dirty="0">
               <a:solidFill>
@@ -3505,7 +3549,7 @@
         </p:nvSpPr>
         <p:spPr>
           <a:xfrm>
-            <a:off x="861060" y="2514600"/>
+            <a:off x="861060" y="3581400"/>
             <a:ext cx="2110740" cy="457200"/>
           </a:xfrm>
           <a:prstGeom prst="rect">
@@ -3551,7 +3595,17 @@
                 <a:latin typeface="Times New Roman" panose="02020603050405020304" pitchFamily="18" charset="0"/>
                 <a:cs typeface="Times New Roman" panose="02020603050405020304" pitchFamily="18" charset="0"/>
               </a:rPr>
-              <a:t>6AA Series 1.5 Volt Lithium Batteries</a:t>
+              <a:t>9-C Parallel </a:t>
+            </a:r>
+            <a:r>
+              <a:rPr lang="en-US" sz="1400" dirty="0" smtClean="0">
+                <a:solidFill>
+                  <a:schemeClr val="tx1"/>
+                </a:solidFill>
+                <a:latin typeface="Times New Roman" panose="02020603050405020304" pitchFamily="18" charset="0"/>
+                <a:cs typeface="Times New Roman" panose="02020603050405020304" pitchFamily="18" charset="0"/>
+              </a:rPr>
+              <a:t>3.5 Volt Lithium Batteries</a:t>
             </a:r>
             <a:endParaRPr lang="en-US" sz="1400" dirty="0">
               <a:solidFill>
@@ -3563,402 +3617,6 @@
           </a:p>
         </p:txBody>
       </p:sp>
-      <p:sp>
-        <p:nvSpPr>
-          <p:cNvPr id="45" name="Rectangle 44"/>
-          <p:cNvSpPr/>
-          <p:nvPr/>
-        </p:nvSpPr>
-        <p:spPr>
-          <a:xfrm>
-            <a:off x="861060" y="3604737"/>
-            <a:ext cx="2110740" cy="457200"/>
-          </a:xfrm>
-          <a:prstGeom prst="rect">
-            <a:avLst/>
-          </a:prstGeom>
-          <a:solidFill>
-            <a:schemeClr val="accent6">
-              <a:lumMod val="75000"/>
-            </a:schemeClr>
-          </a:solidFill>
-          <a:ln w="28575">
-            <a:solidFill>
-              <a:schemeClr val="tx1"/>
-            </a:solidFill>
-          </a:ln>
-        </p:spPr>
-        <p:style>
-          <a:lnRef idx="2">
-            <a:schemeClr val="accent1">
-              <a:shade val="50000"/>
-            </a:schemeClr>
-          </a:lnRef>
-          <a:fillRef idx="1">
-            <a:schemeClr val="accent1"/>
-          </a:fillRef>
-          <a:effectRef idx="0">
-            <a:schemeClr val="accent1"/>
-          </a:effectRef>
-          <a:fontRef idx="minor">
-            <a:schemeClr val="lt1"/>
-          </a:fontRef>
-        </p:style>
-        <p:txBody>
-          <a:bodyPr rtlCol="0" anchor="ctr"/>
-          <a:lstStyle/>
-          <a:p>
-            <a:pPr algn="ctr"/>
-            <a:r>
-              <a:rPr lang="en-US" sz="1400" dirty="0" smtClean="0">
-                <a:solidFill>
-                  <a:schemeClr val="tx1"/>
-                </a:solidFill>
-                <a:latin typeface="Times New Roman" panose="02020603050405020304" pitchFamily="18" charset="0"/>
-                <a:cs typeface="Times New Roman" panose="02020603050405020304" pitchFamily="18" charset="0"/>
-              </a:rPr>
-              <a:t>6AA Parallel 1.5 Volt Lithium Batteries</a:t>
-            </a:r>
-            <a:endParaRPr lang="en-US" sz="1400" dirty="0">
-              <a:solidFill>
-                <a:schemeClr val="tx1"/>
-              </a:solidFill>
-              <a:latin typeface="Times New Roman" panose="02020603050405020304" pitchFamily="18" charset="0"/>
-              <a:cs typeface="Times New Roman" panose="02020603050405020304" pitchFamily="18" charset="0"/>
-            </a:endParaRPr>
-          </a:p>
-        </p:txBody>
-      </p:sp>
-      <p:sp>
-        <p:nvSpPr>
-          <p:cNvPr id="46" name="Rectangle 45"/>
-          <p:cNvSpPr/>
-          <p:nvPr/>
-        </p:nvSpPr>
-        <p:spPr>
-          <a:xfrm>
-            <a:off x="861060" y="4114800"/>
-            <a:ext cx="2110740" cy="457200"/>
-          </a:xfrm>
-          <a:prstGeom prst="rect">
-            <a:avLst/>
-          </a:prstGeom>
-          <a:solidFill>
-            <a:schemeClr val="accent6">
-              <a:lumMod val="75000"/>
-            </a:schemeClr>
-          </a:solidFill>
-          <a:ln w="28575">
-            <a:solidFill>
-              <a:schemeClr val="tx1"/>
-            </a:solidFill>
-          </a:ln>
-        </p:spPr>
-        <p:style>
-          <a:lnRef idx="2">
-            <a:schemeClr val="accent1">
-              <a:shade val="50000"/>
-            </a:schemeClr>
-          </a:lnRef>
-          <a:fillRef idx="1">
-            <a:schemeClr val="accent1"/>
-          </a:fillRef>
-          <a:effectRef idx="0">
-            <a:schemeClr val="accent1"/>
-          </a:effectRef>
-          <a:fontRef idx="minor">
-            <a:schemeClr val="lt1"/>
-          </a:fontRef>
-        </p:style>
-        <p:txBody>
-          <a:bodyPr rtlCol="0" anchor="ctr"/>
-          <a:lstStyle/>
-          <a:p>
-            <a:pPr algn="ctr"/>
-            <a:r>
-              <a:rPr lang="en-US" sz="1400" dirty="0" smtClean="0">
-                <a:solidFill>
-                  <a:schemeClr val="tx1"/>
-                </a:solidFill>
-                <a:latin typeface="Times New Roman" panose="02020603050405020304" pitchFamily="18" charset="0"/>
-                <a:cs typeface="Times New Roman" panose="02020603050405020304" pitchFamily="18" charset="0"/>
-              </a:rPr>
-              <a:t>6AA Parallel 1.5 Volt Lithium Batteries</a:t>
-            </a:r>
-            <a:endParaRPr lang="en-US" sz="1400" dirty="0">
-              <a:solidFill>
-                <a:schemeClr val="tx1"/>
-              </a:solidFill>
-              <a:latin typeface="Times New Roman" panose="02020603050405020304" pitchFamily="18" charset="0"/>
-              <a:cs typeface="Times New Roman" panose="02020603050405020304" pitchFamily="18" charset="0"/>
-            </a:endParaRPr>
-          </a:p>
-        </p:txBody>
-      </p:sp>
-      <p:sp>
-        <p:nvSpPr>
-          <p:cNvPr id="47" name="Rectangle 46"/>
-          <p:cNvSpPr/>
-          <p:nvPr/>
-        </p:nvSpPr>
-        <p:spPr>
-          <a:xfrm>
-            <a:off x="861060" y="4648200"/>
-            <a:ext cx="2110740" cy="457200"/>
-          </a:xfrm>
-          <a:prstGeom prst="rect">
-            <a:avLst/>
-          </a:prstGeom>
-          <a:solidFill>
-            <a:schemeClr val="accent6">
-              <a:lumMod val="75000"/>
-            </a:schemeClr>
-          </a:solidFill>
-          <a:ln w="28575">
-            <a:solidFill>
-              <a:schemeClr val="tx1"/>
-            </a:solidFill>
-          </a:ln>
-        </p:spPr>
-        <p:style>
-          <a:lnRef idx="2">
-            <a:schemeClr val="accent1">
-              <a:shade val="50000"/>
-            </a:schemeClr>
-          </a:lnRef>
-          <a:fillRef idx="1">
-            <a:schemeClr val="accent1"/>
-          </a:fillRef>
-          <a:effectRef idx="0">
-            <a:schemeClr val="accent1"/>
-          </a:effectRef>
-          <a:fontRef idx="minor">
-            <a:schemeClr val="lt1"/>
-          </a:fontRef>
-        </p:style>
-        <p:txBody>
-          <a:bodyPr rtlCol="0" anchor="ctr"/>
-          <a:lstStyle/>
-          <a:p>
-            <a:pPr algn="ctr"/>
-            <a:r>
-              <a:rPr lang="en-US" sz="1400" dirty="0" smtClean="0">
-                <a:solidFill>
-                  <a:schemeClr val="tx1"/>
-                </a:solidFill>
-                <a:latin typeface="Times New Roman" panose="02020603050405020304" pitchFamily="18" charset="0"/>
-                <a:cs typeface="Times New Roman" panose="02020603050405020304" pitchFamily="18" charset="0"/>
-              </a:rPr>
-              <a:t>6AA Parallel 1.5 Volt Lithium Batteries</a:t>
-            </a:r>
-            <a:endParaRPr lang="en-US" sz="1400" dirty="0">
-              <a:solidFill>
-                <a:schemeClr val="tx1"/>
-              </a:solidFill>
-              <a:latin typeface="Times New Roman" panose="02020603050405020304" pitchFamily="18" charset="0"/>
-              <a:cs typeface="Times New Roman" panose="02020603050405020304" pitchFamily="18" charset="0"/>
-            </a:endParaRPr>
-          </a:p>
-        </p:txBody>
-      </p:sp>
-      <p:sp>
-        <p:nvSpPr>
-          <p:cNvPr id="48" name="Rectangle 47"/>
-          <p:cNvSpPr/>
-          <p:nvPr/>
-        </p:nvSpPr>
-        <p:spPr>
-          <a:xfrm>
-            <a:off x="861060" y="3048000"/>
-            <a:ext cx="2110740" cy="457200"/>
-          </a:xfrm>
-          <a:prstGeom prst="rect">
-            <a:avLst/>
-          </a:prstGeom>
-          <a:solidFill>
-            <a:schemeClr val="accent6">
-              <a:lumMod val="75000"/>
-            </a:schemeClr>
-          </a:solidFill>
-          <a:ln w="28575">
-            <a:solidFill>
-              <a:schemeClr val="tx1"/>
-            </a:solidFill>
-          </a:ln>
-        </p:spPr>
-        <p:style>
-          <a:lnRef idx="2">
-            <a:schemeClr val="accent1">
-              <a:shade val="50000"/>
-            </a:schemeClr>
-          </a:lnRef>
-          <a:fillRef idx="1">
-            <a:schemeClr val="accent1"/>
-          </a:fillRef>
-          <a:effectRef idx="0">
-            <a:schemeClr val="accent1"/>
-          </a:effectRef>
-          <a:fontRef idx="minor">
-            <a:schemeClr val="lt1"/>
-          </a:fontRef>
-        </p:style>
-        <p:txBody>
-          <a:bodyPr rtlCol="0" anchor="ctr"/>
-          <a:lstStyle/>
-          <a:p>
-            <a:pPr algn="ctr"/>
-            <a:r>
-              <a:rPr lang="en-US" sz="1400" dirty="0" smtClean="0">
-                <a:solidFill>
-                  <a:schemeClr val="tx1"/>
-                </a:solidFill>
-                <a:latin typeface="Times New Roman" panose="02020603050405020304" pitchFamily="18" charset="0"/>
-                <a:cs typeface="Times New Roman" panose="02020603050405020304" pitchFamily="18" charset="0"/>
-              </a:rPr>
-              <a:t>6AA Parallel 1.5 Volt Lithium Batteries</a:t>
-            </a:r>
-            <a:endParaRPr lang="en-US" sz="1400" dirty="0">
-              <a:solidFill>
-                <a:schemeClr val="tx1"/>
-              </a:solidFill>
-              <a:latin typeface="Times New Roman" panose="02020603050405020304" pitchFamily="18" charset="0"/>
-              <a:cs typeface="Times New Roman" panose="02020603050405020304" pitchFamily="18" charset="0"/>
-            </a:endParaRPr>
-          </a:p>
-        </p:txBody>
-      </p:sp>
-      <p:sp>
-        <p:nvSpPr>
-          <p:cNvPr id="49" name="Rectangle 48"/>
-          <p:cNvSpPr/>
-          <p:nvPr/>
-        </p:nvSpPr>
-        <p:spPr>
-          <a:xfrm>
-            <a:off x="861060" y="5715000"/>
-            <a:ext cx="2110740" cy="457200"/>
-          </a:xfrm>
-          <a:prstGeom prst="rect">
-            <a:avLst/>
-          </a:prstGeom>
-          <a:solidFill>
-            <a:schemeClr val="accent6">
-              <a:lumMod val="75000"/>
-            </a:schemeClr>
-          </a:solidFill>
-          <a:ln w="28575">
-            <a:solidFill>
-              <a:schemeClr val="tx1"/>
-            </a:solidFill>
-          </a:ln>
-        </p:spPr>
-        <p:style>
-          <a:lnRef idx="2">
-            <a:schemeClr val="accent1">
-              <a:shade val="50000"/>
-            </a:schemeClr>
-          </a:lnRef>
-          <a:fillRef idx="1">
-            <a:schemeClr val="accent1"/>
-          </a:fillRef>
-          <a:effectRef idx="0">
-            <a:schemeClr val="accent1"/>
-          </a:effectRef>
-          <a:fontRef idx="minor">
-            <a:schemeClr val="lt1"/>
-          </a:fontRef>
-        </p:style>
-        <p:txBody>
-          <a:bodyPr rtlCol="0" anchor="ctr"/>
-          <a:lstStyle/>
-          <a:p>
-            <a:pPr algn="ctr"/>
-            <a:r>
-              <a:rPr lang="en-US" sz="1400" dirty="0" smtClean="0">
-                <a:solidFill>
-                  <a:schemeClr val="tx1"/>
-                </a:solidFill>
-                <a:latin typeface="Times New Roman" panose="02020603050405020304" pitchFamily="18" charset="0"/>
-                <a:cs typeface="Times New Roman" panose="02020603050405020304" pitchFamily="18" charset="0"/>
-              </a:rPr>
-              <a:t>6AA Parallel 1.5 Volt Lithium Batteries</a:t>
-            </a:r>
-            <a:endParaRPr lang="en-US" sz="1400" dirty="0">
-              <a:solidFill>
-                <a:schemeClr val="tx1"/>
-              </a:solidFill>
-              <a:latin typeface="Times New Roman" panose="02020603050405020304" pitchFamily="18" charset="0"/>
-              <a:cs typeface="Times New Roman" panose="02020603050405020304" pitchFamily="18" charset="0"/>
-            </a:endParaRPr>
-          </a:p>
-        </p:txBody>
-      </p:sp>
-      <p:sp>
-        <p:nvSpPr>
-          <p:cNvPr id="50" name="Rectangle 49"/>
-          <p:cNvSpPr/>
-          <p:nvPr/>
-        </p:nvSpPr>
-        <p:spPr>
-          <a:xfrm>
-            <a:off x="861060" y="5181600"/>
-            <a:ext cx="2110740" cy="457200"/>
-          </a:xfrm>
-          <a:prstGeom prst="rect">
-            <a:avLst/>
-          </a:prstGeom>
-          <a:solidFill>
-            <a:schemeClr val="accent6">
-              <a:lumMod val="75000"/>
-            </a:schemeClr>
-          </a:solidFill>
-          <a:ln w="28575">
-            <a:solidFill>
-              <a:schemeClr val="tx1"/>
-            </a:solidFill>
-          </a:ln>
-        </p:spPr>
-        <p:style>
-          <a:lnRef idx="2">
-            <a:schemeClr val="accent1">
-              <a:shade val="50000"/>
-            </a:schemeClr>
-          </a:lnRef>
-          <a:fillRef idx="1">
-            <a:schemeClr val="accent1"/>
-          </a:fillRef>
-          <a:effectRef idx="0">
-            <a:schemeClr val="accent1"/>
-          </a:effectRef>
-          <a:fontRef idx="minor">
-            <a:schemeClr val="lt1"/>
-          </a:fontRef>
-        </p:style>
-        <p:txBody>
-          <a:bodyPr rtlCol="0" anchor="ctr"/>
-          <a:lstStyle/>
-          <a:p>
-            <a:pPr algn="ctr"/>
-            <a:r>
-              <a:rPr lang="en-US" sz="1400" dirty="0" smtClean="0">
-                <a:solidFill>
-                  <a:schemeClr val="tx1"/>
-                </a:solidFill>
-                <a:latin typeface="Times New Roman" panose="02020603050405020304" pitchFamily="18" charset="0"/>
-                <a:cs typeface="Times New Roman" panose="02020603050405020304" pitchFamily="18" charset="0"/>
-              </a:rPr>
-              <a:t>6AA Parallel 1.5 Volt Lithium Batteries</a:t>
-            </a:r>
-            <a:endParaRPr lang="en-US" sz="1400" dirty="0">
-              <a:solidFill>
-                <a:schemeClr val="tx1"/>
-              </a:solidFill>
-              <a:latin typeface="Times New Roman" panose="02020603050405020304" pitchFamily="18" charset="0"/>
-              <a:cs typeface="Times New Roman" panose="02020603050405020304" pitchFamily="18" charset="0"/>
-            </a:endParaRPr>
-          </a:p>
-        </p:txBody>
-      </p:sp>
       <p:cxnSp>
         <p:nvCxnSpPr>
           <p:cNvPr id="51" name="Straight Connector 50"/>
@@ -3968,7 +3626,7 @@
         <p:spPr>
           <a:xfrm flipV="1">
             <a:off x="685800" y="1283732"/>
-            <a:ext cx="0" cy="4659868"/>
+            <a:ext cx="0" cy="2526268"/>
           </a:xfrm>
           <a:prstGeom prst="line">
             <a:avLst/>
@@ -4004,7 +3662,7 @@
         </p:nvCxnSpPr>
         <p:spPr>
           <a:xfrm>
-            <a:off x="685800" y="1676400"/>
+            <a:off x="685800" y="2743200"/>
             <a:ext cx="175260" cy="0"/>
           </a:xfrm>
           <a:prstGeom prst="line">
@@ -4041,7 +3699,7 @@
         </p:nvCxnSpPr>
         <p:spPr>
           <a:xfrm>
-            <a:off x="662940" y="2207419"/>
+            <a:off x="662940" y="3274219"/>
             <a:ext cx="198120" cy="0"/>
           </a:xfrm>
           <a:prstGeom prst="line">
@@ -4078,225 +3736,7 @@
         </p:nvCxnSpPr>
         <p:spPr>
           <a:xfrm>
-            <a:off x="662940" y="2743200"/>
-            <a:ext cx="198120" cy="0"/>
-          </a:xfrm>
-          <a:prstGeom prst="line">
-            <a:avLst/>
-          </a:prstGeom>
-          <a:ln w="57150">
-            <a:solidFill>
-              <a:srgbClr val="FF0000"/>
-            </a:solidFill>
-          </a:ln>
-        </p:spPr>
-        <p:style>
-          <a:lnRef idx="1">
-            <a:schemeClr val="accent1"/>
-          </a:lnRef>
-          <a:fillRef idx="0">
-            <a:schemeClr val="accent1"/>
-          </a:fillRef>
-          <a:effectRef idx="0">
-            <a:schemeClr val="accent1"/>
-          </a:effectRef>
-          <a:fontRef idx="minor">
-            <a:schemeClr val="tx1"/>
-          </a:fontRef>
-        </p:style>
-      </p:cxnSp>
-      <p:cxnSp>
-        <p:nvCxnSpPr>
-          <p:cNvPr id="69" name="Straight Connector 68"/>
-          <p:cNvCxnSpPr/>
-          <p:nvPr/>
-        </p:nvCxnSpPr>
-        <p:spPr>
-          <a:xfrm>
-            <a:off x="674370" y="3276600"/>
-            <a:ext cx="186690" cy="0"/>
-          </a:xfrm>
-          <a:prstGeom prst="line">
-            <a:avLst/>
-          </a:prstGeom>
-          <a:ln w="57150">
-            <a:solidFill>
-              <a:srgbClr val="FF0000"/>
-            </a:solidFill>
-          </a:ln>
-        </p:spPr>
-        <p:style>
-          <a:lnRef idx="1">
-            <a:schemeClr val="accent1"/>
-          </a:lnRef>
-          <a:fillRef idx="0">
-            <a:schemeClr val="accent1"/>
-          </a:fillRef>
-          <a:effectRef idx="0">
-            <a:schemeClr val="accent1"/>
-          </a:effectRef>
-          <a:fontRef idx="minor">
-            <a:schemeClr val="tx1"/>
-          </a:fontRef>
-        </p:style>
-      </p:cxnSp>
-      <p:cxnSp>
-        <p:nvCxnSpPr>
-          <p:cNvPr id="71" name="Straight Connector 70"/>
-          <p:cNvCxnSpPr>
-            <a:endCxn id="45" idx="1"/>
-          </p:cNvCxnSpPr>
-          <p:nvPr/>
-        </p:nvCxnSpPr>
-        <p:spPr>
-          <a:xfrm>
-            <a:off x="685800" y="3833337"/>
-            <a:ext cx="175260" cy="0"/>
-          </a:xfrm>
-          <a:prstGeom prst="line">
-            <a:avLst/>
-          </a:prstGeom>
-          <a:ln w="57150">
-            <a:solidFill>
-              <a:srgbClr val="FF0000"/>
-            </a:solidFill>
-          </a:ln>
-        </p:spPr>
-        <p:style>
-          <a:lnRef idx="1">
-            <a:schemeClr val="accent1"/>
-          </a:lnRef>
-          <a:fillRef idx="0">
-            <a:schemeClr val="accent1"/>
-          </a:fillRef>
-          <a:effectRef idx="0">
-            <a:schemeClr val="accent1"/>
-          </a:effectRef>
-          <a:fontRef idx="minor">
-            <a:schemeClr val="tx1"/>
-          </a:fontRef>
-        </p:style>
-      </p:cxnSp>
-      <p:cxnSp>
-        <p:nvCxnSpPr>
-          <p:cNvPr id="73" name="Straight Connector 72"/>
-          <p:cNvCxnSpPr>
-            <a:endCxn id="46" idx="1"/>
-          </p:cNvCxnSpPr>
-          <p:nvPr/>
-        </p:nvCxnSpPr>
-        <p:spPr>
-          <a:xfrm>
-            <a:off x="685800" y="4343400"/>
-            <a:ext cx="175260" cy="0"/>
-          </a:xfrm>
-          <a:prstGeom prst="line">
-            <a:avLst/>
-          </a:prstGeom>
-          <a:ln w="57150">
-            <a:solidFill>
-              <a:srgbClr val="FF0000"/>
-            </a:solidFill>
-          </a:ln>
-        </p:spPr>
-        <p:style>
-          <a:lnRef idx="1">
-            <a:schemeClr val="accent1"/>
-          </a:lnRef>
-          <a:fillRef idx="0">
-            <a:schemeClr val="accent1"/>
-          </a:fillRef>
-          <a:effectRef idx="0">
-            <a:schemeClr val="accent1"/>
-          </a:effectRef>
-          <a:fontRef idx="minor">
-            <a:schemeClr val="tx1"/>
-          </a:fontRef>
-        </p:style>
-      </p:cxnSp>
-      <p:cxnSp>
-        <p:nvCxnSpPr>
-          <p:cNvPr id="75" name="Straight Connector 74"/>
-          <p:cNvCxnSpPr>
-            <a:endCxn id="47" idx="1"/>
-          </p:cNvCxnSpPr>
-          <p:nvPr/>
-        </p:nvCxnSpPr>
-        <p:spPr>
-          <a:xfrm>
-            <a:off x="662940" y="4876800"/>
-            <a:ext cx="198120" cy="0"/>
-          </a:xfrm>
-          <a:prstGeom prst="line">
-            <a:avLst/>
-          </a:prstGeom>
-          <a:ln w="57150">
-            <a:solidFill>
-              <a:srgbClr val="FF0000"/>
-            </a:solidFill>
-          </a:ln>
-        </p:spPr>
-        <p:style>
-          <a:lnRef idx="1">
-            <a:schemeClr val="accent1"/>
-          </a:lnRef>
-          <a:fillRef idx="0">
-            <a:schemeClr val="accent1"/>
-          </a:fillRef>
-          <a:effectRef idx="0">
-            <a:schemeClr val="accent1"/>
-          </a:effectRef>
-          <a:fontRef idx="minor">
-            <a:schemeClr val="tx1"/>
-          </a:fontRef>
-        </p:style>
-      </p:cxnSp>
-      <p:cxnSp>
-        <p:nvCxnSpPr>
-          <p:cNvPr id="77" name="Straight Connector 76"/>
-          <p:cNvCxnSpPr>
-            <a:endCxn id="50" idx="1"/>
-          </p:cNvCxnSpPr>
-          <p:nvPr/>
-        </p:nvCxnSpPr>
-        <p:spPr>
-          <a:xfrm>
-            <a:off x="662940" y="5410200"/>
-            <a:ext cx="198120" cy="0"/>
-          </a:xfrm>
-          <a:prstGeom prst="line">
-            <a:avLst/>
-          </a:prstGeom>
-          <a:ln w="57150">
-            <a:solidFill>
-              <a:srgbClr val="FF0000"/>
-            </a:solidFill>
-          </a:ln>
-        </p:spPr>
-        <p:style>
-          <a:lnRef idx="1">
-            <a:schemeClr val="accent1"/>
-          </a:lnRef>
-          <a:fillRef idx="0">
-            <a:schemeClr val="accent1"/>
-          </a:fillRef>
-          <a:effectRef idx="0">
-            <a:schemeClr val="accent1"/>
-          </a:effectRef>
-          <a:fontRef idx="minor">
-            <a:schemeClr val="tx1"/>
-          </a:fontRef>
-        </p:style>
-      </p:cxnSp>
-      <p:cxnSp>
-        <p:nvCxnSpPr>
-          <p:cNvPr id="79" name="Straight Connector 78"/>
-          <p:cNvCxnSpPr/>
-          <p:nvPr/>
-        </p:nvCxnSpPr>
-        <p:spPr>
-          <a:xfrm>
-            <a:off x="662940" y="5943600"/>
+            <a:off x="662940" y="3810000"/>
             <a:ext cx="198120" cy="0"/>
           </a:xfrm>
           <a:prstGeom prst="line">
@@ -4331,8 +3771,8 @@
         </p:nvCxnSpPr>
         <p:spPr>
           <a:xfrm flipV="1">
-            <a:off x="3116580" y="1655064"/>
-            <a:ext cx="0" cy="4309872"/>
+            <a:off x="3116580" y="2743200"/>
+            <a:ext cx="7620" cy="3221736"/>
           </a:xfrm>
           <a:prstGeom prst="line">
             <a:avLst/>
@@ -4368,7 +3808,7 @@
         </p:nvCxnSpPr>
         <p:spPr>
           <a:xfrm>
-            <a:off x="2971800" y="1676400"/>
+            <a:off x="2971800" y="2743200"/>
             <a:ext cx="173665" cy="0"/>
           </a:xfrm>
           <a:prstGeom prst="line">
@@ -4405,7 +3845,7 @@
         </p:nvCxnSpPr>
         <p:spPr>
           <a:xfrm>
-            <a:off x="2971800" y="2207419"/>
+            <a:off x="2971800" y="3274219"/>
             <a:ext cx="173665" cy="0"/>
           </a:xfrm>
           <a:prstGeom prst="line">
@@ -4442,156 +3882,8 @@
         </p:nvCxnSpPr>
         <p:spPr>
           <a:xfrm>
-            <a:off x="2971800" y="2743200"/>
+            <a:off x="2971800" y="3810000"/>
             <a:ext cx="173665" cy="0"/>
-          </a:xfrm>
-          <a:prstGeom prst="line">
-            <a:avLst/>
-          </a:prstGeom>
-          <a:ln w="57150">
-            <a:solidFill>
-              <a:schemeClr val="tx1"/>
-            </a:solidFill>
-          </a:ln>
-        </p:spPr>
-        <p:style>
-          <a:lnRef idx="1">
-            <a:schemeClr val="accent1"/>
-          </a:lnRef>
-          <a:fillRef idx="0">
-            <a:schemeClr val="accent1"/>
-          </a:fillRef>
-          <a:effectRef idx="0">
-            <a:schemeClr val="accent1"/>
-          </a:effectRef>
-          <a:fontRef idx="minor">
-            <a:schemeClr val="tx1"/>
-          </a:fontRef>
-        </p:style>
-      </p:cxnSp>
-      <p:cxnSp>
-        <p:nvCxnSpPr>
-          <p:cNvPr id="93" name="Straight Connector 92"/>
-          <p:cNvCxnSpPr>
-            <a:stCxn id="48" idx="3"/>
-          </p:cNvCxnSpPr>
-          <p:nvPr/>
-        </p:nvCxnSpPr>
-        <p:spPr>
-          <a:xfrm>
-            <a:off x="2971800" y="3276600"/>
-            <a:ext cx="173665" cy="0"/>
-          </a:xfrm>
-          <a:prstGeom prst="line">
-            <a:avLst/>
-          </a:prstGeom>
-          <a:ln w="57150">
-            <a:solidFill>
-              <a:schemeClr val="tx1"/>
-            </a:solidFill>
-          </a:ln>
-        </p:spPr>
-        <p:style>
-          <a:lnRef idx="1">
-            <a:schemeClr val="accent1"/>
-          </a:lnRef>
-          <a:fillRef idx="0">
-            <a:schemeClr val="accent1"/>
-          </a:fillRef>
-          <a:effectRef idx="0">
-            <a:schemeClr val="accent1"/>
-          </a:effectRef>
-          <a:fontRef idx="minor">
-            <a:schemeClr val="tx1"/>
-          </a:fontRef>
-        </p:style>
-      </p:cxnSp>
-      <p:cxnSp>
-        <p:nvCxnSpPr>
-          <p:cNvPr id="98" name="Straight Connector 97"/>
-          <p:cNvCxnSpPr>
-            <a:stCxn id="45" idx="3"/>
-          </p:cNvCxnSpPr>
-          <p:nvPr/>
-        </p:nvCxnSpPr>
-        <p:spPr>
-          <a:xfrm>
-            <a:off x="2971800" y="3833337"/>
-            <a:ext cx="152400" cy="0"/>
-          </a:xfrm>
-          <a:prstGeom prst="line">
-            <a:avLst/>
-          </a:prstGeom>
-          <a:ln w="57150">
-            <a:solidFill>
-              <a:schemeClr val="tx1"/>
-            </a:solidFill>
-          </a:ln>
-        </p:spPr>
-        <p:style>
-          <a:lnRef idx="1">
-            <a:schemeClr val="accent1"/>
-          </a:lnRef>
-          <a:fillRef idx="0">
-            <a:schemeClr val="accent1"/>
-          </a:fillRef>
-          <a:effectRef idx="0">
-            <a:schemeClr val="accent1"/>
-          </a:effectRef>
-          <a:fontRef idx="minor">
-            <a:schemeClr val="tx1"/>
-          </a:fontRef>
-        </p:style>
-      </p:cxnSp>
-      <p:cxnSp>
-        <p:nvCxnSpPr>
-          <p:cNvPr id="101" name="Straight Connector 100"/>
-          <p:cNvCxnSpPr>
-            <a:stCxn id="46" idx="3"/>
-          </p:cNvCxnSpPr>
-          <p:nvPr/>
-        </p:nvCxnSpPr>
-        <p:spPr>
-          <a:xfrm>
-            <a:off x="2971800" y="4343400"/>
-            <a:ext cx="144780" cy="0"/>
-          </a:xfrm>
-          <a:prstGeom prst="line">
-            <a:avLst/>
-          </a:prstGeom>
-          <a:ln w="57150">
-            <a:solidFill>
-              <a:schemeClr val="tx1"/>
-            </a:solidFill>
-          </a:ln>
-        </p:spPr>
-        <p:style>
-          <a:lnRef idx="1">
-            <a:schemeClr val="accent1"/>
-          </a:lnRef>
-          <a:fillRef idx="0">
-            <a:schemeClr val="accent1"/>
-          </a:fillRef>
-          <a:effectRef idx="0">
-            <a:schemeClr val="accent1"/>
-          </a:effectRef>
-          <a:fontRef idx="minor">
-            <a:schemeClr val="tx1"/>
-          </a:fontRef>
-        </p:style>
-      </p:cxnSp>
-      <p:cxnSp>
-        <p:nvCxnSpPr>
-          <p:cNvPr id="103" name="Straight Connector 102"/>
-          <p:cNvCxnSpPr>
-            <a:stCxn id="47" idx="3"/>
-          </p:cNvCxnSpPr>
-          <p:nvPr/>
-        </p:nvCxnSpPr>
-        <p:spPr>
-          <a:xfrm>
-            <a:off x="2971800" y="4876800"/>
-            <a:ext cx="152400" cy="0"/>
           </a:xfrm>
           <a:prstGeom prst="line">
             <a:avLst/>
@@ -4730,53 +4022,14 @@
       </p:grpSp>
       <p:cxnSp>
         <p:nvCxnSpPr>
-          <p:cNvPr id="105" name="Straight Connector 104"/>
-          <p:cNvCxnSpPr>
-            <a:stCxn id="50" idx="3"/>
-          </p:cNvCxnSpPr>
+          <p:cNvPr id="107" name="Straight Connector 106"/>
+          <p:cNvCxnSpPr/>
           <p:nvPr/>
         </p:nvCxnSpPr>
         <p:spPr>
-          <a:xfrm>
-            <a:off x="2971800" y="5410200"/>
-            <a:ext cx="173665" cy="0"/>
-          </a:xfrm>
-          <a:prstGeom prst="line">
-            <a:avLst/>
-          </a:prstGeom>
-          <a:ln w="57150">
-            <a:solidFill>
-              <a:schemeClr val="tx1"/>
-            </a:solidFill>
-          </a:ln>
-        </p:spPr>
-        <p:style>
-          <a:lnRef idx="1">
-            <a:schemeClr val="accent1"/>
-          </a:lnRef>
-          <a:fillRef idx="0">
-            <a:schemeClr val="accent1"/>
-          </a:fillRef>
-          <a:effectRef idx="0">
-            <a:schemeClr val="accent1"/>
-          </a:effectRef>
-          <a:fontRef idx="minor">
-            <a:schemeClr val="tx1"/>
-          </a:fontRef>
-        </p:style>
-      </p:cxnSp>
-      <p:cxnSp>
-        <p:nvCxnSpPr>
-          <p:cNvPr id="107" name="Straight Connector 106"/>
-          <p:cNvCxnSpPr>
-            <a:stCxn id="49" idx="3"/>
-          </p:cNvCxnSpPr>
-          <p:nvPr/>
-        </p:nvCxnSpPr>
-        <p:spPr>
           <a:xfrm flipV="1">
-            <a:off x="2971800" y="5940641"/>
-            <a:ext cx="4716780" cy="2959"/>
+            <a:off x="3124200" y="5940642"/>
+            <a:ext cx="4564380" cy="2958"/>
           </a:xfrm>
           <a:prstGeom prst="line">
             <a:avLst/>
@@ -5179,9 +4432,9 @@
           <p:nvPr/>
         </p:nvCxnSpPr>
         <p:spPr>
-          <a:xfrm>
-            <a:off x="4106072" y="1298972"/>
-            <a:ext cx="3582511" cy="0"/>
+          <a:xfrm flipV="1">
+            <a:off x="4106072" y="1295400"/>
+            <a:ext cx="1532728" cy="3572"/>
           </a:xfrm>
           <a:prstGeom prst="line">
             <a:avLst/>
@@ -5308,14 +4561,65 @@
       </p:sp>
       <p:sp>
         <p:nvSpPr>
-          <p:cNvPr id="150" name="Rectangle 149"/>
+          <p:cNvPr id="152" name="Rectangle 151"/>
           <p:cNvSpPr/>
           <p:nvPr/>
         </p:nvSpPr>
         <p:spPr>
           <a:xfrm>
-            <a:off x="4569521" y="2356537"/>
-            <a:ext cx="1135767" cy="1759743"/>
+            <a:off x="7617297" y="5865920"/>
+            <a:ext cx="142565" cy="152400"/>
+          </a:xfrm>
+          <a:prstGeom prst="rect">
+            <a:avLst/>
+          </a:prstGeom>
+          <a:solidFill>
+            <a:schemeClr val="tx1">
+              <a:lumMod val="85000"/>
+              <a:lumOff val="15000"/>
+            </a:schemeClr>
+          </a:solidFill>
+          <a:ln>
+            <a:solidFill>
+              <a:schemeClr val="tx1"/>
+            </a:solidFill>
+          </a:ln>
+        </p:spPr>
+        <p:style>
+          <a:lnRef idx="2">
+            <a:schemeClr val="accent1">
+              <a:shade val="50000"/>
+            </a:schemeClr>
+          </a:lnRef>
+          <a:fillRef idx="1">
+            <a:schemeClr val="accent1"/>
+          </a:fillRef>
+          <a:effectRef idx="0">
+            <a:schemeClr val="accent1"/>
+          </a:effectRef>
+          <a:fontRef idx="minor">
+            <a:schemeClr val="lt1"/>
+          </a:fontRef>
+        </p:style>
+        <p:txBody>
+          <a:bodyPr rtlCol="0" anchor="ctr"/>
+          <a:lstStyle/>
+          <a:p>
+            <a:pPr algn="ctr"/>
+            <a:endParaRPr lang="en-US"/>
+          </a:p>
+        </p:txBody>
+      </p:sp>
+      <p:sp>
+        <p:nvSpPr>
+          <p:cNvPr id="153" name="Rectangle 152"/>
+          <p:cNvSpPr/>
+          <p:nvPr/>
+        </p:nvSpPr>
+        <p:spPr>
+          <a:xfrm>
+            <a:off x="5379886" y="2359819"/>
+            <a:ext cx="1173314" cy="1759743"/>
           </a:xfrm>
           <a:prstGeom prst="rect">
             <a:avLst/>
@@ -5358,7 +4662,7 @@
                 <a:latin typeface="Times New Roman" panose="02020603050405020304" pitchFamily="18" charset="0"/>
                 <a:cs typeface="Times New Roman" panose="02020603050405020304" pitchFamily="18" charset="0"/>
               </a:rPr>
-              <a:t>5.0 Volts</a:t>
+              <a:t>3.3 Volts</a:t>
             </a:r>
             <a:endParaRPr lang="en-US" dirty="0">
               <a:latin typeface="Times New Roman" panose="02020603050405020304" pitchFamily="18" charset="0"/>
@@ -5367,188 +4671,6 @@
           </a:p>
         </p:txBody>
       </p:sp>
-      <p:sp>
-        <p:nvSpPr>
-          <p:cNvPr id="152" name="Rectangle 151"/>
-          <p:cNvSpPr/>
-          <p:nvPr/>
-        </p:nvSpPr>
-        <p:spPr>
-          <a:xfrm>
-            <a:off x="7617297" y="5865920"/>
-            <a:ext cx="142565" cy="152400"/>
-          </a:xfrm>
-          <a:prstGeom prst="rect">
-            <a:avLst/>
-          </a:prstGeom>
-          <a:solidFill>
-            <a:schemeClr val="tx1">
-              <a:lumMod val="85000"/>
-              <a:lumOff val="15000"/>
-            </a:schemeClr>
-          </a:solidFill>
-          <a:ln>
-            <a:solidFill>
-              <a:schemeClr val="tx1"/>
-            </a:solidFill>
-          </a:ln>
-        </p:spPr>
-        <p:style>
-          <a:lnRef idx="2">
-            <a:schemeClr val="accent1">
-              <a:shade val="50000"/>
-            </a:schemeClr>
-          </a:lnRef>
-          <a:fillRef idx="1">
-            <a:schemeClr val="accent1"/>
-          </a:fillRef>
-          <a:effectRef idx="0">
-            <a:schemeClr val="accent1"/>
-          </a:effectRef>
-          <a:fontRef idx="minor">
-            <a:schemeClr val="lt1"/>
-          </a:fontRef>
-        </p:style>
-        <p:txBody>
-          <a:bodyPr rtlCol="0" anchor="ctr"/>
-          <a:lstStyle/>
-          <a:p>
-            <a:pPr algn="ctr"/>
-            <a:endParaRPr lang="en-US"/>
-          </a:p>
-        </p:txBody>
-      </p:sp>
-      <p:sp>
-        <p:nvSpPr>
-          <p:cNvPr id="153" name="Rectangle 152"/>
-          <p:cNvSpPr/>
-          <p:nvPr/>
-        </p:nvSpPr>
-        <p:spPr>
-          <a:xfrm>
-            <a:off x="5841968" y="2359819"/>
-            <a:ext cx="1173314" cy="1759743"/>
-          </a:xfrm>
-          <a:prstGeom prst="rect">
-            <a:avLst/>
-          </a:prstGeom>
-          <a:solidFill>
-            <a:schemeClr val="tx1">
-              <a:lumMod val="75000"/>
-              <a:lumOff val="25000"/>
-            </a:schemeClr>
-          </a:solidFill>
-          <a:ln>
-            <a:solidFill>
-              <a:schemeClr val="tx1"/>
-            </a:solidFill>
-          </a:ln>
-        </p:spPr>
-        <p:style>
-          <a:lnRef idx="2">
-            <a:schemeClr val="accent1">
-              <a:shade val="50000"/>
-            </a:schemeClr>
-          </a:lnRef>
-          <a:fillRef idx="1">
-            <a:schemeClr val="accent1"/>
-          </a:fillRef>
-          <a:effectRef idx="0">
-            <a:schemeClr val="accent1"/>
-          </a:effectRef>
-          <a:fontRef idx="minor">
-            <a:schemeClr val="lt1"/>
-          </a:fontRef>
-        </p:style>
-        <p:txBody>
-          <a:bodyPr rtlCol="0" anchor="ctr"/>
-          <a:lstStyle/>
-          <a:p>
-            <a:pPr algn="ctr"/>
-            <a:r>
-              <a:rPr lang="en-US" dirty="0" smtClean="0">
-                <a:latin typeface="Times New Roman" panose="02020603050405020304" pitchFamily="18" charset="0"/>
-                <a:cs typeface="Times New Roman" panose="02020603050405020304" pitchFamily="18" charset="0"/>
-              </a:rPr>
-              <a:t>3.3 Volts</a:t>
-            </a:r>
-            <a:endParaRPr lang="en-US" dirty="0">
-              <a:latin typeface="Times New Roman" panose="02020603050405020304" pitchFamily="18" charset="0"/>
-              <a:cs typeface="Times New Roman" panose="02020603050405020304" pitchFamily="18" charset="0"/>
-            </a:endParaRPr>
-          </a:p>
-        </p:txBody>
-      </p:sp>
-      <p:cxnSp>
-        <p:nvCxnSpPr>
-          <p:cNvPr id="154" name="Straight Connector 153"/>
-          <p:cNvCxnSpPr/>
-          <p:nvPr/>
-        </p:nvCxnSpPr>
-        <p:spPr>
-          <a:xfrm>
-            <a:off x="4800600" y="1283732"/>
-            <a:ext cx="0" cy="1071325"/>
-          </a:xfrm>
-          <a:prstGeom prst="line">
-            <a:avLst/>
-          </a:prstGeom>
-          <a:ln w="57150">
-            <a:solidFill>
-              <a:srgbClr val="FF0000"/>
-            </a:solidFill>
-          </a:ln>
-        </p:spPr>
-        <p:style>
-          <a:lnRef idx="1">
-            <a:schemeClr val="accent1"/>
-          </a:lnRef>
-          <a:fillRef idx="0">
-            <a:schemeClr val="accent1"/>
-          </a:fillRef>
-          <a:effectRef idx="0">
-            <a:schemeClr val="accent1"/>
-          </a:effectRef>
-          <a:fontRef idx="minor">
-            <a:schemeClr val="tx1"/>
-          </a:fontRef>
-        </p:style>
-      </p:cxnSp>
-      <p:cxnSp>
-        <p:nvCxnSpPr>
-          <p:cNvPr id="157" name="Straight Connector 156"/>
-          <p:cNvCxnSpPr/>
-          <p:nvPr/>
-        </p:nvCxnSpPr>
-        <p:spPr>
-          <a:xfrm>
-            <a:off x="5251011" y="1605390"/>
-            <a:ext cx="0" cy="746857"/>
-          </a:xfrm>
-          <a:prstGeom prst="line">
-            <a:avLst/>
-          </a:prstGeom>
-          <a:ln w="57150">
-            <a:solidFill>
-              <a:srgbClr val="C00000"/>
-            </a:solidFill>
-          </a:ln>
-        </p:spPr>
-        <p:style>
-          <a:lnRef idx="1">
-            <a:schemeClr val="accent1"/>
-          </a:lnRef>
-          <a:fillRef idx="0">
-            <a:schemeClr val="accent1"/>
-          </a:fillRef>
-          <a:effectRef idx="0">
-            <a:schemeClr val="accent1"/>
-          </a:effectRef>
-          <a:fontRef idx="minor">
-            <a:schemeClr val="tx1"/>
-          </a:fontRef>
-        </p:style>
-      </p:cxnSp>
       <p:cxnSp>
         <p:nvCxnSpPr>
           <p:cNvPr id="159" name="Straight Connector 158"/>
@@ -5557,7 +4679,7 @@
         </p:nvCxnSpPr>
         <p:spPr>
           <a:xfrm>
-            <a:off x="6096000" y="1283731"/>
+            <a:off x="5638800" y="1295400"/>
             <a:ext cx="0" cy="1071325"/>
           </a:xfrm>
           <a:prstGeom prst="line">
@@ -5592,7 +4714,7 @@
         </p:nvCxnSpPr>
         <p:spPr>
           <a:xfrm>
-            <a:off x="6560127" y="1886701"/>
+            <a:off x="6096000" y="1905000"/>
             <a:ext cx="0" cy="478302"/>
           </a:xfrm>
           <a:prstGeom prst="line">
@@ -5603,41 +4725,6 @@
               <a:schemeClr val="accent6">
                 <a:lumMod val="50000"/>
               </a:schemeClr>
-            </a:solidFill>
-          </a:ln>
-        </p:spPr>
-        <p:style>
-          <a:lnRef idx="1">
-            <a:schemeClr val="accent1"/>
-          </a:lnRef>
-          <a:fillRef idx="0">
-            <a:schemeClr val="accent1"/>
-          </a:fillRef>
-          <a:effectRef idx="0">
-            <a:schemeClr val="accent1"/>
-          </a:effectRef>
-          <a:fontRef idx="minor">
-            <a:schemeClr val="tx1"/>
-          </a:fontRef>
-        </p:style>
-      </p:cxnSp>
-      <p:cxnSp>
-        <p:nvCxnSpPr>
-          <p:cNvPr id="162" name="Straight Connector 161"/>
-          <p:cNvCxnSpPr/>
-          <p:nvPr/>
-        </p:nvCxnSpPr>
-        <p:spPr>
-          <a:xfrm flipV="1">
-            <a:off x="5137404" y="4119562"/>
-            <a:ext cx="1" cy="1824038"/>
-          </a:xfrm>
-          <a:prstGeom prst="line">
-            <a:avLst/>
-          </a:prstGeom>
-          <a:ln w="57150">
-            <a:solidFill>
-              <a:schemeClr val="tx1"/>
             </a:solidFill>
           </a:ln>
         </p:spPr>
@@ -5666,7 +4753,7 @@
         </p:nvCxnSpPr>
         <p:spPr>
           <a:xfrm flipV="1">
-            <a:off x="6428624" y="4119562"/>
+            <a:off x="5966542" y="4119562"/>
             <a:ext cx="1" cy="1824038"/>
           </a:xfrm>
           <a:prstGeom prst="line">
@@ -5675,41 +4762,6 @@
           <a:ln w="57150">
             <a:solidFill>
               <a:schemeClr val="tx1"/>
-            </a:solidFill>
-          </a:ln>
-        </p:spPr>
-        <p:style>
-          <a:lnRef idx="1">
-            <a:schemeClr val="accent1"/>
-          </a:lnRef>
-          <a:fillRef idx="0">
-            <a:schemeClr val="accent1"/>
-          </a:fillRef>
-          <a:effectRef idx="0">
-            <a:schemeClr val="accent1"/>
-          </a:effectRef>
-          <a:fontRef idx="minor">
-            <a:schemeClr val="tx1"/>
-          </a:fontRef>
-        </p:style>
-      </p:cxnSp>
-      <p:cxnSp>
-        <p:nvCxnSpPr>
-          <p:cNvPr id="171" name="Straight Connector 170"/>
-          <p:cNvCxnSpPr/>
-          <p:nvPr/>
-        </p:nvCxnSpPr>
-        <p:spPr>
-          <a:xfrm flipH="1">
-            <a:off x="5251011" y="1634730"/>
-            <a:ext cx="2437572" cy="0"/>
-          </a:xfrm>
-          <a:prstGeom prst="line">
-            <a:avLst/>
-          </a:prstGeom>
-          <a:ln w="57150">
-            <a:solidFill>
-              <a:srgbClr val="C00000"/>
             </a:solidFill>
           </a:ln>
         </p:spPr>
@@ -5736,8 +4788,8 @@
         </p:nvCxnSpPr>
         <p:spPr>
           <a:xfrm flipH="1">
-            <a:off x="6539262" y="1905000"/>
-            <a:ext cx="1151137" cy="0"/>
+            <a:off x="6096000" y="1905000"/>
+            <a:ext cx="1594400" cy="0"/>
           </a:xfrm>
           <a:prstGeom prst="line">
             <a:avLst/>
@@ -5767,13 +4819,13 @@
       </p:cxnSp>
       <p:sp>
         <p:nvSpPr>
-          <p:cNvPr id="189" name="Rectangle 188"/>
+          <p:cNvPr id="192" name="Rectangle 191"/>
           <p:cNvSpPr/>
           <p:nvPr/>
         </p:nvSpPr>
         <p:spPr>
           <a:xfrm>
-            <a:off x="4572000" y="2355056"/>
+            <a:off x="5379886" y="2359819"/>
             <a:ext cx="457200" cy="311943"/>
           </a:xfrm>
           <a:prstGeom prst="rect">
@@ -5843,13 +4895,13 @@
       </p:sp>
       <p:sp>
         <p:nvSpPr>
-          <p:cNvPr id="190" name="Rectangle 189"/>
+          <p:cNvPr id="193" name="Rectangle 192"/>
           <p:cNvSpPr/>
           <p:nvPr/>
         </p:nvSpPr>
         <p:spPr>
           <a:xfrm>
-            <a:off x="5029200" y="2359819"/>
+            <a:off x="5837086" y="2359819"/>
             <a:ext cx="457200" cy="311943"/>
           </a:xfrm>
           <a:prstGeom prst="rect">
@@ -5919,14 +4971,14 @@
       </p:sp>
       <p:sp>
         <p:nvSpPr>
-          <p:cNvPr id="192" name="Rectangle 191"/>
+          <p:cNvPr id="195" name="Rectangle 194"/>
           <p:cNvSpPr/>
           <p:nvPr/>
         </p:nvSpPr>
         <p:spPr>
           <a:xfrm>
-            <a:off x="5841968" y="2359819"/>
-            <a:ext cx="457200" cy="311943"/>
+            <a:off x="5661742" y="3825240"/>
+            <a:ext cx="609600" cy="311943"/>
           </a:xfrm>
           <a:prstGeom prst="rect">
             <a:avLst/>
@@ -5971,224 +5023,6 @@
                 <a:latin typeface="Times New Roman" panose="02020603050405020304" pitchFamily="18" charset="0"/>
                 <a:cs typeface="Times New Roman" panose="02020603050405020304" pitchFamily="18" charset="0"/>
               </a:rPr>
-              <a:t>V</a:t>
-            </a:r>
-            <a:r>
-              <a:rPr lang="en-US" sz="1400" baseline="-25000" dirty="0" smtClean="0">
-                <a:solidFill>
-                  <a:schemeClr val="tx1"/>
-                </a:solidFill>
-                <a:latin typeface="Times New Roman" panose="02020603050405020304" pitchFamily="18" charset="0"/>
-                <a:cs typeface="Times New Roman" panose="02020603050405020304" pitchFamily="18" charset="0"/>
-              </a:rPr>
-              <a:t>in</a:t>
-            </a:r>
-            <a:endParaRPr lang="en-US" sz="1400" dirty="0">
-              <a:solidFill>
-                <a:schemeClr val="tx1"/>
-              </a:solidFill>
-              <a:latin typeface="Times New Roman" panose="02020603050405020304" pitchFamily="18" charset="0"/>
-              <a:cs typeface="Times New Roman" panose="02020603050405020304" pitchFamily="18" charset="0"/>
-            </a:endParaRPr>
-          </a:p>
-        </p:txBody>
-      </p:sp>
-      <p:sp>
-        <p:nvSpPr>
-          <p:cNvPr id="193" name="Rectangle 192"/>
-          <p:cNvSpPr/>
-          <p:nvPr/>
-        </p:nvSpPr>
-        <p:spPr>
-          <a:xfrm>
-            <a:off x="6299168" y="2359819"/>
-            <a:ext cx="457200" cy="311943"/>
-          </a:xfrm>
-          <a:prstGeom prst="rect">
-            <a:avLst/>
-          </a:prstGeom>
-          <a:solidFill>
-            <a:schemeClr val="bg1">
-              <a:lumMod val="75000"/>
-            </a:schemeClr>
-          </a:solidFill>
-          <a:ln>
-            <a:solidFill>
-              <a:schemeClr val="tx1"/>
-            </a:solidFill>
-          </a:ln>
-        </p:spPr>
-        <p:style>
-          <a:lnRef idx="2">
-            <a:schemeClr val="accent1">
-              <a:shade val="50000"/>
-            </a:schemeClr>
-          </a:lnRef>
-          <a:fillRef idx="1">
-            <a:schemeClr val="accent1"/>
-          </a:fillRef>
-          <a:effectRef idx="0">
-            <a:schemeClr val="accent1"/>
-          </a:effectRef>
-          <a:fontRef idx="minor">
-            <a:schemeClr val="lt1"/>
-          </a:fontRef>
-        </p:style>
-        <p:txBody>
-          <a:bodyPr rtlCol="0" anchor="ctr"/>
-          <a:lstStyle/>
-          <a:p>
-            <a:pPr algn="ctr"/>
-            <a:r>
-              <a:rPr lang="en-US" sz="1400" dirty="0" err="1" smtClean="0">
-                <a:solidFill>
-                  <a:schemeClr val="tx1"/>
-                </a:solidFill>
-                <a:latin typeface="Times New Roman" panose="02020603050405020304" pitchFamily="18" charset="0"/>
-                <a:cs typeface="Times New Roman" panose="02020603050405020304" pitchFamily="18" charset="0"/>
-              </a:rPr>
-              <a:t>V</a:t>
-            </a:r>
-            <a:r>
-              <a:rPr lang="en-US" sz="1400" baseline="-25000" dirty="0" err="1" smtClean="0">
-                <a:solidFill>
-                  <a:schemeClr val="tx1"/>
-                </a:solidFill>
-                <a:latin typeface="Times New Roman" panose="02020603050405020304" pitchFamily="18" charset="0"/>
-                <a:cs typeface="Times New Roman" panose="02020603050405020304" pitchFamily="18" charset="0"/>
-              </a:rPr>
-              <a:t>out</a:t>
-            </a:r>
-            <a:endParaRPr lang="en-US" sz="1400" dirty="0">
-              <a:solidFill>
-                <a:schemeClr val="tx1"/>
-              </a:solidFill>
-              <a:latin typeface="Times New Roman" panose="02020603050405020304" pitchFamily="18" charset="0"/>
-              <a:cs typeface="Times New Roman" panose="02020603050405020304" pitchFamily="18" charset="0"/>
-            </a:endParaRPr>
-          </a:p>
-        </p:txBody>
-      </p:sp>
-      <p:sp>
-        <p:nvSpPr>
-          <p:cNvPr id="194" name="Rectangle 193"/>
-          <p:cNvSpPr/>
-          <p:nvPr/>
-        </p:nvSpPr>
-        <p:spPr>
-          <a:xfrm>
-            <a:off x="4831080" y="3802857"/>
-            <a:ext cx="609600" cy="311943"/>
-          </a:xfrm>
-          <a:prstGeom prst="rect">
-            <a:avLst/>
-          </a:prstGeom>
-          <a:solidFill>
-            <a:schemeClr val="bg1">
-              <a:lumMod val="75000"/>
-            </a:schemeClr>
-          </a:solidFill>
-          <a:ln>
-            <a:solidFill>
-              <a:schemeClr val="tx1"/>
-            </a:solidFill>
-          </a:ln>
-        </p:spPr>
-        <p:style>
-          <a:lnRef idx="2">
-            <a:schemeClr val="accent1">
-              <a:shade val="50000"/>
-            </a:schemeClr>
-          </a:lnRef>
-          <a:fillRef idx="1">
-            <a:schemeClr val="accent1"/>
-          </a:fillRef>
-          <a:effectRef idx="0">
-            <a:schemeClr val="accent1"/>
-          </a:effectRef>
-          <a:fontRef idx="minor">
-            <a:schemeClr val="lt1"/>
-          </a:fontRef>
-        </p:style>
-        <p:txBody>
-          <a:bodyPr rtlCol="0" anchor="ctr"/>
-          <a:lstStyle/>
-          <a:p>
-            <a:pPr algn="ctr"/>
-            <a:r>
-              <a:rPr lang="en-US" sz="1400" dirty="0" smtClean="0">
-                <a:solidFill>
-                  <a:schemeClr val="tx1"/>
-                </a:solidFill>
-                <a:latin typeface="Times New Roman" panose="02020603050405020304" pitchFamily="18" charset="0"/>
-                <a:cs typeface="Times New Roman" panose="02020603050405020304" pitchFamily="18" charset="0"/>
-              </a:rPr>
-              <a:t>GND</a:t>
-            </a:r>
-            <a:endParaRPr lang="en-US" sz="1400" dirty="0">
-              <a:solidFill>
-                <a:schemeClr val="tx1"/>
-              </a:solidFill>
-              <a:latin typeface="Times New Roman" panose="02020603050405020304" pitchFamily="18" charset="0"/>
-              <a:cs typeface="Times New Roman" panose="02020603050405020304" pitchFamily="18" charset="0"/>
-            </a:endParaRPr>
-          </a:p>
-        </p:txBody>
-      </p:sp>
-      <p:sp>
-        <p:nvSpPr>
-          <p:cNvPr id="195" name="Rectangle 194"/>
-          <p:cNvSpPr/>
-          <p:nvPr/>
-        </p:nvSpPr>
-        <p:spPr>
-          <a:xfrm>
-            <a:off x="6123824" y="3825240"/>
-            <a:ext cx="609600" cy="311943"/>
-          </a:xfrm>
-          <a:prstGeom prst="rect">
-            <a:avLst/>
-          </a:prstGeom>
-          <a:solidFill>
-            <a:schemeClr val="bg1">
-              <a:lumMod val="75000"/>
-            </a:schemeClr>
-          </a:solidFill>
-          <a:ln>
-            <a:solidFill>
-              <a:schemeClr val="tx1"/>
-            </a:solidFill>
-          </a:ln>
-        </p:spPr>
-        <p:style>
-          <a:lnRef idx="2">
-            <a:schemeClr val="accent1">
-              <a:shade val="50000"/>
-            </a:schemeClr>
-          </a:lnRef>
-          <a:fillRef idx="1">
-            <a:schemeClr val="accent1"/>
-          </a:fillRef>
-          <a:effectRef idx="0">
-            <a:schemeClr val="accent1"/>
-          </a:effectRef>
-          <a:fontRef idx="minor">
-            <a:schemeClr val="lt1"/>
-          </a:fontRef>
-        </p:style>
-        <p:txBody>
-          <a:bodyPr rtlCol="0" anchor="ctr"/>
-          <a:lstStyle/>
-          <a:p>
-            <a:pPr algn="ctr"/>
-            <a:r>
-              <a:rPr lang="en-US" sz="1400" dirty="0" smtClean="0">
-                <a:solidFill>
-                  <a:schemeClr val="tx1"/>
-                </a:solidFill>
-                <a:latin typeface="Times New Roman" panose="02020603050405020304" pitchFamily="18" charset="0"/>
-                <a:cs typeface="Times New Roman" panose="02020603050405020304" pitchFamily="18" charset="0"/>
-              </a:rPr>
               <a:t>GND</a:t>
             </a:r>
             <a:endParaRPr lang="en-US" sz="1400" dirty="0">
@@ -6253,174 +5087,6 @@
       </p:sp>
       <p:sp>
         <p:nvSpPr>
-          <p:cNvPr id="199" name="Rectangle 198"/>
-          <p:cNvSpPr/>
-          <p:nvPr/>
-        </p:nvSpPr>
-        <p:spPr>
-          <a:xfrm>
-            <a:off x="7638251" y="1558530"/>
-            <a:ext cx="142565" cy="152400"/>
-          </a:xfrm>
-          <a:prstGeom prst="rect">
-            <a:avLst/>
-          </a:prstGeom>
-          <a:solidFill>
-            <a:srgbClr val="C00000"/>
-          </a:solidFill>
-          <a:ln>
-            <a:solidFill>
-              <a:schemeClr val="tx1"/>
-            </a:solidFill>
-          </a:ln>
-        </p:spPr>
-        <p:style>
-          <a:lnRef idx="2">
-            <a:schemeClr val="accent1">
-              <a:shade val="50000"/>
-            </a:schemeClr>
-          </a:lnRef>
-          <a:fillRef idx="1">
-            <a:schemeClr val="accent1"/>
-          </a:fillRef>
-          <a:effectRef idx="0">
-            <a:schemeClr val="accent1"/>
-          </a:effectRef>
-          <a:fontRef idx="minor">
-            <a:schemeClr val="lt1"/>
-          </a:fontRef>
-        </p:style>
-        <p:txBody>
-          <a:bodyPr rtlCol="0" anchor="ctr"/>
-          <a:lstStyle/>
-          <a:p>
-            <a:pPr algn="ctr"/>
-            <a:endParaRPr lang="en-US"/>
-          </a:p>
-        </p:txBody>
-      </p:sp>
-      <p:sp>
-        <p:nvSpPr>
-          <p:cNvPr id="200" name="Rectangle 199"/>
-          <p:cNvSpPr/>
-          <p:nvPr/>
-        </p:nvSpPr>
-        <p:spPr>
-          <a:xfrm>
-            <a:off x="7642059" y="1207532"/>
-            <a:ext cx="142565" cy="152400"/>
-          </a:xfrm>
-          <a:prstGeom prst="rect">
-            <a:avLst/>
-          </a:prstGeom>
-          <a:solidFill>
-            <a:srgbClr val="FF0000"/>
-          </a:solidFill>
-          <a:ln>
-            <a:solidFill>
-              <a:schemeClr val="tx1"/>
-            </a:solidFill>
-          </a:ln>
-        </p:spPr>
-        <p:style>
-          <a:lnRef idx="2">
-            <a:schemeClr val="accent1">
-              <a:shade val="50000"/>
-            </a:schemeClr>
-          </a:lnRef>
-          <a:fillRef idx="1">
-            <a:schemeClr val="accent1"/>
-          </a:fillRef>
-          <a:effectRef idx="0">
-            <a:schemeClr val="accent1"/>
-          </a:effectRef>
-          <a:fontRef idx="minor">
-            <a:schemeClr val="lt1"/>
-          </a:fontRef>
-        </p:style>
-        <p:txBody>
-          <a:bodyPr rtlCol="0" anchor="ctr"/>
-          <a:lstStyle/>
-          <a:p>
-            <a:pPr algn="ctr"/>
-            <a:endParaRPr lang="en-US"/>
-          </a:p>
-        </p:txBody>
-      </p:sp>
-      <p:sp>
-        <p:nvSpPr>
-          <p:cNvPr id="201" name="TextBox 200"/>
-          <p:cNvSpPr txBox="1"/>
-          <p:nvPr/>
-        </p:nvSpPr>
-        <p:spPr>
-          <a:xfrm>
-            <a:off x="7784624" y="1099066"/>
-            <a:ext cx="1359376" cy="369332"/>
-          </a:xfrm>
-          <a:prstGeom prst="rect">
-            <a:avLst/>
-          </a:prstGeom>
-          <a:noFill/>
-        </p:spPr>
-        <p:txBody>
-          <a:bodyPr wrap="square" rtlCol="0">
-            <a:spAutoFit/>
-          </a:bodyPr>
-          <a:lstStyle/>
-          <a:p>
-            <a:r>
-              <a:rPr lang="en-US" dirty="0" smtClean="0">
-                <a:latin typeface="Times New Roman" panose="02020603050405020304" pitchFamily="18" charset="0"/>
-                <a:cs typeface="Times New Roman" panose="02020603050405020304" pitchFamily="18" charset="0"/>
-              </a:rPr>
-              <a:t>Unregulated</a:t>
-            </a:r>
-            <a:endParaRPr lang="en-US" dirty="0">
-              <a:latin typeface="Times New Roman" panose="02020603050405020304" pitchFamily="18" charset="0"/>
-              <a:cs typeface="Times New Roman" panose="02020603050405020304" pitchFamily="18" charset="0"/>
-            </a:endParaRPr>
-          </a:p>
-        </p:txBody>
-      </p:sp>
-      <p:sp>
-        <p:nvSpPr>
-          <p:cNvPr id="202" name="TextBox 201"/>
-          <p:cNvSpPr txBox="1"/>
-          <p:nvPr/>
-        </p:nvSpPr>
-        <p:spPr>
-          <a:xfrm>
-            <a:off x="7784624" y="1437680"/>
-            <a:ext cx="1359376" cy="369332"/>
-          </a:xfrm>
-          <a:prstGeom prst="rect">
-            <a:avLst/>
-          </a:prstGeom>
-          <a:noFill/>
-        </p:spPr>
-        <p:txBody>
-          <a:bodyPr wrap="square" rtlCol="0">
-            <a:spAutoFit/>
-          </a:bodyPr>
-          <a:lstStyle/>
-          <a:p>
-            <a:r>
-              <a:rPr lang="en-US" dirty="0" smtClean="0">
-                <a:latin typeface="Times New Roman" panose="02020603050405020304" pitchFamily="18" charset="0"/>
-                <a:cs typeface="Times New Roman" panose="02020603050405020304" pitchFamily="18" charset="0"/>
-              </a:rPr>
-              <a:t>5.0 V</a:t>
-            </a:r>
-            <a:endParaRPr lang="en-US" dirty="0">
-              <a:latin typeface="Times New Roman" panose="02020603050405020304" pitchFamily="18" charset="0"/>
-              <a:cs typeface="Times New Roman" panose="02020603050405020304" pitchFamily="18" charset="0"/>
-            </a:endParaRPr>
-          </a:p>
-        </p:txBody>
-      </p:sp>
-      <p:sp>
-        <p:nvSpPr>
           <p:cNvPr id="203" name="TextBox 202"/>
           <p:cNvSpPr txBox="1"/>
           <p:nvPr/>
@@ -6530,7 +5196,7 @@
     </p:spTree>
     <p:extLst>
       <p:ext uri="{BB962C8B-B14F-4D97-AF65-F5344CB8AC3E}">
-        <p14:creationId xmlns:p14="http://schemas.microsoft.com/office/powerpoint/2010/main" val="336789320"/>
+        <p14:creationId xmlns:p14="http://schemas.microsoft.com/office/powerpoint/2010/main" xmlns="" val="336789320"/>
       </p:ext>
     </p:extLst>
   </p:cSld>

</xml_diff>

<commit_message>
Updated separation block diagram
</commit_message>
<xml_diff>
--- a/Power (PWR)/Rascal PWR Block Diagram.pptx
+++ b/Power (PWR)/Rascal PWR Block Diagram.pptx
@@ -6,6 +6,7 @@
   </p:sldMasterIdLst>
   <p:sldIdLst>
     <p:sldId id="256" r:id="rId2"/>
+    <p:sldId id="257" r:id="rId3"/>
   </p:sldIdLst>
   <p:sldSz cx="9144000" cy="6858000" type="screen4x3"/>
   <p:notesSz cx="6858000" cy="9144000"/>
@@ -4007,7 +4008,7 @@
                   <a:latin typeface="Times New Roman" panose="02020603050405020304" pitchFamily="18" charset="0"/>
                   <a:cs typeface="Times New Roman" panose="02020603050405020304" pitchFamily="18" charset="0"/>
                 </a:rPr>
-                <a:t>Regulators</a:t>
+                <a:t>Regulator</a:t>
               </a:r>
               <a:endParaRPr lang="en-US" dirty="0">
                 <a:solidFill>
@@ -5210,6 +5211,3061 @@
       </p:par>
     </p:tnLst>
   </p:timing>
+</p:sld>
+</file>
+
+<file path=ppt/slides/slide2.xml><?xml version="1.0" encoding="utf-8"?>
+<p:sld xmlns:a="http://schemas.openxmlformats.org/drawingml/2006/main" xmlns:r="http://schemas.openxmlformats.org/officeDocument/2006/relationships" xmlns:p="http://schemas.openxmlformats.org/presentationml/2006/main">
+  <p:cSld>
+    <p:spTree>
+      <p:nvGrpSpPr>
+        <p:cNvPr id="1" name=""/>
+        <p:cNvGrpSpPr/>
+        <p:nvPr/>
+      </p:nvGrpSpPr>
+      <p:grpSpPr>
+        <a:xfrm>
+          <a:off x="0" y="0"/>
+          <a:ext cx="0" cy="0"/>
+          <a:chOff x="0" y="0"/>
+          <a:chExt cx="0" cy="0"/>
+        </a:xfrm>
+      </p:grpSpPr>
+      <p:sp>
+        <p:nvSpPr>
+          <p:cNvPr id="15" name="Rectangle 14"/>
+          <p:cNvSpPr/>
+          <p:nvPr/>
+        </p:nvSpPr>
+        <p:spPr>
+          <a:xfrm>
+            <a:off x="4648200" y="381000"/>
+            <a:ext cx="3657600" cy="5029200"/>
+          </a:xfrm>
+          <a:prstGeom prst="rect">
+            <a:avLst/>
+          </a:prstGeom>
+          <a:solidFill>
+            <a:schemeClr val="tx2">
+              <a:lumMod val="75000"/>
+            </a:schemeClr>
+          </a:solidFill>
+          <a:ln w="38100">
+            <a:solidFill>
+              <a:schemeClr val="tx1"/>
+            </a:solidFill>
+          </a:ln>
+        </p:spPr>
+        <p:style>
+          <a:lnRef idx="2">
+            <a:schemeClr val="accent1">
+              <a:shade val="50000"/>
+            </a:schemeClr>
+          </a:lnRef>
+          <a:fillRef idx="1">
+            <a:schemeClr val="accent1"/>
+          </a:fillRef>
+          <a:effectRef idx="0">
+            <a:schemeClr val="accent1"/>
+          </a:effectRef>
+          <a:fontRef idx="minor">
+            <a:schemeClr val="lt1"/>
+          </a:fontRef>
+        </p:style>
+        <p:txBody>
+          <a:bodyPr rtlCol="0" anchor="ctr"/>
+          <a:lstStyle/>
+          <a:p>
+            <a:pPr algn="ctr"/>
+            <a:endParaRPr lang="en-US"/>
+          </a:p>
+        </p:txBody>
+      </p:sp>
+      <p:grpSp>
+        <p:nvGrpSpPr>
+          <p:cNvPr id="12" name="Group 11"/>
+          <p:cNvGrpSpPr/>
+          <p:nvPr/>
+        </p:nvGrpSpPr>
+        <p:grpSpPr>
+          <a:xfrm>
+            <a:off x="381000" y="381000"/>
+            <a:ext cx="3657600" cy="5029200"/>
+            <a:chOff x="381000" y="304800"/>
+            <a:chExt cx="7307580" cy="6248400"/>
+          </a:xfrm>
+          <a:solidFill>
+            <a:schemeClr val="tx2">
+              <a:lumMod val="75000"/>
+            </a:schemeClr>
+          </a:solidFill>
+        </p:grpSpPr>
+        <p:sp>
+          <p:nvSpPr>
+            <p:cNvPr id="13" name="Rectangle 12"/>
+            <p:cNvSpPr/>
+            <p:nvPr/>
+          </p:nvSpPr>
+          <p:spPr>
+            <a:xfrm>
+              <a:off x="381000" y="304800"/>
+              <a:ext cx="7307580" cy="6248400"/>
+            </a:xfrm>
+            <a:prstGeom prst="rect">
+              <a:avLst/>
+            </a:prstGeom>
+            <a:grpFill/>
+            <a:ln w="38100">
+              <a:solidFill>
+                <a:schemeClr val="tx1"/>
+              </a:solidFill>
+            </a:ln>
+          </p:spPr>
+          <p:style>
+            <a:lnRef idx="2">
+              <a:schemeClr val="accent1">
+                <a:shade val="50000"/>
+              </a:schemeClr>
+            </a:lnRef>
+            <a:fillRef idx="1">
+              <a:schemeClr val="accent1"/>
+            </a:fillRef>
+            <a:effectRef idx="0">
+              <a:schemeClr val="accent1"/>
+            </a:effectRef>
+            <a:fontRef idx="minor">
+              <a:schemeClr val="lt1"/>
+            </a:fontRef>
+          </p:style>
+          <p:txBody>
+            <a:bodyPr rtlCol="0" anchor="ctr"/>
+            <a:lstStyle/>
+            <a:p>
+              <a:pPr algn="ctr"/>
+              <a:endParaRPr lang="en-US"/>
+            </a:p>
+          </p:txBody>
+        </p:sp>
+        <p:sp>
+          <p:nvSpPr>
+            <p:cNvPr id="14" name="TextBox 13"/>
+            <p:cNvSpPr txBox="1"/>
+            <p:nvPr/>
+          </p:nvSpPr>
+          <p:spPr>
+            <a:xfrm>
+              <a:off x="428451" y="359065"/>
+              <a:ext cx="5023961" cy="496479"/>
+            </a:xfrm>
+            <a:prstGeom prst="rect">
+              <a:avLst/>
+            </a:prstGeom>
+            <a:noFill/>
+            <a:ln>
+              <a:noFill/>
+            </a:ln>
+          </p:spPr>
+          <p:txBody>
+            <a:bodyPr wrap="square" rtlCol="0">
+              <a:spAutoFit/>
+            </a:bodyPr>
+            <a:lstStyle/>
+            <a:p>
+              <a:r>
+                <a:rPr lang="en-US" dirty="0" smtClean="0">
+                  <a:solidFill>
+                    <a:schemeClr val="bg1"/>
+                  </a:solidFill>
+                  <a:latin typeface="Times New Roman" panose="02020603050405020304" pitchFamily="18" charset="0"/>
+                  <a:cs typeface="Times New Roman" panose="02020603050405020304" pitchFamily="18" charset="0"/>
+                </a:rPr>
+                <a:t>Secondary Spacecraft</a:t>
+              </a:r>
+              <a:endParaRPr lang="en-US" dirty="0">
+                <a:solidFill>
+                  <a:schemeClr val="bg1"/>
+                </a:solidFill>
+                <a:latin typeface="Times New Roman" panose="02020603050405020304" pitchFamily="18" charset="0"/>
+                <a:cs typeface="Times New Roman" panose="02020603050405020304" pitchFamily="18" charset="0"/>
+              </a:endParaRPr>
+            </a:p>
+          </p:txBody>
+        </p:sp>
+      </p:grpSp>
+      <p:grpSp>
+        <p:nvGrpSpPr>
+          <p:cNvPr id="4" name="Group 3"/>
+          <p:cNvGrpSpPr/>
+          <p:nvPr/>
+        </p:nvGrpSpPr>
+        <p:grpSpPr>
+          <a:xfrm>
+            <a:off x="609600" y="914400"/>
+            <a:ext cx="3200400" cy="4343400"/>
+            <a:chOff x="381000" y="304800"/>
+            <a:chExt cx="7307580" cy="6248400"/>
+          </a:xfrm>
+        </p:grpSpPr>
+        <p:sp>
+          <p:nvSpPr>
+            <p:cNvPr id="5" name="Rectangle 4"/>
+            <p:cNvSpPr/>
+            <p:nvPr/>
+          </p:nvSpPr>
+          <p:spPr>
+            <a:xfrm>
+              <a:off x="381000" y="304800"/>
+              <a:ext cx="7307580" cy="6248400"/>
+            </a:xfrm>
+            <a:prstGeom prst="rect">
+              <a:avLst/>
+            </a:prstGeom>
+            <a:solidFill>
+              <a:schemeClr val="tx2">
+                <a:lumMod val="60000"/>
+                <a:lumOff val="40000"/>
+              </a:schemeClr>
+            </a:solidFill>
+            <a:ln w="38100">
+              <a:solidFill>
+                <a:schemeClr val="tx2">
+                  <a:lumMod val="40000"/>
+                  <a:lumOff val="60000"/>
+                </a:schemeClr>
+              </a:solidFill>
+            </a:ln>
+          </p:spPr>
+          <p:style>
+            <a:lnRef idx="2">
+              <a:schemeClr val="accent1">
+                <a:shade val="50000"/>
+              </a:schemeClr>
+            </a:lnRef>
+            <a:fillRef idx="1">
+              <a:schemeClr val="accent1"/>
+            </a:fillRef>
+            <a:effectRef idx="0">
+              <a:schemeClr val="accent1"/>
+            </a:effectRef>
+            <a:fontRef idx="minor">
+              <a:schemeClr val="lt1"/>
+            </a:fontRef>
+          </p:style>
+          <p:txBody>
+            <a:bodyPr rtlCol="0" anchor="ctr"/>
+            <a:lstStyle/>
+            <a:p>
+              <a:pPr algn="ctr"/>
+              <a:endParaRPr lang="en-US"/>
+            </a:p>
+          </p:txBody>
+        </p:sp>
+        <p:sp>
+          <p:nvSpPr>
+            <p:cNvPr id="6" name="TextBox 5"/>
+            <p:cNvSpPr txBox="1"/>
+            <p:nvPr/>
+          </p:nvSpPr>
+          <p:spPr>
+            <a:xfrm>
+              <a:off x="381000" y="304800"/>
+              <a:ext cx="3653790" cy="890742"/>
+            </a:xfrm>
+            <a:prstGeom prst="rect">
+              <a:avLst/>
+            </a:prstGeom>
+            <a:noFill/>
+          </p:spPr>
+          <p:txBody>
+            <a:bodyPr wrap="square" rtlCol="0">
+              <a:spAutoFit/>
+            </a:bodyPr>
+            <a:lstStyle/>
+            <a:p>
+              <a:r>
+                <a:rPr lang="en-US" dirty="0" smtClean="0">
+                  <a:solidFill>
+                    <a:schemeClr val="bg1"/>
+                  </a:solidFill>
+                  <a:latin typeface="Times New Roman" panose="02020603050405020304" pitchFamily="18" charset="0"/>
+                  <a:cs typeface="Times New Roman" panose="02020603050405020304" pitchFamily="18" charset="0"/>
+                </a:rPr>
+                <a:t> SEP</a:t>
+              </a:r>
+              <a:endParaRPr lang="en-US" dirty="0">
+                <a:solidFill>
+                  <a:schemeClr val="bg1"/>
+                </a:solidFill>
+                <a:latin typeface="Times New Roman" panose="02020603050405020304" pitchFamily="18" charset="0"/>
+                <a:cs typeface="Times New Roman" panose="02020603050405020304" pitchFamily="18" charset="0"/>
+              </a:endParaRPr>
+            </a:p>
+          </p:txBody>
+        </p:sp>
+      </p:grpSp>
+      <p:grpSp>
+        <p:nvGrpSpPr>
+          <p:cNvPr id="7" name="Group 6"/>
+          <p:cNvGrpSpPr/>
+          <p:nvPr/>
+        </p:nvGrpSpPr>
+        <p:grpSpPr>
+          <a:xfrm>
+            <a:off x="4800600" y="914400"/>
+            <a:ext cx="1524000" cy="4343400"/>
+            <a:chOff x="381000" y="304800"/>
+            <a:chExt cx="7307580" cy="6248400"/>
+          </a:xfrm>
+        </p:grpSpPr>
+        <p:sp>
+          <p:nvSpPr>
+            <p:cNvPr id="8" name="Rectangle 7"/>
+            <p:cNvSpPr/>
+            <p:nvPr/>
+          </p:nvSpPr>
+          <p:spPr>
+            <a:xfrm>
+              <a:off x="381000" y="304800"/>
+              <a:ext cx="7307580" cy="6248400"/>
+            </a:xfrm>
+            <a:prstGeom prst="rect">
+              <a:avLst/>
+            </a:prstGeom>
+            <a:solidFill>
+              <a:schemeClr val="tx2">
+                <a:lumMod val="60000"/>
+                <a:lumOff val="40000"/>
+              </a:schemeClr>
+            </a:solidFill>
+            <a:ln w="38100">
+              <a:solidFill>
+                <a:schemeClr val="tx2">
+                  <a:lumMod val="40000"/>
+                  <a:lumOff val="60000"/>
+                </a:schemeClr>
+              </a:solidFill>
+            </a:ln>
+          </p:spPr>
+          <p:style>
+            <a:lnRef idx="2">
+              <a:schemeClr val="accent1">
+                <a:shade val="50000"/>
+              </a:schemeClr>
+            </a:lnRef>
+            <a:fillRef idx="1">
+              <a:schemeClr val="accent1"/>
+            </a:fillRef>
+            <a:effectRef idx="0">
+              <a:schemeClr val="accent1"/>
+            </a:effectRef>
+            <a:fontRef idx="minor">
+              <a:schemeClr val="lt1"/>
+            </a:fontRef>
+          </p:style>
+          <p:txBody>
+            <a:bodyPr rtlCol="0" anchor="ctr"/>
+            <a:lstStyle/>
+            <a:p>
+              <a:pPr algn="ctr"/>
+              <a:endParaRPr lang="en-US"/>
+            </a:p>
+          </p:txBody>
+        </p:sp>
+        <p:sp>
+          <p:nvSpPr>
+            <p:cNvPr id="9" name="TextBox 8"/>
+            <p:cNvSpPr txBox="1"/>
+            <p:nvPr/>
+          </p:nvSpPr>
+          <p:spPr>
+            <a:xfrm>
+              <a:off x="381000" y="304800"/>
+              <a:ext cx="4001770" cy="890742"/>
+            </a:xfrm>
+            <a:prstGeom prst="rect">
+              <a:avLst/>
+            </a:prstGeom>
+            <a:noFill/>
+          </p:spPr>
+          <p:txBody>
+            <a:bodyPr wrap="square" rtlCol="0">
+              <a:spAutoFit/>
+            </a:bodyPr>
+            <a:lstStyle/>
+            <a:p>
+              <a:r>
+                <a:rPr lang="en-US" dirty="0" smtClean="0">
+                  <a:solidFill>
+                    <a:schemeClr val="bg1"/>
+                  </a:solidFill>
+                  <a:latin typeface="Times New Roman" panose="02020603050405020304" pitchFamily="18" charset="0"/>
+                  <a:cs typeface="Times New Roman" panose="02020603050405020304" pitchFamily="18" charset="0"/>
+                </a:rPr>
+                <a:t>SEP</a:t>
+              </a:r>
+              <a:endParaRPr lang="en-US" dirty="0">
+                <a:solidFill>
+                  <a:schemeClr val="bg1"/>
+                </a:solidFill>
+                <a:latin typeface="Times New Roman" panose="02020603050405020304" pitchFamily="18" charset="0"/>
+                <a:cs typeface="Times New Roman" panose="02020603050405020304" pitchFamily="18" charset="0"/>
+              </a:endParaRPr>
+            </a:p>
+          </p:txBody>
+        </p:sp>
+      </p:grpSp>
+      <p:sp>
+        <p:nvSpPr>
+          <p:cNvPr id="10" name="Rectangle 9"/>
+          <p:cNvSpPr/>
+          <p:nvPr/>
+        </p:nvSpPr>
+        <p:spPr>
+          <a:xfrm>
+            <a:off x="3352800" y="1295400"/>
+            <a:ext cx="914400" cy="685800"/>
+          </a:xfrm>
+          <a:prstGeom prst="rect">
+            <a:avLst/>
+          </a:prstGeom>
+          <a:solidFill>
+            <a:schemeClr val="bg2">
+              <a:lumMod val="10000"/>
+            </a:schemeClr>
+          </a:solidFill>
+          <a:ln>
+            <a:solidFill>
+              <a:schemeClr val="tx1"/>
+            </a:solidFill>
+          </a:ln>
+        </p:spPr>
+        <p:style>
+          <a:lnRef idx="2">
+            <a:schemeClr val="accent1">
+              <a:shade val="50000"/>
+            </a:schemeClr>
+          </a:lnRef>
+          <a:fillRef idx="1">
+            <a:schemeClr val="accent1"/>
+          </a:fillRef>
+          <a:effectRef idx="0">
+            <a:schemeClr val="accent1"/>
+          </a:effectRef>
+          <a:fontRef idx="minor">
+            <a:schemeClr val="lt1"/>
+          </a:fontRef>
+        </p:style>
+        <p:txBody>
+          <a:bodyPr rtlCol="0" anchor="ctr"/>
+          <a:lstStyle/>
+          <a:p>
+            <a:pPr algn="ctr"/>
+            <a:r>
+              <a:rPr lang="en-US" sz="1200" dirty="0" smtClean="0">
+                <a:latin typeface="Times New Roman" panose="02020603050405020304" pitchFamily="18" charset="0"/>
+                <a:cs typeface="Times New Roman" panose="02020603050405020304" pitchFamily="18" charset="0"/>
+              </a:rPr>
+              <a:t>Secondary Electrical</a:t>
+            </a:r>
+          </a:p>
+          <a:p>
+            <a:pPr algn="ctr"/>
+            <a:r>
+              <a:rPr lang="en-US" sz="1200" dirty="0" smtClean="0">
+                <a:latin typeface="Times New Roman" panose="02020603050405020304" pitchFamily="18" charset="0"/>
+                <a:cs typeface="Times New Roman" panose="02020603050405020304" pitchFamily="18" charset="0"/>
+              </a:rPr>
+              <a:t>Contact</a:t>
+            </a:r>
+            <a:endParaRPr lang="en-US" sz="1200" dirty="0">
+              <a:latin typeface="Times New Roman" panose="02020603050405020304" pitchFamily="18" charset="0"/>
+              <a:cs typeface="Times New Roman" panose="02020603050405020304" pitchFamily="18" charset="0"/>
+            </a:endParaRPr>
+          </a:p>
+        </p:txBody>
+      </p:sp>
+      <p:sp>
+        <p:nvSpPr>
+          <p:cNvPr id="11" name="Rectangle 10"/>
+          <p:cNvSpPr/>
+          <p:nvPr/>
+        </p:nvSpPr>
+        <p:spPr>
+          <a:xfrm>
+            <a:off x="4419600" y="1295400"/>
+            <a:ext cx="914400" cy="685800"/>
+          </a:xfrm>
+          <a:prstGeom prst="rect">
+            <a:avLst/>
+          </a:prstGeom>
+          <a:solidFill>
+            <a:schemeClr val="tx1">
+              <a:lumMod val="75000"/>
+              <a:lumOff val="25000"/>
+            </a:schemeClr>
+          </a:solidFill>
+          <a:ln>
+            <a:solidFill>
+              <a:schemeClr val="tx1"/>
+            </a:solidFill>
+          </a:ln>
+        </p:spPr>
+        <p:style>
+          <a:lnRef idx="2">
+            <a:schemeClr val="accent1">
+              <a:shade val="50000"/>
+            </a:schemeClr>
+          </a:lnRef>
+          <a:fillRef idx="1">
+            <a:schemeClr val="accent1"/>
+          </a:fillRef>
+          <a:effectRef idx="0">
+            <a:schemeClr val="accent1"/>
+          </a:effectRef>
+          <a:fontRef idx="minor">
+            <a:schemeClr val="lt1"/>
+          </a:fontRef>
+        </p:style>
+        <p:txBody>
+          <a:bodyPr rtlCol="0" anchor="ctr"/>
+          <a:lstStyle/>
+          <a:p>
+            <a:pPr algn="ctr"/>
+            <a:r>
+              <a:rPr lang="en-US" sz="1200" dirty="0" smtClean="0">
+                <a:latin typeface="Times New Roman" panose="02020603050405020304" pitchFamily="18" charset="0"/>
+                <a:cs typeface="Times New Roman" panose="02020603050405020304" pitchFamily="18" charset="0"/>
+              </a:rPr>
+              <a:t>Primary Electrical</a:t>
+            </a:r>
+          </a:p>
+          <a:p>
+            <a:pPr algn="ctr"/>
+            <a:r>
+              <a:rPr lang="en-US" sz="1200" dirty="0" smtClean="0">
+                <a:latin typeface="Times New Roman" panose="02020603050405020304" pitchFamily="18" charset="0"/>
+                <a:cs typeface="Times New Roman" panose="02020603050405020304" pitchFamily="18" charset="0"/>
+              </a:rPr>
+              <a:t>Contact</a:t>
+            </a:r>
+            <a:endParaRPr lang="en-US" sz="1200" dirty="0">
+              <a:latin typeface="Times New Roman" panose="02020603050405020304" pitchFamily="18" charset="0"/>
+              <a:cs typeface="Times New Roman" panose="02020603050405020304" pitchFamily="18" charset="0"/>
+            </a:endParaRPr>
+          </a:p>
+        </p:txBody>
+      </p:sp>
+      <p:sp>
+        <p:nvSpPr>
+          <p:cNvPr id="16" name="TextBox 15"/>
+          <p:cNvSpPr txBox="1"/>
+          <p:nvPr/>
+        </p:nvSpPr>
+        <p:spPr>
+          <a:xfrm>
+            <a:off x="4648200" y="381000"/>
+            <a:ext cx="2514600" cy="369332"/>
+          </a:xfrm>
+          <a:prstGeom prst="rect">
+            <a:avLst/>
+          </a:prstGeom>
+          <a:noFill/>
+          <a:ln>
+            <a:noFill/>
+          </a:ln>
+        </p:spPr>
+        <p:txBody>
+          <a:bodyPr wrap="square" rtlCol="0">
+            <a:spAutoFit/>
+          </a:bodyPr>
+          <a:lstStyle/>
+          <a:p>
+            <a:r>
+              <a:rPr lang="en-US" dirty="0" smtClean="0">
+                <a:solidFill>
+                  <a:schemeClr val="bg1"/>
+                </a:solidFill>
+                <a:latin typeface="Times New Roman" panose="02020603050405020304" pitchFamily="18" charset="0"/>
+                <a:cs typeface="Times New Roman" panose="02020603050405020304" pitchFamily="18" charset="0"/>
+              </a:rPr>
+              <a:t>Primary Spacecraft</a:t>
+            </a:r>
+            <a:endParaRPr lang="en-US" dirty="0">
+              <a:solidFill>
+                <a:schemeClr val="bg1"/>
+              </a:solidFill>
+              <a:latin typeface="Times New Roman" panose="02020603050405020304" pitchFamily="18" charset="0"/>
+              <a:cs typeface="Times New Roman" panose="02020603050405020304" pitchFamily="18" charset="0"/>
+            </a:endParaRPr>
+          </a:p>
+        </p:txBody>
+      </p:sp>
+      <p:cxnSp>
+        <p:nvCxnSpPr>
+          <p:cNvPr id="17" name="Straight Connector 16"/>
+          <p:cNvCxnSpPr/>
+          <p:nvPr/>
+        </p:nvCxnSpPr>
+        <p:spPr>
+          <a:xfrm flipV="1">
+            <a:off x="5334000" y="1447800"/>
+            <a:ext cx="2438400" cy="3572"/>
+          </a:xfrm>
+          <a:prstGeom prst="line">
+            <a:avLst/>
+          </a:prstGeom>
+          <a:ln w="57150">
+            <a:solidFill>
+              <a:srgbClr val="FF0000"/>
+            </a:solidFill>
+          </a:ln>
+        </p:spPr>
+        <p:style>
+          <a:lnRef idx="1">
+            <a:schemeClr val="accent1"/>
+          </a:lnRef>
+          <a:fillRef idx="0">
+            <a:schemeClr val="accent1"/>
+          </a:fillRef>
+          <a:effectRef idx="0">
+            <a:schemeClr val="accent1"/>
+          </a:effectRef>
+          <a:fontRef idx="minor">
+            <a:schemeClr val="tx1"/>
+          </a:fontRef>
+        </p:style>
+      </p:cxnSp>
+      <p:cxnSp>
+        <p:nvCxnSpPr>
+          <p:cNvPr id="19" name="Straight Connector 18"/>
+          <p:cNvCxnSpPr/>
+          <p:nvPr/>
+        </p:nvCxnSpPr>
+        <p:spPr>
+          <a:xfrm>
+            <a:off x="7772400" y="1451372"/>
+            <a:ext cx="0" cy="3577828"/>
+          </a:xfrm>
+          <a:prstGeom prst="line">
+            <a:avLst/>
+          </a:prstGeom>
+          <a:ln w="57150">
+            <a:solidFill>
+              <a:srgbClr val="FF0000"/>
+            </a:solidFill>
+          </a:ln>
+        </p:spPr>
+        <p:style>
+          <a:lnRef idx="1">
+            <a:schemeClr val="accent1"/>
+          </a:lnRef>
+          <a:fillRef idx="0">
+            <a:schemeClr val="accent1"/>
+          </a:fillRef>
+          <a:effectRef idx="0">
+            <a:schemeClr val="accent1"/>
+          </a:effectRef>
+          <a:fontRef idx="minor">
+            <a:schemeClr val="tx1"/>
+          </a:fontRef>
+        </p:style>
+      </p:cxnSp>
+      <p:cxnSp>
+        <p:nvCxnSpPr>
+          <p:cNvPr id="21" name="Straight Connector 20"/>
+          <p:cNvCxnSpPr/>
+          <p:nvPr/>
+        </p:nvCxnSpPr>
+        <p:spPr>
+          <a:xfrm flipV="1">
+            <a:off x="5334000" y="1752600"/>
+            <a:ext cx="2148840" cy="2958"/>
+          </a:xfrm>
+          <a:prstGeom prst="line">
+            <a:avLst/>
+          </a:prstGeom>
+          <a:ln w="57150">
+            <a:solidFill>
+              <a:schemeClr val="tx1"/>
+            </a:solidFill>
+          </a:ln>
+        </p:spPr>
+        <p:style>
+          <a:lnRef idx="1">
+            <a:schemeClr val="accent1"/>
+          </a:lnRef>
+          <a:fillRef idx="0">
+            <a:schemeClr val="accent1"/>
+          </a:fillRef>
+          <a:effectRef idx="0">
+            <a:schemeClr val="accent1"/>
+          </a:effectRef>
+          <a:fontRef idx="minor">
+            <a:schemeClr val="tx1"/>
+          </a:fontRef>
+        </p:style>
+      </p:cxnSp>
+      <p:cxnSp>
+        <p:nvCxnSpPr>
+          <p:cNvPr id="23" name="Straight Connector 22"/>
+          <p:cNvCxnSpPr/>
+          <p:nvPr/>
+        </p:nvCxnSpPr>
+        <p:spPr>
+          <a:xfrm flipV="1">
+            <a:off x="7480002" y="1728850"/>
+            <a:ext cx="1" cy="3300350"/>
+          </a:xfrm>
+          <a:prstGeom prst="line">
+            <a:avLst/>
+          </a:prstGeom>
+          <a:ln w="57150">
+            <a:solidFill>
+              <a:schemeClr val="tx1"/>
+            </a:solidFill>
+          </a:ln>
+        </p:spPr>
+        <p:style>
+          <a:lnRef idx="1">
+            <a:schemeClr val="accent1"/>
+          </a:lnRef>
+          <a:fillRef idx="0">
+            <a:schemeClr val="accent1"/>
+          </a:fillRef>
+          <a:effectRef idx="0">
+            <a:schemeClr val="accent1"/>
+          </a:effectRef>
+          <a:fontRef idx="minor">
+            <a:schemeClr val="tx1"/>
+          </a:fontRef>
+        </p:style>
+      </p:cxnSp>
+      <p:sp>
+        <p:nvSpPr>
+          <p:cNvPr id="31" name="Rectangle 30"/>
+          <p:cNvSpPr/>
+          <p:nvPr/>
+        </p:nvSpPr>
+        <p:spPr>
+          <a:xfrm>
+            <a:off x="2057400" y="2895600"/>
+            <a:ext cx="990600" cy="685800"/>
+          </a:xfrm>
+          <a:prstGeom prst="rect">
+            <a:avLst/>
+          </a:prstGeom>
+          <a:solidFill>
+            <a:schemeClr val="bg2">
+              <a:lumMod val="10000"/>
+            </a:schemeClr>
+          </a:solidFill>
+          <a:ln>
+            <a:solidFill>
+              <a:schemeClr val="tx1"/>
+            </a:solidFill>
+          </a:ln>
+        </p:spPr>
+        <p:style>
+          <a:lnRef idx="2">
+            <a:schemeClr val="accent1">
+              <a:shade val="50000"/>
+            </a:schemeClr>
+          </a:lnRef>
+          <a:fillRef idx="1">
+            <a:schemeClr val="accent1"/>
+          </a:fillRef>
+          <a:effectRef idx="0">
+            <a:schemeClr val="accent1"/>
+          </a:effectRef>
+          <a:fontRef idx="minor">
+            <a:schemeClr val="lt1"/>
+          </a:fontRef>
+        </p:style>
+        <p:txBody>
+          <a:bodyPr rtlCol="0" anchor="ctr"/>
+          <a:lstStyle/>
+          <a:p>
+            <a:pPr algn="ctr"/>
+            <a:r>
+              <a:rPr lang="en-US" sz="1600" dirty="0" smtClean="0">
+                <a:latin typeface="Times New Roman" panose="02020603050405020304" pitchFamily="18" charset="0"/>
+                <a:cs typeface="Times New Roman" panose="02020603050405020304" pitchFamily="18" charset="0"/>
+              </a:rPr>
+              <a:t>Solenoid</a:t>
+            </a:r>
+            <a:endParaRPr lang="en-US" sz="1600" dirty="0">
+              <a:latin typeface="Times New Roman" panose="02020603050405020304" pitchFamily="18" charset="0"/>
+              <a:cs typeface="Times New Roman" panose="02020603050405020304" pitchFamily="18" charset="0"/>
+            </a:endParaRPr>
+          </a:p>
+        </p:txBody>
+      </p:sp>
+      <p:cxnSp>
+        <p:nvCxnSpPr>
+          <p:cNvPr id="32" name="Straight Connector 31"/>
+          <p:cNvCxnSpPr/>
+          <p:nvPr/>
+        </p:nvCxnSpPr>
+        <p:spPr>
+          <a:xfrm flipV="1">
+            <a:off x="4267200" y="1447800"/>
+            <a:ext cx="152400" cy="3572"/>
+          </a:xfrm>
+          <a:prstGeom prst="line">
+            <a:avLst/>
+          </a:prstGeom>
+          <a:ln w="57150">
+            <a:solidFill>
+              <a:srgbClr val="FF0000"/>
+            </a:solidFill>
+          </a:ln>
+        </p:spPr>
+        <p:style>
+          <a:lnRef idx="1">
+            <a:schemeClr val="accent1"/>
+          </a:lnRef>
+          <a:fillRef idx="0">
+            <a:schemeClr val="accent1"/>
+          </a:fillRef>
+          <a:effectRef idx="0">
+            <a:schemeClr val="accent1"/>
+          </a:effectRef>
+          <a:fontRef idx="minor">
+            <a:schemeClr val="tx1"/>
+          </a:fontRef>
+        </p:style>
+      </p:cxnSp>
+      <p:cxnSp>
+        <p:nvCxnSpPr>
+          <p:cNvPr id="34" name="Straight Connector 33"/>
+          <p:cNvCxnSpPr/>
+          <p:nvPr/>
+        </p:nvCxnSpPr>
+        <p:spPr>
+          <a:xfrm flipV="1">
+            <a:off x="4267200" y="1749028"/>
+            <a:ext cx="152400" cy="3572"/>
+          </a:xfrm>
+          <a:prstGeom prst="line">
+            <a:avLst/>
+          </a:prstGeom>
+          <a:ln w="57150">
+            <a:solidFill>
+              <a:schemeClr val="tx1"/>
+            </a:solidFill>
+          </a:ln>
+        </p:spPr>
+        <p:style>
+          <a:lnRef idx="1">
+            <a:schemeClr val="accent1"/>
+          </a:lnRef>
+          <a:fillRef idx="0">
+            <a:schemeClr val="accent1"/>
+          </a:fillRef>
+          <a:effectRef idx="0">
+            <a:schemeClr val="accent1"/>
+          </a:effectRef>
+          <a:fontRef idx="minor">
+            <a:schemeClr val="tx1"/>
+          </a:fontRef>
+        </p:style>
+      </p:cxnSp>
+      <p:sp>
+        <p:nvSpPr>
+          <p:cNvPr id="40" name="Rectangle 39"/>
+          <p:cNvSpPr/>
+          <p:nvPr/>
+        </p:nvSpPr>
+        <p:spPr>
+          <a:xfrm>
+            <a:off x="2057400" y="3810000"/>
+            <a:ext cx="990600" cy="685800"/>
+          </a:xfrm>
+          <a:prstGeom prst="rect">
+            <a:avLst/>
+          </a:prstGeom>
+          <a:solidFill>
+            <a:schemeClr val="bg2">
+              <a:lumMod val="10000"/>
+            </a:schemeClr>
+          </a:solidFill>
+          <a:ln>
+            <a:solidFill>
+              <a:schemeClr val="tx1"/>
+            </a:solidFill>
+          </a:ln>
+        </p:spPr>
+        <p:style>
+          <a:lnRef idx="2">
+            <a:schemeClr val="accent1">
+              <a:shade val="50000"/>
+            </a:schemeClr>
+          </a:lnRef>
+          <a:fillRef idx="1">
+            <a:schemeClr val="accent1"/>
+          </a:fillRef>
+          <a:effectRef idx="0">
+            <a:schemeClr val="accent1"/>
+          </a:effectRef>
+          <a:fontRef idx="minor">
+            <a:schemeClr val="lt1"/>
+          </a:fontRef>
+        </p:style>
+        <p:txBody>
+          <a:bodyPr rtlCol="0" anchor="ctr"/>
+          <a:lstStyle/>
+          <a:p>
+            <a:pPr algn="ctr"/>
+            <a:r>
+              <a:rPr lang="en-US" sz="1600" dirty="0" smtClean="0">
+                <a:latin typeface="Times New Roman" panose="02020603050405020304" pitchFamily="18" charset="0"/>
+                <a:cs typeface="Times New Roman" panose="02020603050405020304" pitchFamily="18" charset="0"/>
+              </a:rPr>
+              <a:t>Solenoid</a:t>
+            </a:r>
+            <a:endParaRPr lang="en-US" sz="1600" dirty="0">
+              <a:latin typeface="Times New Roman" panose="02020603050405020304" pitchFamily="18" charset="0"/>
+              <a:cs typeface="Times New Roman" panose="02020603050405020304" pitchFamily="18" charset="0"/>
+            </a:endParaRPr>
+          </a:p>
+        </p:txBody>
+      </p:sp>
+      <p:cxnSp>
+        <p:nvCxnSpPr>
+          <p:cNvPr id="41" name="Straight Connector 40"/>
+          <p:cNvCxnSpPr/>
+          <p:nvPr/>
+        </p:nvCxnSpPr>
+        <p:spPr>
+          <a:xfrm>
+            <a:off x="1295400" y="1447800"/>
+            <a:ext cx="2057400" cy="0"/>
+          </a:xfrm>
+          <a:prstGeom prst="line">
+            <a:avLst/>
+          </a:prstGeom>
+          <a:ln w="57150">
+            <a:solidFill>
+              <a:srgbClr val="FF0000"/>
+            </a:solidFill>
+          </a:ln>
+        </p:spPr>
+        <p:style>
+          <a:lnRef idx="1">
+            <a:schemeClr val="accent1"/>
+          </a:lnRef>
+          <a:fillRef idx="0">
+            <a:schemeClr val="accent1"/>
+          </a:fillRef>
+          <a:effectRef idx="0">
+            <a:schemeClr val="accent1"/>
+          </a:effectRef>
+          <a:fontRef idx="minor">
+            <a:schemeClr val="tx1"/>
+          </a:fontRef>
+        </p:style>
+      </p:cxnSp>
+      <p:cxnSp>
+        <p:nvCxnSpPr>
+          <p:cNvPr id="45" name="Straight Connector 44"/>
+          <p:cNvCxnSpPr/>
+          <p:nvPr/>
+        </p:nvCxnSpPr>
+        <p:spPr>
+          <a:xfrm>
+            <a:off x="1295400" y="1426534"/>
+            <a:ext cx="0" cy="935666"/>
+          </a:xfrm>
+          <a:prstGeom prst="line">
+            <a:avLst/>
+          </a:prstGeom>
+          <a:ln w="57150">
+            <a:solidFill>
+              <a:srgbClr val="FF0000"/>
+            </a:solidFill>
+          </a:ln>
+        </p:spPr>
+        <p:style>
+          <a:lnRef idx="1">
+            <a:schemeClr val="accent1"/>
+          </a:lnRef>
+          <a:fillRef idx="0">
+            <a:schemeClr val="accent1"/>
+          </a:fillRef>
+          <a:effectRef idx="0">
+            <a:schemeClr val="accent1"/>
+          </a:effectRef>
+          <a:fontRef idx="minor">
+            <a:schemeClr val="tx1"/>
+          </a:fontRef>
+        </p:style>
+      </p:cxnSp>
+      <p:cxnSp>
+        <p:nvCxnSpPr>
+          <p:cNvPr id="48" name="Straight Connector 47"/>
+          <p:cNvCxnSpPr/>
+          <p:nvPr/>
+        </p:nvCxnSpPr>
+        <p:spPr>
+          <a:xfrm>
+            <a:off x="1655134" y="1752600"/>
+            <a:ext cx="1691640" cy="0"/>
+          </a:xfrm>
+          <a:prstGeom prst="line">
+            <a:avLst/>
+          </a:prstGeom>
+          <a:ln w="57150">
+            <a:solidFill>
+              <a:schemeClr val="tx1"/>
+            </a:solidFill>
+          </a:ln>
+        </p:spPr>
+        <p:style>
+          <a:lnRef idx="1">
+            <a:schemeClr val="accent1"/>
+          </a:lnRef>
+          <a:fillRef idx="0">
+            <a:schemeClr val="accent1"/>
+          </a:fillRef>
+          <a:effectRef idx="0">
+            <a:schemeClr val="accent1"/>
+          </a:effectRef>
+          <a:fontRef idx="minor">
+            <a:schemeClr val="tx1"/>
+          </a:fontRef>
+        </p:style>
+      </p:cxnSp>
+      <p:cxnSp>
+        <p:nvCxnSpPr>
+          <p:cNvPr id="52" name="Straight Connector 51"/>
+          <p:cNvCxnSpPr/>
+          <p:nvPr/>
+        </p:nvCxnSpPr>
+        <p:spPr>
+          <a:xfrm flipV="1">
+            <a:off x="1676400" y="1752600"/>
+            <a:ext cx="0" cy="685800"/>
+          </a:xfrm>
+          <a:prstGeom prst="line">
+            <a:avLst/>
+          </a:prstGeom>
+          <a:ln w="57150">
+            <a:solidFill>
+              <a:schemeClr val="tx1"/>
+            </a:solidFill>
+          </a:ln>
+        </p:spPr>
+        <p:style>
+          <a:lnRef idx="1">
+            <a:schemeClr val="accent1"/>
+          </a:lnRef>
+          <a:fillRef idx="0">
+            <a:schemeClr val="accent1"/>
+          </a:fillRef>
+          <a:effectRef idx="0">
+            <a:schemeClr val="accent1"/>
+          </a:effectRef>
+          <a:fontRef idx="minor">
+            <a:schemeClr val="tx1"/>
+          </a:fontRef>
+        </p:style>
+      </p:cxnSp>
+      <p:cxnSp>
+        <p:nvCxnSpPr>
+          <p:cNvPr id="56" name="Straight Connector 55"/>
+          <p:cNvCxnSpPr/>
+          <p:nvPr/>
+        </p:nvCxnSpPr>
+        <p:spPr>
+          <a:xfrm flipV="1">
+            <a:off x="1676400" y="2286000"/>
+            <a:ext cx="0" cy="1752600"/>
+          </a:xfrm>
+          <a:prstGeom prst="line">
+            <a:avLst/>
+          </a:prstGeom>
+          <a:ln w="57150">
+            <a:solidFill>
+              <a:schemeClr val="tx1"/>
+            </a:solidFill>
+          </a:ln>
+        </p:spPr>
+        <p:style>
+          <a:lnRef idx="1">
+            <a:schemeClr val="accent1"/>
+          </a:lnRef>
+          <a:fillRef idx="0">
+            <a:schemeClr val="accent1"/>
+          </a:fillRef>
+          <a:effectRef idx="0">
+            <a:schemeClr val="accent1"/>
+          </a:effectRef>
+          <a:fontRef idx="minor">
+            <a:schemeClr val="tx1"/>
+          </a:fontRef>
+        </p:style>
+      </p:cxnSp>
+      <p:cxnSp>
+        <p:nvCxnSpPr>
+          <p:cNvPr id="58" name="Straight Connector 57"/>
+          <p:cNvCxnSpPr/>
+          <p:nvPr/>
+        </p:nvCxnSpPr>
+        <p:spPr>
+          <a:xfrm>
+            <a:off x="1295400" y="2286000"/>
+            <a:ext cx="0" cy="2057400"/>
+          </a:xfrm>
+          <a:prstGeom prst="line">
+            <a:avLst/>
+          </a:prstGeom>
+          <a:ln w="57150">
+            <a:solidFill>
+              <a:srgbClr val="FF0000"/>
+            </a:solidFill>
+          </a:ln>
+        </p:spPr>
+        <p:style>
+          <a:lnRef idx="1">
+            <a:schemeClr val="accent1"/>
+          </a:lnRef>
+          <a:fillRef idx="0">
+            <a:schemeClr val="accent1"/>
+          </a:fillRef>
+          <a:effectRef idx="0">
+            <a:schemeClr val="accent1"/>
+          </a:effectRef>
+          <a:fontRef idx="minor">
+            <a:schemeClr val="tx1"/>
+          </a:fontRef>
+        </p:style>
+      </p:cxnSp>
+      <p:cxnSp>
+        <p:nvCxnSpPr>
+          <p:cNvPr id="62" name="Straight Connector 61"/>
+          <p:cNvCxnSpPr/>
+          <p:nvPr/>
+        </p:nvCxnSpPr>
+        <p:spPr>
+          <a:xfrm>
+            <a:off x="1274133" y="4343400"/>
+            <a:ext cx="786384" cy="0"/>
+          </a:xfrm>
+          <a:prstGeom prst="line">
+            <a:avLst/>
+          </a:prstGeom>
+          <a:ln w="57150">
+            <a:solidFill>
+              <a:srgbClr val="FF0000"/>
+            </a:solidFill>
+          </a:ln>
+        </p:spPr>
+        <p:style>
+          <a:lnRef idx="1">
+            <a:schemeClr val="accent1"/>
+          </a:lnRef>
+          <a:fillRef idx="0">
+            <a:schemeClr val="accent1"/>
+          </a:fillRef>
+          <a:effectRef idx="0">
+            <a:schemeClr val="accent1"/>
+          </a:effectRef>
+          <a:fontRef idx="minor">
+            <a:schemeClr val="tx1"/>
+          </a:fontRef>
+        </p:style>
+      </p:cxnSp>
+      <p:cxnSp>
+        <p:nvCxnSpPr>
+          <p:cNvPr id="66" name="Straight Connector 65"/>
+          <p:cNvCxnSpPr/>
+          <p:nvPr/>
+        </p:nvCxnSpPr>
+        <p:spPr>
+          <a:xfrm>
+            <a:off x="1655133" y="4038600"/>
+            <a:ext cx="411480" cy="0"/>
+          </a:xfrm>
+          <a:prstGeom prst="line">
+            <a:avLst/>
+          </a:prstGeom>
+          <a:ln w="57150">
+            <a:solidFill>
+              <a:schemeClr val="tx1"/>
+            </a:solidFill>
+          </a:ln>
+        </p:spPr>
+        <p:style>
+          <a:lnRef idx="1">
+            <a:schemeClr val="accent1"/>
+          </a:lnRef>
+          <a:fillRef idx="0">
+            <a:schemeClr val="accent1"/>
+          </a:fillRef>
+          <a:effectRef idx="0">
+            <a:schemeClr val="accent1"/>
+          </a:effectRef>
+          <a:fontRef idx="minor">
+            <a:schemeClr val="tx1"/>
+          </a:fontRef>
+        </p:style>
+      </p:cxnSp>
+      <p:cxnSp>
+        <p:nvCxnSpPr>
+          <p:cNvPr id="68" name="Straight Connector 67"/>
+          <p:cNvCxnSpPr/>
+          <p:nvPr/>
+        </p:nvCxnSpPr>
+        <p:spPr>
+          <a:xfrm>
+            <a:off x="1676400" y="3124200"/>
+            <a:ext cx="411480" cy="0"/>
+          </a:xfrm>
+          <a:prstGeom prst="line">
+            <a:avLst/>
+          </a:prstGeom>
+          <a:ln w="57150">
+            <a:solidFill>
+              <a:schemeClr val="tx1"/>
+            </a:solidFill>
+          </a:ln>
+        </p:spPr>
+        <p:style>
+          <a:lnRef idx="1">
+            <a:schemeClr val="accent1"/>
+          </a:lnRef>
+          <a:fillRef idx="0">
+            <a:schemeClr val="accent1"/>
+          </a:fillRef>
+          <a:effectRef idx="0">
+            <a:schemeClr val="accent1"/>
+          </a:effectRef>
+          <a:fontRef idx="minor">
+            <a:schemeClr val="tx1"/>
+          </a:fontRef>
+        </p:style>
+      </p:cxnSp>
+      <p:cxnSp>
+        <p:nvCxnSpPr>
+          <p:cNvPr id="69" name="Straight Connector 68"/>
+          <p:cNvCxnSpPr/>
+          <p:nvPr/>
+        </p:nvCxnSpPr>
+        <p:spPr>
+          <a:xfrm>
+            <a:off x="1295400" y="3429000"/>
+            <a:ext cx="786384" cy="0"/>
+          </a:xfrm>
+          <a:prstGeom prst="line">
+            <a:avLst/>
+          </a:prstGeom>
+          <a:ln w="57150">
+            <a:solidFill>
+              <a:srgbClr val="FF0000"/>
+            </a:solidFill>
+          </a:ln>
+        </p:spPr>
+        <p:style>
+          <a:lnRef idx="1">
+            <a:schemeClr val="accent1"/>
+          </a:lnRef>
+          <a:fillRef idx="0">
+            <a:schemeClr val="accent1"/>
+          </a:fillRef>
+          <a:effectRef idx="0">
+            <a:schemeClr val="accent1"/>
+          </a:effectRef>
+          <a:fontRef idx="minor">
+            <a:schemeClr val="tx1"/>
+          </a:fontRef>
+        </p:style>
+      </p:cxnSp>
+      <p:sp>
+        <p:nvSpPr>
+          <p:cNvPr id="70" name="TextBox 69"/>
+          <p:cNvSpPr txBox="1"/>
+          <p:nvPr/>
+        </p:nvSpPr>
+        <p:spPr>
+          <a:xfrm>
+            <a:off x="6553200" y="1066800"/>
+            <a:ext cx="1511776" cy="369332"/>
+          </a:xfrm>
+          <a:prstGeom prst="rect">
+            <a:avLst/>
+          </a:prstGeom>
+          <a:noFill/>
+        </p:spPr>
+        <p:txBody>
+          <a:bodyPr wrap="square" rtlCol="0">
+            <a:spAutoFit/>
+          </a:bodyPr>
+          <a:lstStyle/>
+          <a:p>
+            <a:r>
+              <a:rPr lang="en-US" dirty="0" smtClean="0">
+                <a:solidFill>
+                  <a:schemeClr val="bg1"/>
+                </a:solidFill>
+                <a:latin typeface="Times New Roman" panose="02020603050405020304" pitchFamily="18" charset="0"/>
+                <a:cs typeface="Times New Roman" panose="02020603050405020304" pitchFamily="18" charset="0"/>
+              </a:rPr>
+              <a:t>5 V, 2.5 Amps</a:t>
+            </a:r>
+            <a:endParaRPr lang="en-US" dirty="0">
+              <a:solidFill>
+                <a:schemeClr val="bg1"/>
+              </a:solidFill>
+              <a:latin typeface="Times New Roman" panose="02020603050405020304" pitchFamily="18" charset="0"/>
+              <a:cs typeface="Times New Roman" panose="02020603050405020304" pitchFamily="18" charset="0"/>
+            </a:endParaRPr>
+          </a:p>
+        </p:txBody>
+      </p:sp>
+      <p:sp>
+        <p:nvSpPr>
+          <p:cNvPr id="71" name="TextBox 70"/>
+          <p:cNvSpPr txBox="1"/>
+          <p:nvPr/>
+        </p:nvSpPr>
+        <p:spPr>
+          <a:xfrm>
+            <a:off x="6717824" y="1764268"/>
+            <a:ext cx="1359376" cy="369332"/>
+          </a:xfrm>
+          <a:prstGeom prst="rect">
+            <a:avLst/>
+          </a:prstGeom>
+          <a:noFill/>
+        </p:spPr>
+        <p:txBody>
+          <a:bodyPr wrap="square" rtlCol="0">
+            <a:spAutoFit/>
+          </a:bodyPr>
+          <a:lstStyle/>
+          <a:p>
+            <a:r>
+              <a:rPr lang="en-US" dirty="0" smtClean="0">
+                <a:solidFill>
+                  <a:schemeClr val="bg1"/>
+                </a:solidFill>
+                <a:latin typeface="Times New Roman" panose="02020603050405020304" pitchFamily="18" charset="0"/>
+                <a:cs typeface="Times New Roman" panose="02020603050405020304" pitchFamily="18" charset="0"/>
+              </a:rPr>
+              <a:t>GND</a:t>
+            </a:r>
+            <a:endParaRPr lang="en-US" dirty="0">
+              <a:solidFill>
+                <a:schemeClr val="bg1"/>
+              </a:solidFill>
+              <a:latin typeface="Times New Roman" panose="02020603050405020304" pitchFamily="18" charset="0"/>
+              <a:cs typeface="Times New Roman" panose="02020603050405020304" pitchFamily="18" charset="0"/>
+            </a:endParaRPr>
+          </a:p>
+        </p:txBody>
+      </p:sp>
+      <p:grpSp>
+        <p:nvGrpSpPr>
+          <p:cNvPr id="72" name="Group 71"/>
+          <p:cNvGrpSpPr/>
+          <p:nvPr/>
+        </p:nvGrpSpPr>
+        <p:grpSpPr>
+          <a:xfrm>
+            <a:off x="7010400" y="5029200"/>
+            <a:ext cx="990600" cy="838200"/>
+            <a:chOff x="381000" y="304800"/>
+            <a:chExt cx="7307580" cy="6248400"/>
+          </a:xfrm>
+        </p:grpSpPr>
+        <p:sp>
+          <p:nvSpPr>
+            <p:cNvPr id="73" name="Rectangle 72"/>
+            <p:cNvSpPr/>
+            <p:nvPr/>
+          </p:nvSpPr>
+          <p:spPr>
+            <a:xfrm>
+              <a:off x="381000" y="304800"/>
+              <a:ext cx="7307580" cy="6248400"/>
+            </a:xfrm>
+            <a:prstGeom prst="rect">
+              <a:avLst/>
+            </a:prstGeom>
+            <a:solidFill>
+              <a:schemeClr val="tx2">
+                <a:lumMod val="75000"/>
+              </a:schemeClr>
+            </a:solidFill>
+            <a:ln w="19050">
+              <a:solidFill>
+                <a:schemeClr val="tx1"/>
+              </a:solidFill>
+            </a:ln>
+          </p:spPr>
+          <p:style>
+            <a:lnRef idx="2">
+              <a:schemeClr val="accent1">
+                <a:shade val="50000"/>
+              </a:schemeClr>
+            </a:lnRef>
+            <a:fillRef idx="1">
+              <a:schemeClr val="accent1"/>
+            </a:fillRef>
+            <a:effectRef idx="0">
+              <a:schemeClr val="accent1"/>
+            </a:effectRef>
+            <a:fontRef idx="minor">
+              <a:schemeClr val="lt1"/>
+            </a:fontRef>
+          </p:style>
+          <p:txBody>
+            <a:bodyPr rtlCol="0" anchor="ctr"/>
+            <a:lstStyle/>
+            <a:p>
+              <a:pPr algn="ctr"/>
+              <a:r>
+                <a:rPr lang="en-US" dirty="0" smtClean="0">
+                  <a:latin typeface="Times New Roman" pitchFamily="18" charset="0"/>
+                  <a:cs typeface="Times New Roman" pitchFamily="18" charset="0"/>
+                </a:rPr>
+                <a:t>Colony-II</a:t>
+              </a:r>
+              <a:endParaRPr lang="en-US" dirty="0">
+                <a:latin typeface="Times New Roman" pitchFamily="18" charset="0"/>
+                <a:cs typeface="Times New Roman" pitchFamily="18" charset="0"/>
+              </a:endParaRPr>
+            </a:p>
+          </p:txBody>
+        </p:sp>
+        <p:sp>
+          <p:nvSpPr>
+            <p:cNvPr id="74" name="TextBox 73"/>
+            <p:cNvSpPr txBox="1"/>
+            <p:nvPr/>
+          </p:nvSpPr>
+          <p:spPr>
+            <a:xfrm>
+              <a:off x="381000" y="304800"/>
+              <a:ext cx="4001767" cy="2753202"/>
+            </a:xfrm>
+            <a:prstGeom prst="rect">
+              <a:avLst/>
+            </a:prstGeom>
+            <a:noFill/>
+          </p:spPr>
+          <p:txBody>
+            <a:bodyPr wrap="square" rtlCol="0">
+              <a:spAutoFit/>
+            </a:bodyPr>
+            <a:lstStyle/>
+            <a:p>
+              <a:endParaRPr lang="en-US" dirty="0">
+                <a:solidFill>
+                  <a:schemeClr val="bg1"/>
+                </a:solidFill>
+                <a:latin typeface="Times New Roman" panose="02020603050405020304" pitchFamily="18" charset="0"/>
+                <a:cs typeface="Times New Roman" panose="02020603050405020304" pitchFamily="18" charset="0"/>
+              </a:endParaRPr>
+            </a:p>
+          </p:txBody>
+        </p:sp>
+      </p:grpSp>
+      <p:sp>
+        <p:nvSpPr>
+          <p:cNvPr id="89" name="Rectangle 88"/>
+          <p:cNvSpPr/>
+          <p:nvPr/>
+        </p:nvSpPr>
+        <p:spPr>
+          <a:xfrm>
+            <a:off x="7696200" y="4953000"/>
+            <a:ext cx="142565" cy="152400"/>
+          </a:xfrm>
+          <a:prstGeom prst="rect">
+            <a:avLst/>
+          </a:prstGeom>
+          <a:solidFill>
+            <a:srgbClr val="FF0000"/>
+          </a:solidFill>
+          <a:ln>
+            <a:solidFill>
+              <a:schemeClr val="tx1"/>
+            </a:solidFill>
+          </a:ln>
+        </p:spPr>
+        <p:style>
+          <a:lnRef idx="2">
+            <a:schemeClr val="accent1">
+              <a:shade val="50000"/>
+            </a:schemeClr>
+          </a:lnRef>
+          <a:fillRef idx="1">
+            <a:schemeClr val="accent1"/>
+          </a:fillRef>
+          <a:effectRef idx="0">
+            <a:schemeClr val="accent1"/>
+          </a:effectRef>
+          <a:fontRef idx="minor">
+            <a:schemeClr val="lt1"/>
+          </a:fontRef>
+        </p:style>
+        <p:txBody>
+          <a:bodyPr rtlCol="0" anchor="ctr"/>
+          <a:lstStyle/>
+          <a:p>
+            <a:pPr algn="ctr"/>
+            <a:endParaRPr lang="en-US"/>
+          </a:p>
+        </p:txBody>
+      </p:sp>
+      <p:sp>
+        <p:nvSpPr>
+          <p:cNvPr id="90" name="Rectangle 89"/>
+          <p:cNvSpPr/>
+          <p:nvPr/>
+        </p:nvSpPr>
+        <p:spPr>
+          <a:xfrm>
+            <a:off x="7425068" y="4953000"/>
+            <a:ext cx="142565" cy="152400"/>
+          </a:xfrm>
+          <a:prstGeom prst="rect">
+            <a:avLst/>
+          </a:prstGeom>
+          <a:solidFill>
+            <a:schemeClr val="tx1">
+              <a:lumMod val="85000"/>
+              <a:lumOff val="15000"/>
+            </a:schemeClr>
+          </a:solidFill>
+          <a:ln>
+            <a:solidFill>
+              <a:schemeClr val="tx1"/>
+            </a:solidFill>
+          </a:ln>
+        </p:spPr>
+        <p:style>
+          <a:lnRef idx="2">
+            <a:schemeClr val="accent1">
+              <a:shade val="50000"/>
+            </a:schemeClr>
+          </a:lnRef>
+          <a:fillRef idx="1">
+            <a:schemeClr val="accent1"/>
+          </a:fillRef>
+          <a:effectRef idx="0">
+            <a:schemeClr val="accent1"/>
+          </a:effectRef>
+          <a:fontRef idx="minor">
+            <a:schemeClr val="lt1"/>
+          </a:fontRef>
+        </p:style>
+        <p:txBody>
+          <a:bodyPr rtlCol="0" anchor="ctr"/>
+          <a:lstStyle/>
+          <a:p>
+            <a:pPr algn="ctr"/>
+            <a:endParaRPr lang="en-US"/>
+          </a:p>
+        </p:txBody>
+      </p:sp>
+      <p:grpSp>
+        <p:nvGrpSpPr>
+          <p:cNvPr id="91" name="Group 90"/>
+          <p:cNvGrpSpPr/>
+          <p:nvPr/>
+        </p:nvGrpSpPr>
+        <p:grpSpPr>
+          <a:xfrm>
+            <a:off x="6553200" y="2590800"/>
+            <a:ext cx="1524000" cy="1676400"/>
+            <a:chOff x="381000" y="304800"/>
+            <a:chExt cx="7307580" cy="6248400"/>
+          </a:xfrm>
+        </p:grpSpPr>
+        <p:sp>
+          <p:nvSpPr>
+            <p:cNvPr id="92" name="Rectangle 91"/>
+            <p:cNvSpPr/>
+            <p:nvPr/>
+          </p:nvSpPr>
+          <p:spPr>
+            <a:xfrm>
+              <a:off x="381000" y="304800"/>
+              <a:ext cx="7307580" cy="6248400"/>
+            </a:xfrm>
+            <a:prstGeom prst="rect">
+              <a:avLst/>
+            </a:prstGeom>
+            <a:solidFill>
+              <a:schemeClr val="tx2">
+                <a:lumMod val="60000"/>
+                <a:lumOff val="40000"/>
+              </a:schemeClr>
+            </a:solidFill>
+            <a:ln w="38100">
+              <a:solidFill>
+                <a:schemeClr val="tx2">
+                  <a:lumMod val="40000"/>
+                  <a:lumOff val="60000"/>
+                </a:schemeClr>
+              </a:solidFill>
+            </a:ln>
+          </p:spPr>
+          <p:style>
+            <a:lnRef idx="2">
+              <a:schemeClr val="accent1">
+                <a:shade val="50000"/>
+              </a:schemeClr>
+            </a:lnRef>
+            <a:fillRef idx="1">
+              <a:schemeClr val="accent1"/>
+            </a:fillRef>
+            <a:effectRef idx="0">
+              <a:schemeClr val="accent1"/>
+            </a:effectRef>
+            <a:fontRef idx="minor">
+              <a:schemeClr val="lt1"/>
+            </a:fontRef>
+          </p:style>
+          <p:txBody>
+            <a:bodyPr rtlCol="0" anchor="ctr"/>
+            <a:lstStyle/>
+            <a:p>
+              <a:pPr algn="ctr"/>
+              <a:endParaRPr lang="en-US"/>
+            </a:p>
+          </p:txBody>
+        </p:sp>
+        <p:sp>
+          <p:nvSpPr>
+            <p:cNvPr id="93" name="TextBox 92"/>
+            <p:cNvSpPr txBox="1"/>
+            <p:nvPr/>
+          </p:nvSpPr>
+          <p:spPr>
+            <a:xfrm>
+              <a:off x="381000" y="304800"/>
+              <a:ext cx="4697730" cy="1376601"/>
+            </a:xfrm>
+            <a:prstGeom prst="rect">
+              <a:avLst/>
+            </a:prstGeom>
+            <a:noFill/>
+          </p:spPr>
+          <p:txBody>
+            <a:bodyPr wrap="square" rtlCol="0">
+              <a:spAutoFit/>
+            </a:bodyPr>
+            <a:lstStyle/>
+            <a:p>
+              <a:r>
+                <a:rPr lang="en-US" dirty="0" smtClean="0">
+                  <a:solidFill>
+                    <a:schemeClr val="bg1"/>
+                  </a:solidFill>
+                  <a:latin typeface="Times New Roman" panose="02020603050405020304" pitchFamily="18" charset="0"/>
+                  <a:cs typeface="Times New Roman" panose="02020603050405020304" pitchFamily="18" charset="0"/>
+                </a:rPr>
+                <a:t>CDH</a:t>
+              </a:r>
+              <a:endParaRPr lang="en-US" dirty="0">
+                <a:solidFill>
+                  <a:schemeClr val="bg1"/>
+                </a:solidFill>
+                <a:latin typeface="Times New Roman" panose="02020603050405020304" pitchFamily="18" charset="0"/>
+                <a:cs typeface="Times New Roman" panose="02020603050405020304" pitchFamily="18" charset="0"/>
+              </a:endParaRPr>
+            </a:p>
+          </p:txBody>
+        </p:sp>
+      </p:grpSp>
+      <p:sp>
+        <p:nvSpPr>
+          <p:cNvPr id="96" name="Rectangle 95"/>
+          <p:cNvSpPr/>
+          <p:nvPr/>
+        </p:nvSpPr>
+        <p:spPr>
+          <a:xfrm>
+            <a:off x="7696200" y="4191000"/>
+            <a:ext cx="142565" cy="152400"/>
+          </a:xfrm>
+          <a:prstGeom prst="rect">
+            <a:avLst/>
+          </a:prstGeom>
+          <a:solidFill>
+            <a:srgbClr val="FF0000"/>
+          </a:solidFill>
+          <a:ln>
+            <a:solidFill>
+              <a:schemeClr val="tx1"/>
+            </a:solidFill>
+          </a:ln>
+        </p:spPr>
+        <p:style>
+          <a:lnRef idx="2">
+            <a:schemeClr val="accent1">
+              <a:shade val="50000"/>
+            </a:schemeClr>
+          </a:lnRef>
+          <a:fillRef idx="1">
+            <a:schemeClr val="accent1"/>
+          </a:fillRef>
+          <a:effectRef idx="0">
+            <a:schemeClr val="accent1"/>
+          </a:effectRef>
+          <a:fontRef idx="minor">
+            <a:schemeClr val="lt1"/>
+          </a:fontRef>
+        </p:style>
+        <p:txBody>
+          <a:bodyPr rtlCol="0" anchor="ctr"/>
+          <a:lstStyle/>
+          <a:p>
+            <a:pPr algn="ctr"/>
+            <a:endParaRPr lang="en-US"/>
+          </a:p>
+        </p:txBody>
+      </p:sp>
+      <p:sp>
+        <p:nvSpPr>
+          <p:cNvPr id="97" name="Rectangle 96"/>
+          <p:cNvSpPr/>
+          <p:nvPr/>
+        </p:nvSpPr>
+        <p:spPr>
+          <a:xfrm>
+            <a:off x="7414435" y="4191000"/>
+            <a:ext cx="142565" cy="152400"/>
+          </a:xfrm>
+          <a:prstGeom prst="rect">
+            <a:avLst/>
+          </a:prstGeom>
+          <a:solidFill>
+            <a:schemeClr val="tx1">
+              <a:lumMod val="85000"/>
+              <a:lumOff val="15000"/>
+            </a:schemeClr>
+          </a:solidFill>
+          <a:ln>
+            <a:solidFill>
+              <a:schemeClr val="tx1"/>
+            </a:solidFill>
+          </a:ln>
+        </p:spPr>
+        <p:style>
+          <a:lnRef idx="2">
+            <a:schemeClr val="accent1">
+              <a:shade val="50000"/>
+            </a:schemeClr>
+          </a:lnRef>
+          <a:fillRef idx="1">
+            <a:schemeClr val="accent1"/>
+          </a:fillRef>
+          <a:effectRef idx="0">
+            <a:schemeClr val="accent1"/>
+          </a:effectRef>
+          <a:fontRef idx="minor">
+            <a:schemeClr val="lt1"/>
+          </a:fontRef>
+        </p:style>
+        <p:txBody>
+          <a:bodyPr rtlCol="0" anchor="ctr"/>
+          <a:lstStyle/>
+          <a:p>
+            <a:pPr algn="ctr"/>
+            <a:endParaRPr lang="en-US"/>
+          </a:p>
+        </p:txBody>
+      </p:sp>
+      <p:sp>
+        <p:nvSpPr>
+          <p:cNvPr id="98" name="Rectangle 97"/>
+          <p:cNvSpPr/>
+          <p:nvPr/>
+        </p:nvSpPr>
+        <p:spPr>
+          <a:xfrm>
+            <a:off x="7696200" y="2514600"/>
+            <a:ext cx="142565" cy="152400"/>
+          </a:xfrm>
+          <a:prstGeom prst="rect">
+            <a:avLst/>
+          </a:prstGeom>
+          <a:solidFill>
+            <a:srgbClr val="FF0000"/>
+          </a:solidFill>
+          <a:ln>
+            <a:solidFill>
+              <a:schemeClr val="tx1"/>
+            </a:solidFill>
+          </a:ln>
+        </p:spPr>
+        <p:style>
+          <a:lnRef idx="2">
+            <a:schemeClr val="accent1">
+              <a:shade val="50000"/>
+            </a:schemeClr>
+          </a:lnRef>
+          <a:fillRef idx="1">
+            <a:schemeClr val="accent1"/>
+          </a:fillRef>
+          <a:effectRef idx="0">
+            <a:schemeClr val="accent1"/>
+          </a:effectRef>
+          <a:fontRef idx="minor">
+            <a:schemeClr val="lt1"/>
+          </a:fontRef>
+        </p:style>
+        <p:txBody>
+          <a:bodyPr rtlCol="0" anchor="ctr"/>
+          <a:lstStyle/>
+          <a:p>
+            <a:pPr algn="ctr"/>
+            <a:endParaRPr lang="en-US"/>
+          </a:p>
+        </p:txBody>
+      </p:sp>
+      <p:sp>
+        <p:nvSpPr>
+          <p:cNvPr id="99" name="Rectangle 98"/>
+          <p:cNvSpPr/>
+          <p:nvPr/>
+        </p:nvSpPr>
+        <p:spPr>
+          <a:xfrm>
+            <a:off x="7410897" y="2514600"/>
+            <a:ext cx="142565" cy="152400"/>
+          </a:xfrm>
+          <a:prstGeom prst="rect">
+            <a:avLst/>
+          </a:prstGeom>
+          <a:solidFill>
+            <a:schemeClr val="tx1">
+              <a:lumMod val="85000"/>
+              <a:lumOff val="15000"/>
+            </a:schemeClr>
+          </a:solidFill>
+          <a:ln>
+            <a:solidFill>
+              <a:schemeClr val="tx1"/>
+            </a:solidFill>
+          </a:ln>
+        </p:spPr>
+        <p:style>
+          <a:lnRef idx="2">
+            <a:schemeClr val="accent1">
+              <a:shade val="50000"/>
+            </a:schemeClr>
+          </a:lnRef>
+          <a:fillRef idx="1">
+            <a:schemeClr val="accent1"/>
+          </a:fillRef>
+          <a:effectRef idx="0">
+            <a:schemeClr val="accent1"/>
+          </a:effectRef>
+          <a:fontRef idx="minor">
+            <a:schemeClr val="lt1"/>
+          </a:fontRef>
+        </p:style>
+        <p:txBody>
+          <a:bodyPr rtlCol="0" anchor="ctr"/>
+          <a:lstStyle/>
+          <a:p>
+            <a:pPr algn="ctr"/>
+            <a:endParaRPr lang="en-US"/>
+          </a:p>
+        </p:txBody>
+      </p:sp>
+      <p:sp>
+        <p:nvSpPr>
+          <p:cNvPr id="102" name="Rectangle 101"/>
+          <p:cNvSpPr/>
+          <p:nvPr/>
+        </p:nvSpPr>
+        <p:spPr>
+          <a:xfrm>
+            <a:off x="3505200" y="2895600"/>
+            <a:ext cx="1784499" cy="685800"/>
+          </a:xfrm>
+          <a:prstGeom prst="rect">
+            <a:avLst/>
+          </a:prstGeom>
+          <a:solidFill>
+            <a:schemeClr val="tx1">
+              <a:lumMod val="75000"/>
+              <a:lumOff val="25000"/>
+            </a:schemeClr>
+          </a:solidFill>
+          <a:ln>
+            <a:solidFill>
+              <a:schemeClr val="tx1"/>
+            </a:solidFill>
+          </a:ln>
+        </p:spPr>
+        <p:style>
+          <a:lnRef idx="2">
+            <a:schemeClr val="accent1">
+              <a:shade val="50000"/>
+            </a:schemeClr>
+          </a:lnRef>
+          <a:fillRef idx="1">
+            <a:schemeClr val="accent1"/>
+          </a:fillRef>
+          <a:effectRef idx="0">
+            <a:schemeClr val="accent1"/>
+          </a:effectRef>
+          <a:fontRef idx="minor">
+            <a:schemeClr val="lt1"/>
+          </a:fontRef>
+        </p:style>
+        <p:txBody>
+          <a:bodyPr rtlCol="0" anchor="ctr"/>
+          <a:lstStyle/>
+          <a:p>
+            <a:pPr algn="ctr"/>
+            <a:r>
+              <a:rPr lang="en-US" sz="1600" dirty="0" smtClean="0">
+                <a:latin typeface="Times New Roman" panose="02020603050405020304" pitchFamily="18" charset="0"/>
+                <a:cs typeface="Times New Roman" panose="02020603050405020304" pitchFamily="18" charset="0"/>
+              </a:rPr>
+              <a:t>Solenoid  Attachment</a:t>
+            </a:r>
+            <a:endParaRPr lang="en-US" sz="1600" dirty="0">
+              <a:latin typeface="Times New Roman" panose="02020603050405020304" pitchFamily="18" charset="0"/>
+              <a:cs typeface="Times New Roman" panose="02020603050405020304" pitchFamily="18" charset="0"/>
+            </a:endParaRPr>
+          </a:p>
+        </p:txBody>
+      </p:sp>
+      <p:sp>
+        <p:nvSpPr>
+          <p:cNvPr id="103" name="Rectangle 102"/>
+          <p:cNvSpPr/>
+          <p:nvPr/>
+        </p:nvSpPr>
+        <p:spPr>
+          <a:xfrm>
+            <a:off x="3505200" y="3810000"/>
+            <a:ext cx="1784499" cy="685800"/>
+          </a:xfrm>
+          <a:prstGeom prst="rect">
+            <a:avLst/>
+          </a:prstGeom>
+          <a:solidFill>
+            <a:schemeClr val="tx1">
+              <a:lumMod val="75000"/>
+              <a:lumOff val="25000"/>
+            </a:schemeClr>
+          </a:solidFill>
+          <a:ln>
+            <a:solidFill>
+              <a:schemeClr val="tx1"/>
+            </a:solidFill>
+          </a:ln>
+        </p:spPr>
+        <p:style>
+          <a:lnRef idx="2">
+            <a:schemeClr val="accent1">
+              <a:shade val="50000"/>
+            </a:schemeClr>
+          </a:lnRef>
+          <a:fillRef idx="1">
+            <a:schemeClr val="accent1"/>
+          </a:fillRef>
+          <a:effectRef idx="0">
+            <a:schemeClr val="accent1"/>
+          </a:effectRef>
+          <a:fontRef idx="minor">
+            <a:schemeClr val="lt1"/>
+          </a:fontRef>
+        </p:style>
+        <p:txBody>
+          <a:bodyPr rtlCol="0" anchor="ctr"/>
+          <a:lstStyle/>
+          <a:p>
+            <a:pPr algn="ctr"/>
+            <a:r>
+              <a:rPr lang="en-US" sz="1600" dirty="0" smtClean="0">
+                <a:latin typeface="Times New Roman" panose="02020603050405020304" pitchFamily="18" charset="0"/>
+                <a:cs typeface="Times New Roman" panose="02020603050405020304" pitchFamily="18" charset="0"/>
+              </a:rPr>
+              <a:t>Solenoid Attachment</a:t>
+            </a:r>
+            <a:endParaRPr lang="en-US" sz="1600" dirty="0">
+              <a:latin typeface="Times New Roman" panose="02020603050405020304" pitchFamily="18" charset="0"/>
+              <a:cs typeface="Times New Roman" panose="02020603050405020304" pitchFamily="18" charset="0"/>
+            </a:endParaRPr>
+          </a:p>
+        </p:txBody>
+      </p:sp>
+      <p:cxnSp>
+        <p:nvCxnSpPr>
+          <p:cNvPr id="104" name="Straight Connector 103"/>
+          <p:cNvCxnSpPr>
+            <a:stCxn id="31" idx="3"/>
+            <a:endCxn id="102" idx="1"/>
+          </p:cNvCxnSpPr>
+          <p:nvPr/>
+        </p:nvCxnSpPr>
+        <p:spPr>
+          <a:xfrm>
+            <a:off x="3048000" y="3238500"/>
+            <a:ext cx="457200" cy="0"/>
+          </a:xfrm>
+          <a:prstGeom prst="line">
+            <a:avLst/>
+          </a:prstGeom>
+          <a:ln w="88900">
+            <a:solidFill>
+              <a:schemeClr val="accent6">
+                <a:lumMod val="75000"/>
+              </a:schemeClr>
+            </a:solidFill>
+          </a:ln>
+        </p:spPr>
+        <p:style>
+          <a:lnRef idx="1">
+            <a:schemeClr val="accent1"/>
+          </a:lnRef>
+          <a:fillRef idx="0">
+            <a:schemeClr val="accent1"/>
+          </a:fillRef>
+          <a:effectRef idx="0">
+            <a:schemeClr val="accent1"/>
+          </a:effectRef>
+          <a:fontRef idx="minor">
+            <a:schemeClr val="tx1"/>
+          </a:fontRef>
+        </p:style>
+      </p:cxnSp>
+      <p:cxnSp>
+        <p:nvCxnSpPr>
+          <p:cNvPr id="107" name="Straight Connector 106"/>
+          <p:cNvCxnSpPr>
+            <a:stCxn id="40" idx="3"/>
+            <a:endCxn id="103" idx="1"/>
+          </p:cNvCxnSpPr>
+          <p:nvPr/>
+        </p:nvCxnSpPr>
+        <p:spPr>
+          <a:xfrm>
+            <a:off x="3048000" y="4152900"/>
+            <a:ext cx="457200" cy="0"/>
+          </a:xfrm>
+          <a:prstGeom prst="line">
+            <a:avLst/>
+          </a:prstGeom>
+          <a:ln w="88900">
+            <a:solidFill>
+              <a:schemeClr val="accent6">
+                <a:lumMod val="75000"/>
+              </a:schemeClr>
+            </a:solidFill>
+          </a:ln>
+        </p:spPr>
+        <p:style>
+          <a:lnRef idx="1">
+            <a:schemeClr val="accent1"/>
+          </a:lnRef>
+          <a:fillRef idx="0">
+            <a:schemeClr val="accent1"/>
+          </a:fillRef>
+          <a:effectRef idx="0">
+            <a:schemeClr val="accent1"/>
+          </a:effectRef>
+          <a:fontRef idx="minor">
+            <a:schemeClr val="tx1"/>
+          </a:fontRef>
+        </p:style>
+      </p:cxnSp>
+      <p:sp>
+        <p:nvSpPr>
+          <p:cNvPr id="110" name="Rectangle 109"/>
+          <p:cNvSpPr/>
+          <p:nvPr/>
+        </p:nvSpPr>
+        <p:spPr>
+          <a:xfrm>
+            <a:off x="2819400" y="2362200"/>
+            <a:ext cx="762000" cy="457200"/>
+          </a:xfrm>
+          <a:prstGeom prst="rect">
+            <a:avLst/>
+          </a:prstGeom>
+          <a:solidFill>
+            <a:schemeClr val="bg2">
+              <a:lumMod val="10000"/>
+            </a:schemeClr>
+          </a:solidFill>
+          <a:ln>
+            <a:solidFill>
+              <a:schemeClr val="tx1"/>
+            </a:solidFill>
+          </a:ln>
+        </p:spPr>
+        <p:style>
+          <a:lnRef idx="2">
+            <a:schemeClr val="accent1">
+              <a:shade val="50000"/>
+            </a:schemeClr>
+          </a:lnRef>
+          <a:fillRef idx="1">
+            <a:schemeClr val="accent1"/>
+          </a:fillRef>
+          <a:effectRef idx="0">
+            <a:schemeClr val="accent1"/>
+          </a:effectRef>
+          <a:fontRef idx="minor">
+            <a:schemeClr val="lt1"/>
+          </a:fontRef>
+        </p:style>
+        <p:txBody>
+          <a:bodyPr rtlCol="0" anchor="ctr"/>
+          <a:lstStyle/>
+          <a:p>
+            <a:pPr algn="ctr"/>
+            <a:r>
+              <a:rPr lang="en-US" sz="1600" dirty="0" smtClean="0">
+                <a:latin typeface="Times New Roman" panose="02020603050405020304" pitchFamily="18" charset="0"/>
+                <a:cs typeface="Times New Roman" panose="02020603050405020304" pitchFamily="18" charset="0"/>
+              </a:rPr>
+              <a:t>Spring</a:t>
+            </a:r>
+            <a:endParaRPr lang="en-US" sz="1600" dirty="0">
+              <a:latin typeface="Times New Roman" panose="02020603050405020304" pitchFamily="18" charset="0"/>
+              <a:cs typeface="Times New Roman" panose="02020603050405020304" pitchFamily="18" charset="0"/>
+            </a:endParaRPr>
+          </a:p>
+        </p:txBody>
+      </p:sp>
+      <p:sp>
+        <p:nvSpPr>
+          <p:cNvPr id="111" name="Rectangle 110"/>
+          <p:cNvSpPr/>
+          <p:nvPr/>
+        </p:nvSpPr>
+        <p:spPr>
+          <a:xfrm>
+            <a:off x="2819400" y="4648200"/>
+            <a:ext cx="762000" cy="457200"/>
+          </a:xfrm>
+          <a:prstGeom prst="rect">
+            <a:avLst/>
+          </a:prstGeom>
+          <a:solidFill>
+            <a:schemeClr val="bg2">
+              <a:lumMod val="10000"/>
+            </a:schemeClr>
+          </a:solidFill>
+          <a:ln>
+            <a:solidFill>
+              <a:schemeClr val="tx1"/>
+            </a:solidFill>
+          </a:ln>
+        </p:spPr>
+        <p:style>
+          <a:lnRef idx="2">
+            <a:schemeClr val="accent1">
+              <a:shade val="50000"/>
+            </a:schemeClr>
+          </a:lnRef>
+          <a:fillRef idx="1">
+            <a:schemeClr val="accent1"/>
+          </a:fillRef>
+          <a:effectRef idx="0">
+            <a:schemeClr val="accent1"/>
+          </a:effectRef>
+          <a:fontRef idx="minor">
+            <a:schemeClr val="lt1"/>
+          </a:fontRef>
+        </p:style>
+        <p:txBody>
+          <a:bodyPr rtlCol="0" anchor="ctr"/>
+          <a:lstStyle/>
+          <a:p>
+            <a:pPr algn="ctr"/>
+            <a:r>
+              <a:rPr lang="en-US" sz="1600" dirty="0" smtClean="0">
+                <a:latin typeface="Times New Roman" panose="02020603050405020304" pitchFamily="18" charset="0"/>
+                <a:cs typeface="Times New Roman" panose="02020603050405020304" pitchFamily="18" charset="0"/>
+              </a:rPr>
+              <a:t>Spring</a:t>
+            </a:r>
+            <a:endParaRPr lang="en-US" sz="1600" dirty="0">
+              <a:latin typeface="Times New Roman" panose="02020603050405020304" pitchFamily="18" charset="0"/>
+              <a:cs typeface="Times New Roman" panose="02020603050405020304" pitchFamily="18" charset="0"/>
+            </a:endParaRPr>
+          </a:p>
+        </p:txBody>
+      </p:sp>
+      <p:cxnSp>
+        <p:nvCxnSpPr>
+          <p:cNvPr id="112" name="Straight Connector 111"/>
+          <p:cNvCxnSpPr/>
+          <p:nvPr/>
+        </p:nvCxnSpPr>
+        <p:spPr>
+          <a:xfrm>
+            <a:off x="7162800" y="4267200"/>
+            <a:ext cx="0" cy="762000"/>
+          </a:xfrm>
+          <a:prstGeom prst="line">
+            <a:avLst/>
+          </a:prstGeom>
+          <a:ln w="57150">
+            <a:solidFill>
+              <a:srgbClr val="FFC000"/>
+            </a:solidFill>
+          </a:ln>
+        </p:spPr>
+        <p:style>
+          <a:lnRef idx="1">
+            <a:schemeClr val="accent1"/>
+          </a:lnRef>
+          <a:fillRef idx="0">
+            <a:schemeClr val="accent1"/>
+          </a:fillRef>
+          <a:effectRef idx="0">
+            <a:schemeClr val="accent1"/>
+          </a:effectRef>
+          <a:fontRef idx="minor">
+            <a:schemeClr val="tx1"/>
+          </a:fontRef>
+        </p:style>
+      </p:cxnSp>
+      <p:sp>
+        <p:nvSpPr>
+          <p:cNvPr id="115" name="Rectangle 114"/>
+          <p:cNvSpPr/>
+          <p:nvPr/>
+        </p:nvSpPr>
+        <p:spPr>
+          <a:xfrm>
+            <a:off x="7097233" y="4953000"/>
+            <a:ext cx="142565" cy="152400"/>
+          </a:xfrm>
+          <a:prstGeom prst="rect">
+            <a:avLst/>
+          </a:prstGeom>
+          <a:solidFill>
+            <a:srgbClr val="FFC000"/>
+          </a:solidFill>
+          <a:ln>
+            <a:solidFill>
+              <a:schemeClr val="tx1"/>
+            </a:solidFill>
+          </a:ln>
+        </p:spPr>
+        <p:style>
+          <a:lnRef idx="2">
+            <a:schemeClr val="accent1">
+              <a:shade val="50000"/>
+            </a:schemeClr>
+          </a:lnRef>
+          <a:fillRef idx="1">
+            <a:schemeClr val="accent1"/>
+          </a:fillRef>
+          <a:effectRef idx="0">
+            <a:schemeClr val="accent1"/>
+          </a:effectRef>
+          <a:fontRef idx="minor">
+            <a:schemeClr val="lt1"/>
+          </a:fontRef>
+        </p:style>
+        <p:txBody>
+          <a:bodyPr rtlCol="0" anchor="ctr"/>
+          <a:lstStyle/>
+          <a:p>
+            <a:pPr algn="ctr"/>
+            <a:endParaRPr lang="en-US"/>
+          </a:p>
+        </p:txBody>
+      </p:sp>
+      <p:sp>
+        <p:nvSpPr>
+          <p:cNvPr id="116" name="Rectangle 115"/>
+          <p:cNvSpPr/>
+          <p:nvPr/>
+        </p:nvSpPr>
+        <p:spPr>
+          <a:xfrm>
+            <a:off x="7107866" y="4191000"/>
+            <a:ext cx="142565" cy="152400"/>
+          </a:xfrm>
+          <a:prstGeom prst="rect">
+            <a:avLst/>
+          </a:prstGeom>
+          <a:solidFill>
+            <a:srgbClr val="FFC000"/>
+          </a:solidFill>
+          <a:ln>
+            <a:solidFill>
+              <a:schemeClr val="tx1"/>
+            </a:solidFill>
+          </a:ln>
+        </p:spPr>
+        <p:style>
+          <a:lnRef idx="2">
+            <a:schemeClr val="accent1">
+              <a:shade val="50000"/>
+            </a:schemeClr>
+          </a:lnRef>
+          <a:fillRef idx="1">
+            <a:schemeClr val="accent1"/>
+          </a:fillRef>
+          <a:effectRef idx="0">
+            <a:schemeClr val="accent1"/>
+          </a:effectRef>
+          <a:fontRef idx="minor">
+            <a:schemeClr val="lt1"/>
+          </a:fontRef>
+        </p:style>
+        <p:txBody>
+          <a:bodyPr rtlCol="0" anchor="ctr"/>
+          <a:lstStyle/>
+          <a:p>
+            <a:pPr algn="ctr"/>
+            <a:endParaRPr lang="en-US"/>
+          </a:p>
+        </p:txBody>
+      </p:sp>
+      <p:grpSp>
+        <p:nvGrpSpPr>
+          <p:cNvPr id="118" name="Group 117"/>
+          <p:cNvGrpSpPr/>
+          <p:nvPr/>
+        </p:nvGrpSpPr>
+        <p:grpSpPr>
+          <a:xfrm>
+            <a:off x="3505200" y="5867400"/>
+            <a:ext cx="1981200" cy="838200"/>
+            <a:chOff x="-3553851" y="304800"/>
+            <a:chExt cx="14615160" cy="6248400"/>
+          </a:xfrm>
+        </p:grpSpPr>
+        <p:sp>
+          <p:nvSpPr>
+            <p:cNvPr id="119" name="Rectangle 118"/>
+            <p:cNvSpPr/>
+            <p:nvPr/>
+          </p:nvSpPr>
+          <p:spPr>
+            <a:xfrm>
+              <a:off x="-3553851" y="304800"/>
+              <a:ext cx="14615160" cy="6248400"/>
+            </a:xfrm>
+            <a:prstGeom prst="rect">
+              <a:avLst/>
+            </a:prstGeom>
+            <a:solidFill>
+              <a:schemeClr val="tx2">
+                <a:lumMod val="75000"/>
+              </a:schemeClr>
+            </a:solidFill>
+            <a:ln w="19050">
+              <a:solidFill>
+                <a:schemeClr val="tx1"/>
+              </a:solidFill>
+            </a:ln>
+          </p:spPr>
+          <p:style>
+            <a:lnRef idx="2">
+              <a:schemeClr val="accent1">
+                <a:shade val="50000"/>
+              </a:schemeClr>
+            </a:lnRef>
+            <a:fillRef idx="1">
+              <a:schemeClr val="accent1"/>
+            </a:fillRef>
+            <a:effectRef idx="0">
+              <a:schemeClr val="accent1"/>
+            </a:effectRef>
+            <a:fontRef idx="minor">
+              <a:schemeClr val="lt1"/>
+            </a:fontRef>
+          </p:style>
+          <p:txBody>
+            <a:bodyPr rtlCol="0" anchor="ctr"/>
+            <a:lstStyle/>
+            <a:p>
+              <a:pPr algn="ctr"/>
+              <a:r>
+                <a:rPr lang="en-US" dirty="0" smtClean="0">
+                  <a:latin typeface="Times New Roman" pitchFamily="18" charset="0"/>
+                  <a:cs typeface="Times New Roman" pitchFamily="18" charset="0"/>
+                </a:rPr>
+                <a:t>Ground Station</a:t>
+              </a:r>
+              <a:endParaRPr lang="en-US" dirty="0">
+                <a:latin typeface="Times New Roman" pitchFamily="18" charset="0"/>
+                <a:cs typeface="Times New Roman" pitchFamily="18" charset="0"/>
+              </a:endParaRPr>
+            </a:p>
+          </p:txBody>
+        </p:sp>
+        <p:sp>
+          <p:nvSpPr>
+            <p:cNvPr id="120" name="TextBox 119"/>
+            <p:cNvSpPr txBox="1"/>
+            <p:nvPr/>
+          </p:nvSpPr>
+          <p:spPr>
+            <a:xfrm>
+              <a:off x="381000" y="304800"/>
+              <a:ext cx="4001767" cy="2753202"/>
+            </a:xfrm>
+            <a:prstGeom prst="rect">
+              <a:avLst/>
+            </a:prstGeom>
+            <a:noFill/>
+          </p:spPr>
+          <p:txBody>
+            <a:bodyPr wrap="square" rtlCol="0">
+              <a:spAutoFit/>
+            </a:bodyPr>
+            <a:lstStyle/>
+            <a:p>
+              <a:endParaRPr lang="en-US" dirty="0">
+                <a:solidFill>
+                  <a:schemeClr val="bg1"/>
+                </a:solidFill>
+                <a:latin typeface="Times New Roman" panose="02020603050405020304" pitchFamily="18" charset="0"/>
+                <a:cs typeface="Times New Roman" panose="02020603050405020304" pitchFamily="18" charset="0"/>
+              </a:endParaRPr>
+            </a:p>
+          </p:txBody>
+        </p:sp>
+      </p:grpSp>
+      <p:cxnSp>
+        <p:nvCxnSpPr>
+          <p:cNvPr id="122" name="Shape 121"/>
+          <p:cNvCxnSpPr>
+            <a:stCxn id="119" idx="3"/>
+            <a:endCxn id="73" idx="2"/>
+          </p:cNvCxnSpPr>
+          <p:nvPr/>
+        </p:nvCxnSpPr>
+        <p:spPr>
+          <a:xfrm flipV="1">
+            <a:off x="5486400" y="5867400"/>
+            <a:ext cx="2019300" cy="419100"/>
+          </a:xfrm>
+          <a:prstGeom prst="bentConnector2">
+            <a:avLst/>
+          </a:prstGeom>
+          <a:ln w="57150">
+            <a:solidFill>
+              <a:srgbClr val="FFC000"/>
+            </a:solidFill>
+            <a:headEnd type="none" w="med" len="med"/>
+            <a:tailEnd type="triangle" w="med" len="med"/>
+          </a:ln>
+        </p:spPr>
+        <p:style>
+          <a:lnRef idx="1">
+            <a:schemeClr val="accent1"/>
+          </a:lnRef>
+          <a:fillRef idx="0">
+            <a:schemeClr val="accent1"/>
+          </a:fillRef>
+          <a:effectRef idx="0">
+            <a:schemeClr val="accent1"/>
+          </a:effectRef>
+          <a:fontRef idx="minor">
+            <a:schemeClr val="tx1"/>
+          </a:fontRef>
+        </p:style>
+      </p:cxnSp>
+      <p:sp>
+        <p:nvSpPr>
+          <p:cNvPr id="123" name="TextBox 122"/>
+          <p:cNvSpPr txBox="1"/>
+          <p:nvPr/>
+        </p:nvSpPr>
+        <p:spPr>
+          <a:xfrm>
+            <a:off x="5638800" y="5638800"/>
+            <a:ext cx="1359376" cy="646331"/>
+          </a:xfrm>
+          <a:prstGeom prst="rect">
+            <a:avLst/>
+          </a:prstGeom>
+          <a:noFill/>
+        </p:spPr>
+        <p:txBody>
+          <a:bodyPr wrap="square" rtlCol="0">
+            <a:spAutoFit/>
+          </a:bodyPr>
+          <a:lstStyle/>
+          <a:p>
+            <a:r>
+              <a:rPr lang="en-US" dirty="0" smtClean="0">
+                <a:latin typeface="Times New Roman" panose="02020603050405020304" pitchFamily="18" charset="0"/>
+                <a:cs typeface="Times New Roman" panose="02020603050405020304" pitchFamily="18" charset="0"/>
+              </a:rPr>
+              <a:t>Separation Command</a:t>
+            </a:r>
+            <a:endParaRPr lang="en-US" dirty="0">
+              <a:latin typeface="Times New Roman" panose="02020603050405020304" pitchFamily="18" charset="0"/>
+              <a:cs typeface="Times New Roman" panose="02020603050405020304" pitchFamily="18" charset="0"/>
+            </a:endParaRPr>
+          </a:p>
+        </p:txBody>
+      </p:sp>
+      <p:sp>
+        <p:nvSpPr>
+          <p:cNvPr id="124" name="Rectangle 123"/>
+          <p:cNvSpPr/>
+          <p:nvPr/>
+        </p:nvSpPr>
+        <p:spPr>
+          <a:xfrm>
+            <a:off x="6629400" y="3124200"/>
+            <a:ext cx="1371600" cy="685800"/>
+          </a:xfrm>
+          <a:prstGeom prst="rect">
+            <a:avLst/>
+          </a:prstGeom>
+          <a:solidFill>
+            <a:schemeClr val="tx1">
+              <a:lumMod val="75000"/>
+              <a:lumOff val="25000"/>
+            </a:schemeClr>
+          </a:solidFill>
+          <a:ln>
+            <a:solidFill>
+              <a:schemeClr val="tx1"/>
+            </a:solidFill>
+          </a:ln>
+        </p:spPr>
+        <p:style>
+          <a:lnRef idx="2">
+            <a:schemeClr val="accent1">
+              <a:shade val="50000"/>
+            </a:schemeClr>
+          </a:lnRef>
+          <a:fillRef idx="1">
+            <a:schemeClr val="accent1"/>
+          </a:fillRef>
+          <a:effectRef idx="0">
+            <a:schemeClr val="accent1"/>
+          </a:effectRef>
+          <a:fontRef idx="minor">
+            <a:schemeClr val="lt1"/>
+          </a:fontRef>
+        </p:style>
+        <p:txBody>
+          <a:bodyPr rtlCol="0" anchor="ctr"/>
+          <a:lstStyle/>
+          <a:p>
+            <a:pPr algn="ctr"/>
+            <a:r>
+              <a:rPr lang="el-GR" sz="1200" dirty="0" smtClean="0">
+                <a:latin typeface="Times New Roman" panose="02020603050405020304" pitchFamily="18" charset="0"/>
+                <a:cs typeface="Times New Roman" panose="02020603050405020304" pitchFamily="18" charset="0"/>
+              </a:rPr>
+              <a:t>μ</a:t>
+            </a:r>
+            <a:r>
+              <a:rPr lang="en-US" sz="1200" dirty="0" smtClean="0">
+                <a:latin typeface="Times New Roman" panose="02020603050405020304" pitchFamily="18" charset="0"/>
+                <a:cs typeface="Times New Roman" panose="02020603050405020304" pitchFamily="18" charset="0"/>
+              </a:rPr>
+              <a:t>Controller</a:t>
+            </a:r>
+            <a:endParaRPr lang="en-US" sz="1200" dirty="0">
+              <a:latin typeface="Times New Roman" panose="02020603050405020304" pitchFamily="18" charset="0"/>
+              <a:cs typeface="Times New Roman" panose="02020603050405020304" pitchFamily="18" charset="0"/>
+            </a:endParaRPr>
+          </a:p>
+        </p:txBody>
+      </p:sp>
+      <p:cxnSp>
+        <p:nvCxnSpPr>
+          <p:cNvPr id="125" name="Straight Connector 124"/>
+          <p:cNvCxnSpPr/>
+          <p:nvPr/>
+        </p:nvCxnSpPr>
+        <p:spPr>
+          <a:xfrm>
+            <a:off x="7761767" y="2667000"/>
+            <a:ext cx="4917" cy="457200"/>
+          </a:xfrm>
+          <a:prstGeom prst="line">
+            <a:avLst/>
+          </a:prstGeom>
+          <a:ln w="57150">
+            <a:solidFill>
+              <a:srgbClr val="FF0000"/>
+            </a:solidFill>
+          </a:ln>
+        </p:spPr>
+        <p:style>
+          <a:lnRef idx="1">
+            <a:schemeClr val="accent1"/>
+          </a:lnRef>
+          <a:fillRef idx="0">
+            <a:schemeClr val="accent1"/>
+          </a:fillRef>
+          <a:effectRef idx="0">
+            <a:schemeClr val="accent1"/>
+          </a:effectRef>
+          <a:fontRef idx="minor">
+            <a:schemeClr val="tx1"/>
+          </a:fontRef>
+        </p:style>
+      </p:cxnSp>
+      <p:cxnSp>
+        <p:nvCxnSpPr>
+          <p:cNvPr id="128" name="Straight Connector 127"/>
+          <p:cNvCxnSpPr/>
+          <p:nvPr/>
+        </p:nvCxnSpPr>
+        <p:spPr>
+          <a:xfrm>
+            <a:off x="7772400" y="3810000"/>
+            <a:ext cx="0" cy="381000"/>
+          </a:xfrm>
+          <a:prstGeom prst="line">
+            <a:avLst/>
+          </a:prstGeom>
+          <a:ln w="57150">
+            <a:solidFill>
+              <a:srgbClr val="FF0000"/>
+            </a:solidFill>
+          </a:ln>
+        </p:spPr>
+        <p:style>
+          <a:lnRef idx="1">
+            <a:schemeClr val="accent1"/>
+          </a:lnRef>
+          <a:fillRef idx="0">
+            <a:schemeClr val="accent1"/>
+          </a:fillRef>
+          <a:effectRef idx="0">
+            <a:schemeClr val="accent1"/>
+          </a:effectRef>
+          <a:fontRef idx="minor">
+            <a:schemeClr val="tx1"/>
+          </a:fontRef>
+        </p:style>
+      </p:cxnSp>
+      <p:cxnSp>
+        <p:nvCxnSpPr>
+          <p:cNvPr id="131" name="Straight Connector 130"/>
+          <p:cNvCxnSpPr/>
+          <p:nvPr/>
+        </p:nvCxnSpPr>
+        <p:spPr>
+          <a:xfrm>
+            <a:off x="7478233" y="2667000"/>
+            <a:ext cx="4917" cy="457200"/>
+          </a:xfrm>
+          <a:prstGeom prst="line">
+            <a:avLst/>
+          </a:prstGeom>
+          <a:ln w="57150">
+            <a:solidFill>
+              <a:schemeClr val="tx1"/>
+            </a:solidFill>
+          </a:ln>
+        </p:spPr>
+        <p:style>
+          <a:lnRef idx="1">
+            <a:schemeClr val="accent1"/>
+          </a:lnRef>
+          <a:fillRef idx="0">
+            <a:schemeClr val="accent1"/>
+          </a:fillRef>
+          <a:effectRef idx="0">
+            <a:schemeClr val="accent1"/>
+          </a:effectRef>
+          <a:fontRef idx="minor">
+            <a:schemeClr val="tx1"/>
+          </a:fontRef>
+        </p:style>
+      </p:cxnSp>
+      <p:cxnSp>
+        <p:nvCxnSpPr>
+          <p:cNvPr id="132" name="Straight Connector 131"/>
+          <p:cNvCxnSpPr>
+            <a:endCxn id="97" idx="0"/>
+          </p:cNvCxnSpPr>
+          <p:nvPr/>
+        </p:nvCxnSpPr>
+        <p:spPr>
+          <a:xfrm flipH="1">
+            <a:off x="7485718" y="3810000"/>
+            <a:ext cx="3148" cy="381000"/>
+          </a:xfrm>
+          <a:prstGeom prst="line">
+            <a:avLst/>
+          </a:prstGeom>
+          <a:ln w="57150">
+            <a:solidFill>
+              <a:schemeClr val="tx1"/>
+            </a:solidFill>
+          </a:ln>
+        </p:spPr>
+        <p:style>
+          <a:lnRef idx="1">
+            <a:schemeClr val="accent1"/>
+          </a:lnRef>
+          <a:fillRef idx="0">
+            <a:schemeClr val="accent1"/>
+          </a:fillRef>
+          <a:effectRef idx="0">
+            <a:schemeClr val="accent1"/>
+          </a:effectRef>
+          <a:fontRef idx="minor">
+            <a:schemeClr val="tx1"/>
+          </a:fontRef>
+        </p:style>
+      </p:cxnSp>
+      <p:cxnSp>
+        <p:nvCxnSpPr>
+          <p:cNvPr id="136" name="Straight Connector 135"/>
+          <p:cNvCxnSpPr/>
+          <p:nvPr/>
+        </p:nvCxnSpPr>
+        <p:spPr>
+          <a:xfrm flipH="1">
+            <a:off x="7173433" y="3810000"/>
+            <a:ext cx="3148" cy="381000"/>
+          </a:xfrm>
+          <a:prstGeom prst="line">
+            <a:avLst/>
+          </a:prstGeom>
+          <a:ln w="57150">
+            <a:solidFill>
+              <a:srgbClr val="FFC000"/>
+            </a:solidFill>
+          </a:ln>
+        </p:spPr>
+        <p:style>
+          <a:lnRef idx="1">
+            <a:schemeClr val="accent1"/>
+          </a:lnRef>
+          <a:fillRef idx="0">
+            <a:schemeClr val="accent1"/>
+          </a:fillRef>
+          <a:effectRef idx="0">
+            <a:schemeClr val="accent1"/>
+          </a:effectRef>
+          <a:fontRef idx="minor">
+            <a:schemeClr val="tx1"/>
+          </a:fontRef>
+        </p:style>
+      </p:cxnSp>
+      <p:sp>
+        <p:nvSpPr>
+          <p:cNvPr id="137" name="Rectangle 136"/>
+          <p:cNvSpPr/>
+          <p:nvPr/>
+        </p:nvSpPr>
+        <p:spPr>
+          <a:xfrm>
+            <a:off x="3733800" y="2362200"/>
+            <a:ext cx="1143000" cy="457200"/>
+          </a:xfrm>
+          <a:prstGeom prst="rect">
+            <a:avLst/>
+          </a:prstGeom>
+          <a:solidFill>
+            <a:schemeClr val="tx1">
+              <a:lumMod val="75000"/>
+              <a:lumOff val="25000"/>
+            </a:schemeClr>
+          </a:solidFill>
+          <a:ln>
+            <a:solidFill>
+              <a:schemeClr val="tx1"/>
+            </a:solidFill>
+          </a:ln>
+        </p:spPr>
+        <p:style>
+          <a:lnRef idx="2">
+            <a:schemeClr val="accent1">
+              <a:shade val="50000"/>
+            </a:schemeClr>
+          </a:lnRef>
+          <a:fillRef idx="1">
+            <a:schemeClr val="accent1"/>
+          </a:fillRef>
+          <a:effectRef idx="0">
+            <a:schemeClr val="accent1"/>
+          </a:effectRef>
+          <a:fontRef idx="minor">
+            <a:schemeClr val="lt1"/>
+          </a:fontRef>
+        </p:style>
+        <p:txBody>
+          <a:bodyPr rtlCol="0" anchor="ctr"/>
+          <a:lstStyle/>
+          <a:p>
+            <a:pPr algn="ctr"/>
+            <a:r>
+              <a:rPr lang="en-US" sz="1600" dirty="0" smtClean="0">
+                <a:latin typeface="Times New Roman" panose="02020603050405020304" pitchFamily="18" charset="0"/>
+                <a:cs typeface="Times New Roman" panose="02020603050405020304" pitchFamily="18" charset="0"/>
+              </a:rPr>
+              <a:t>Spring Contact</a:t>
+            </a:r>
+            <a:endParaRPr lang="en-US" sz="1600" dirty="0">
+              <a:latin typeface="Times New Roman" panose="02020603050405020304" pitchFamily="18" charset="0"/>
+              <a:cs typeface="Times New Roman" panose="02020603050405020304" pitchFamily="18" charset="0"/>
+            </a:endParaRPr>
+          </a:p>
+        </p:txBody>
+      </p:sp>
+      <p:sp>
+        <p:nvSpPr>
+          <p:cNvPr id="138" name="Rectangle 137"/>
+          <p:cNvSpPr/>
+          <p:nvPr/>
+        </p:nvSpPr>
+        <p:spPr>
+          <a:xfrm>
+            <a:off x="3733800" y="4648200"/>
+            <a:ext cx="1219200" cy="457200"/>
+          </a:xfrm>
+          <a:prstGeom prst="rect">
+            <a:avLst/>
+          </a:prstGeom>
+          <a:solidFill>
+            <a:schemeClr val="tx1">
+              <a:lumMod val="75000"/>
+              <a:lumOff val="25000"/>
+            </a:schemeClr>
+          </a:solidFill>
+          <a:ln>
+            <a:solidFill>
+              <a:schemeClr val="tx1"/>
+            </a:solidFill>
+          </a:ln>
+        </p:spPr>
+        <p:style>
+          <a:lnRef idx="2">
+            <a:schemeClr val="accent1">
+              <a:shade val="50000"/>
+            </a:schemeClr>
+          </a:lnRef>
+          <a:fillRef idx="1">
+            <a:schemeClr val="accent1"/>
+          </a:fillRef>
+          <a:effectRef idx="0">
+            <a:schemeClr val="accent1"/>
+          </a:effectRef>
+          <a:fontRef idx="minor">
+            <a:schemeClr val="lt1"/>
+          </a:fontRef>
+        </p:style>
+        <p:txBody>
+          <a:bodyPr rtlCol="0" anchor="ctr"/>
+          <a:lstStyle/>
+          <a:p>
+            <a:pPr algn="ctr"/>
+            <a:r>
+              <a:rPr lang="en-US" sz="1600" dirty="0" smtClean="0">
+                <a:latin typeface="Times New Roman" panose="02020603050405020304" pitchFamily="18" charset="0"/>
+                <a:cs typeface="Times New Roman" panose="02020603050405020304" pitchFamily="18" charset="0"/>
+              </a:rPr>
+              <a:t>Spring Contact</a:t>
+            </a:r>
+            <a:endParaRPr lang="en-US" sz="1600" dirty="0">
+              <a:latin typeface="Times New Roman" panose="02020603050405020304" pitchFamily="18" charset="0"/>
+              <a:cs typeface="Times New Roman" panose="02020603050405020304" pitchFamily="18" charset="0"/>
+            </a:endParaRPr>
+          </a:p>
+        </p:txBody>
+      </p:sp>
+      <p:sp>
+        <p:nvSpPr>
+          <p:cNvPr id="141" name="Rectangle 140"/>
+          <p:cNvSpPr/>
+          <p:nvPr/>
+        </p:nvSpPr>
+        <p:spPr>
+          <a:xfrm>
+            <a:off x="6248400" y="1371600"/>
+            <a:ext cx="142565" cy="152400"/>
+          </a:xfrm>
+          <a:prstGeom prst="rect">
+            <a:avLst/>
+          </a:prstGeom>
+          <a:solidFill>
+            <a:srgbClr val="FF0000"/>
+          </a:solidFill>
+          <a:ln>
+            <a:solidFill>
+              <a:schemeClr val="tx1"/>
+            </a:solidFill>
+          </a:ln>
+        </p:spPr>
+        <p:style>
+          <a:lnRef idx="2">
+            <a:schemeClr val="accent1">
+              <a:shade val="50000"/>
+            </a:schemeClr>
+          </a:lnRef>
+          <a:fillRef idx="1">
+            <a:schemeClr val="accent1"/>
+          </a:fillRef>
+          <a:effectRef idx="0">
+            <a:schemeClr val="accent1"/>
+          </a:effectRef>
+          <a:fontRef idx="minor">
+            <a:schemeClr val="lt1"/>
+          </a:fontRef>
+        </p:style>
+        <p:txBody>
+          <a:bodyPr rtlCol="0" anchor="ctr"/>
+          <a:lstStyle/>
+          <a:p>
+            <a:pPr algn="ctr"/>
+            <a:endParaRPr lang="en-US"/>
+          </a:p>
+        </p:txBody>
+      </p:sp>
+      <p:sp>
+        <p:nvSpPr>
+          <p:cNvPr id="142" name="Rectangle 141"/>
+          <p:cNvSpPr/>
+          <p:nvPr/>
+        </p:nvSpPr>
+        <p:spPr>
+          <a:xfrm>
+            <a:off x="6248400" y="1676400"/>
+            <a:ext cx="142565" cy="152400"/>
+          </a:xfrm>
+          <a:prstGeom prst="rect">
+            <a:avLst/>
+          </a:prstGeom>
+          <a:solidFill>
+            <a:schemeClr val="tx1">
+              <a:lumMod val="85000"/>
+              <a:lumOff val="15000"/>
+            </a:schemeClr>
+          </a:solidFill>
+          <a:ln>
+            <a:solidFill>
+              <a:schemeClr val="tx1"/>
+            </a:solidFill>
+          </a:ln>
+        </p:spPr>
+        <p:style>
+          <a:lnRef idx="2">
+            <a:schemeClr val="accent1">
+              <a:shade val="50000"/>
+            </a:schemeClr>
+          </a:lnRef>
+          <a:fillRef idx="1">
+            <a:schemeClr val="accent1"/>
+          </a:fillRef>
+          <a:effectRef idx="0">
+            <a:schemeClr val="accent1"/>
+          </a:effectRef>
+          <a:fontRef idx="minor">
+            <a:schemeClr val="lt1"/>
+          </a:fontRef>
+        </p:style>
+        <p:txBody>
+          <a:bodyPr rtlCol="0" anchor="ctr"/>
+          <a:lstStyle/>
+          <a:p>
+            <a:pPr algn="ctr"/>
+            <a:endParaRPr lang="en-US"/>
+          </a:p>
+        </p:txBody>
+      </p:sp>
+      <p:cxnSp>
+        <p:nvCxnSpPr>
+          <p:cNvPr id="143" name="Straight Connector 142"/>
+          <p:cNvCxnSpPr>
+            <a:stCxn id="110" idx="3"/>
+            <a:endCxn id="137" idx="1"/>
+          </p:cNvCxnSpPr>
+          <p:nvPr/>
+        </p:nvCxnSpPr>
+        <p:spPr>
+          <a:xfrm>
+            <a:off x="3581400" y="2590800"/>
+            <a:ext cx="152400" cy="0"/>
+          </a:xfrm>
+          <a:prstGeom prst="line">
+            <a:avLst/>
+          </a:prstGeom>
+          <a:ln w="88900">
+            <a:solidFill>
+              <a:schemeClr val="accent6">
+                <a:lumMod val="75000"/>
+              </a:schemeClr>
+            </a:solidFill>
+          </a:ln>
+        </p:spPr>
+        <p:style>
+          <a:lnRef idx="1">
+            <a:schemeClr val="accent1"/>
+          </a:lnRef>
+          <a:fillRef idx="0">
+            <a:schemeClr val="accent1"/>
+          </a:fillRef>
+          <a:effectRef idx="0">
+            <a:schemeClr val="accent1"/>
+          </a:effectRef>
+          <a:fontRef idx="minor">
+            <a:schemeClr val="tx1"/>
+          </a:fontRef>
+        </p:style>
+      </p:cxnSp>
+      <p:cxnSp>
+        <p:nvCxnSpPr>
+          <p:cNvPr id="146" name="Straight Connector 145"/>
+          <p:cNvCxnSpPr>
+            <a:stCxn id="111" idx="3"/>
+            <a:endCxn id="138" idx="1"/>
+          </p:cNvCxnSpPr>
+          <p:nvPr/>
+        </p:nvCxnSpPr>
+        <p:spPr>
+          <a:xfrm>
+            <a:off x="3581400" y="4876800"/>
+            <a:ext cx="152400" cy="0"/>
+          </a:xfrm>
+          <a:prstGeom prst="line">
+            <a:avLst/>
+          </a:prstGeom>
+          <a:ln w="88900">
+            <a:solidFill>
+              <a:schemeClr val="accent6">
+                <a:lumMod val="75000"/>
+              </a:schemeClr>
+            </a:solidFill>
+          </a:ln>
+        </p:spPr>
+        <p:style>
+          <a:lnRef idx="1">
+            <a:schemeClr val="accent1"/>
+          </a:lnRef>
+          <a:fillRef idx="0">
+            <a:schemeClr val="accent1"/>
+          </a:fillRef>
+          <a:effectRef idx="0">
+            <a:schemeClr val="accent1"/>
+          </a:effectRef>
+          <a:fontRef idx="minor">
+            <a:schemeClr val="tx1"/>
+          </a:fontRef>
+        </p:style>
+      </p:cxnSp>
+    </p:spTree>
+  </p:cSld>
+  <p:clrMapOvr>
+    <a:masterClrMapping/>
+  </p:clrMapOvr>
 </p:sld>
 </file>
 

</xml_diff>

<commit_message>
In the process of updating the sep block diagram
</commit_message>
<xml_diff>
--- a/Power (PWR)/Rascal PWR Block Diagram.pptx
+++ b/Power (PWR)/Rascal PWR Block Diagram.pptx
@@ -5239,8 +5239,8 @@
         </p:nvSpPr>
         <p:spPr>
           <a:xfrm>
-            <a:off x="4648200" y="381000"/>
-            <a:ext cx="3657600" cy="5029200"/>
+            <a:off x="4648200" y="152400"/>
+            <a:ext cx="3657600" cy="5257800"/>
           </a:xfrm>
           <a:prstGeom prst="rect">
             <a:avLst/>
@@ -5289,8 +5289,8 @@
         </p:nvGrpSpPr>
         <p:grpSpPr>
           <a:xfrm>
-            <a:off x="381000" y="381000"/>
-            <a:ext cx="3657600" cy="5029200"/>
+            <a:off x="381000" y="152400"/>
+            <a:ext cx="3657600" cy="5257800"/>
             <a:chOff x="381000" y="304800"/>
             <a:chExt cx="7307580" cy="6248400"/>
           </a:xfrm>
@@ -5400,8 +5400,8 @@
         </p:nvGrpSpPr>
         <p:grpSpPr>
           <a:xfrm>
-            <a:off x="609600" y="914400"/>
-            <a:ext cx="3200400" cy="4343400"/>
+            <a:off x="609600" y="609600"/>
+            <a:ext cx="3200400" cy="4648200"/>
             <a:chOff x="381000" y="304800"/>
             <a:chExt cx="7307580" cy="6248400"/>
           </a:xfrm>
@@ -5511,8 +5511,8 @@
         </p:nvGrpSpPr>
         <p:grpSpPr>
           <a:xfrm>
-            <a:off x="4800600" y="914400"/>
-            <a:ext cx="1524000" cy="4343400"/>
+            <a:off x="4800600" y="533400"/>
+            <a:ext cx="1524000" cy="4724400"/>
             <a:chOff x="381000" y="304800"/>
             <a:chExt cx="7307580" cy="6248400"/>
           </a:xfrm>
@@ -5622,7 +5622,7 @@
         </p:nvSpPr>
         <p:spPr>
           <a:xfrm>
-            <a:off x="3352800" y="1295400"/>
+            <a:off x="3352800" y="1524000"/>
             <a:ext cx="914400" cy="685800"/>
           </a:xfrm>
           <a:prstGeom prst="rect">
@@ -5692,7 +5692,7 @@
         </p:nvSpPr>
         <p:spPr>
           <a:xfrm>
-            <a:off x="4419600" y="1295400"/>
+            <a:off x="4419600" y="1524000"/>
             <a:ext cx="914400" cy="685800"/>
           </a:xfrm>
           <a:prstGeom prst="rect">
@@ -5763,7 +5763,7 @@
         </p:nvSpPr>
         <p:spPr>
           <a:xfrm>
-            <a:off x="4648200" y="381000"/>
+            <a:off x="4648200" y="152400"/>
             <a:ext cx="2514600" cy="369332"/>
           </a:xfrm>
           <a:prstGeom prst="rect">
@@ -5808,43 +5808,8 @@
         </p:nvCxnSpPr>
         <p:spPr>
           <a:xfrm flipV="1">
-            <a:off x="5334000" y="1447800"/>
-            <a:ext cx="2438400" cy="3572"/>
-          </a:xfrm>
-          <a:prstGeom prst="line">
-            <a:avLst/>
-          </a:prstGeom>
-          <a:ln w="57150">
-            <a:solidFill>
-              <a:srgbClr val="FF0000"/>
-            </a:solidFill>
-          </a:ln>
-        </p:spPr>
-        <p:style>
-          <a:lnRef idx="1">
-            <a:schemeClr val="accent1"/>
-          </a:lnRef>
-          <a:fillRef idx="0">
-            <a:schemeClr val="accent1"/>
-          </a:fillRef>
-          <a:effectRef idx="0">
-            <a:schemeClr val="accent1"/>
-          </a:effectRef>
-          <a:fontRef idx="minor">
-            <a:schemeClr val="tx1"/>
-          </a:fontRef>
-        </p:style>
-      </p:cxnSp>
-      <p:cxnSp>
-        <p:nvCxnSpPr>
-          <p:cNvPr id="19" name="Straight Connector 18"/>
-          <p:cNvCxnSpPr/>
-          <p:nvPr/>
-        </p:nvCxnSpPr>
-        <p:spPr>
-          <a:xfrm>
-            <a:off x="7772400" y="1451372"/>
-            <a:ext cx="0" cy="3577828"/>
+            <a:off x="5334000" y="1676400"/>
+            <a:ext cx="2313432" cy="3572"/>
           </a:xfrm>
           <a:prstGeom prst="line">
             <a:avLst/>
@@ -5878,8 +5843,8 @@
         </p:nvCxnSpPr>
         <p:spPr>
           <a:xfrm flipV="1">
-            <a:off x="5334000" y="1752600"/>
-            <a:ext cx="2148840" cy="2958"/>
+            <a:off x="5334000" y="1981200"/>
+            <a:ext cx="2057400" cy="2958"/>
           </a:xfrm>
           <a:prstGeom prst="line">
             <a:avLst/>
@@ -5908,13 +5873,15 @@
       <p:cxnSp>
         <p:nvCxnSpPr>
           <p:cNvPr id="23" name="Straight Connector 22"/>
-          <p:cNvCxnSpPr/>
+          <p:cNvCxnSpPr>
+            <a:endCxn id="97" idx="2"/>
+          </p:cNvCxnSpPr>
           <p:nvPr/>
         </p:nvCxnSpPr>
         <p:spPr>
           <a:xfrm flipV="1">
-            <a:off x="7480002" y="1728850"/>
-            <a:ext cx="1" cy="3300350"/>
+            <a:off x="7480002" y="4343400"/>
+            <a:ext cx="5716" cy="819776"/>
           </a:xfrm>
           <a:prstGeom prst="line">
             <a:avLst/>
@@ -6008,7 +5975,7 @@
         </p:nvCxnSpPr>
         <p:spPr>
           <a:xfrm flipV="1">
-            <a:off x="4267200" y="1447800"/>
+            <a:off x="4267200" y="1676400"/>
             <a:ext cx="152400" cy="3572"/>
           </a:xfrm>
           <a:prstGeom prst="line">
@@ -6043,7 +6010,7 @@
         </p:nvCxnSpPr>
         <p:spPr>
           <a:xfrm flipV="1">
-            <a:off x="4267200" y="1749028"/>
+            <a:off x="4267200" y="1977628"/>
             <a:ext cx="152400" cy="3572"/>
           </a:xfrm>
           <a:prstGeom prst="line">
@@ -6138,7 +6105,7 @@
         </p:nvCxnSpPr>
         <p:spPr>
           <a:xfrm>
-            <a:off x="1295400" y="1447800"/>
+            <a:off x="1295400" y="1676400"/>
             <a:ext cx="2057400" cy="0"/>
           </a:xfrm>
           <a:prstGeom prst="line">
@@ -6173,8 +6140,8 @@
         </p:nvCxnSpPr>
         <p:spPr>
           <a:xfrm>
-            <a:off x="1295400" y="1426534"/>
-            <a:ext cx="0" cy="935666"/>
+            <a:off x="1295400" y="1676400"/>
+            <a:ext cx="0" cy="685800"/>
           </a:xfrm>
           <a:prstGeom prst="line">
             <a:avLst/>
@@ -6208,7 +6175,7 @@
         </p:nvCxnSpPr>
         <p:spPr>
           <a:xfrm>
-            <a:off x="1655134" y="1752600"/>
+            <a:off x="1655134" y="1981200"/>
             <a:ext cx="1691640" cy="0"/>
           </a:xfrm>
           <a:prstGeom prst="line">
@@ -6243,8 +6210,8 @@
         </p:nvCxnSpPr>
         <p:spPr>
           <a:xfrm flipV="1">
-            <a:off x="1676400" y="1752600"/>
-            <a:ext cx="0" cy="685800"/>
+            <a:off x="1676400" y="1981200"/>
+            <a:ext cx="0" cy="457200"/>
           </a:xfrm>
           <a:prstGeom prst="line">
             <a:avLst/>
@@ -6488,7 +6455,7 @@
         </p:nvSpPr>
         <p:spPr>
           <a:xfrm>
-            <a:off x="6553200" y="1066800"/>
+            <a:off x="6553200" y="1642732"/>
             <a:ext cx="1511776" cy="369332"/>
           </a:xfrm>
           <a:prstGeom prst="rect">
@@ -6510,7 +6477,7 @@
                 <a:latin typeface="Times New Roman" panose="02020603050405020304" pitchFamily="18" charset="0"/>
                 <a:cs typeface="Times New Roman" panose="02020603050405020304" pitchFamily="18" charset="0"/>
               </a:rPr>
-              <a:t>5 V, 2.5 Amps</a:t>
+              <a:t>5 V</a:t>
             </a:r>
             <a:endParaRPr lang="en-US" dirty="0">
               <a:solidFill>
@@ -6530,7 +6497,7 @@
         </p:nvSpPr>
         <p:spPr>
           <a:xfrm>
-            <a:off x="6717824" y="1764268"/>
+            <a:off x="6477000" y="1981200"/>
             <a:ext cx="1359376" cy="369332"/>
           </a:xfrm>
           <a:prstGeom prst="rect">
@@ -6988,7 +6955,7 @@
         </p:nvSpPr>
         <p:spPr>
           <a:xfrm>
-            <a:off x="7696200" y="2514600"/>
+            <a:off x="7553635" y="2514600"/>
             <a:ext cx="142565" cy="152400"/>
           </a:xfrm>
           <a:prstGeom prst="rect">
@@ -7036,7 +7003,7 @@
         </p:nvSpPr>
         <p:spPr>
           <a:xfrm>
-            <a:off x="7410897" y="2514600"/>
+            <a:off x="7315200" y="2514600"/>
             <a:ext cx="142565" cy="152400"/>
           </a:xfrm>
           <a:prstGeom prst="rect">
@@ -7715,6 +7682,41 @@
           </a:p>
         </p:txBody>
       </p:sp>
+      <p:cxnSp>
+        <p:nvCxnSpPr>
+          <p:cNvPr id="131" name="Straight Connector 130"/>
+          <p:cNvCxnSpPr/>
+          <p:nvPr/>
+        </p:nvCxnSpPr>
+        <p:spPr>
+          <a:xfrm flipH="1">
+            <a:off x="7383779" y="2667000"/>
+            <a:ext cx="0" cy="457200"/>
+          </a:xfrm>
+          <a:prstGeom prst="line">
+            <a:avLst/>
+          </a:prstGeom>
+          <a:ln w="57150">
+            <a:solidFill>
+              <a:schemeClr val="tx1"/>
+            </a:solidFill>
+          </a:ln>
+        </p:spPr>
+        <p:style>
+          <a:lnRef idx="1">
+            <a:schemeClr val="accent1"/>
+          </a:lnRef>
+          <a:fillRef idx="0">
+            <a:schemeClr val="accent1"/>
+          </a:fillRef>
+          <a:effectRef idx="0">
+            <a:schemeClr val="accent1"/>
+          </a:effectRef>
+          <a:fontRef idx="minor">
+            <a:schemeClr val="tx1"/>
+          </a:fontRef>
+        </p:style>
+      </p:cxnSp>
       <p:sp>
         <p:nvSpPr>
           <p:cNvPr id="124" name="Rectangle 123"/>
@@ -7791,7 +7793,7 @@
         </p:nvCxnSpPr>
         <p:spPr>
           <a:xfrm>
-            <a:off x="7761767" y="2667000"/>
+            <a:off x="7619202" y="2667000"/>
             <a:ext cx="4917" cy="457200"/>
           </a:xfrm>
           <a:prstGeom prst="line">
@@ -7835,41 +7837,6 @@
           <a:ln w="57150">
             <a:solidFill>
               <a:srgbClr val="FF0000"/>
-            </a:solidFill>
-          </a:ln>
-        </p:spPr>
-        <p:style>
-          <a:lnRef idx="1">
-            <a:schemeClr val="accent1"/>
-          </a:lnRef>
-          <a:fillRef idx="0">
-            <a:schemeClr val="accent1"/>
-          </a:fillRef>
-          <a:effectRef idx="0">
-            <a:schemeClr val="accent1"/>
-          </a:effectRef>
-          <a:fontRef idx="minor">
-            <a:schemeClr val="tx1"/>
-          </a:fontRef>
-        </p:style>
-      </p:cxnSp>
-      <p:cxnSp>
-        <p:nvCxnSpPr>
-          <p:cNvPr id="131" name="Straight Connector 130"/>
-          <p:cNvCxnSpPr/>
-          <p:nvPr/>
-        </p:nvCxnSpPr>
-        <p:spPr>
-          <a:xfrm>
-            <a:off x="7478233" y="2667000"/>
-            <a:ext cx="4917" cy="457200"/>
-          </a:xfrm>
-          <a:prstGeom prst="line">
-            <a:avLst/>
-          </a:prstGeom>
-          <a:ln w="57150">
-            <a:solidFill>
-              <a:schemeClr val="tx1"/>
             </a:solidFill>
           </a:ln>
         </p:spPr>
@@ -8090,7 +8057,7 @@
         </p:nvSpPr>
         <p:spPr>
           <a:xfrm>
-            <a:off x="6248400" y="1371600"/>
+            <a:off x="6248400" y="1600200"/>
             <a:ext cx="142565" cy="152400"/>
           </a:xfrm>
           <a:prstGeom prst="rect">
@@ -8138,7 +8105,7 @@
         </p:nvSpPr>
         <p:spPr>
           <a:xfrm>
-            <a:off x="6248400" y="1676400"/>
+            <a:off x="6248400" y="1905000"/>
             <a:ext cx="142565" cy="152400"/>
           </a:xfrm>
           <a:prstGeom prst="rect">
@@ -8243,6 +8210,338 @@
               <a:schemeClr val="accent6">
                 <a:lumMod val="75000"/>
               </a:schemeClr>
+            </a:solidFill>
+          </a:ln>
+        </p:spPr>
+        <p:style>
+          <a:lnRef idx="1">
+            <a:schemeClr val="accent1"/>
+          </a:lnRef>
+          <a:fillRef idx="0">
+            <a:schemeClr val="accent1"/>
+          </a:fillRef>
+          <a:effectRef idx="0">
+            <a:schemeClr val="accent1"/>
+          </a:effectRef>
+          <a:fontRef idx="minor">
+            <a:schemeClr val="tx1"/>
+          </a:fontRef>
+        </p:style>
+      </p:cxnSp>
+      <p:sp>
+        <p:nvSpPr>
+          <p:cNvPr id="149" name="Rectangle 148"/>
+          <p:cNvSpPr/>
+          <p:nvPr/>
+        </p:nvSpPr>
+        <p:spPr>
+          <a:xfrm>
+            <a:off x="4191000" y="914400"/>
+            <a:ext cx="1143000" cy="533400"/>
+          </a:xfrm>
+          <a:prstGeom prst="rect">
+            <a:avLst/>
+          </a:prstGeom>
+          <a:solidFill>
+            <a:schemeClr val="tx1">
+              <a:lumMod val="75000"/>
+              <a:lumOff val="25000"/>
+            </a:schemeClr>
+          </a:solidFill>
+          <a:ln>
+            <a:solidFill>
+              <a:schemeClr val="tx1"/>
+            </a:solidFill>
+          </a:ln>
+        </p:spPr>
+        <p:style>
+          <a:lnRef idx="2">
+            <a:schemeClr val="accent1">
+              <a:shade val="50000"/>
+            </a:schemeClr>
+          </a:lnRef>
+          <a:fillRef idx="1">
+            <a:schemeClr val="accent1"/>
+          </a:fillRef>
+          <a:effectRef idx="0">
+            <a:schemeClr val="accent1"/>
+          </a:effectRef>
+          <a:fontRef idx="minor">
+            <a:schemeClr val="lt1"/>
+          </a:fontRef>
+        </p:style>
+        <p:txBody>
+          <a:bodyPr rtlCol="0" anchor="ctr"/>
+          <a:lstStyle/>
+          <a:p>
+            <a:pPr algn="ctr"/>
+            <a:r>
+              <a:rPr lang="en-US" sz="1200" dirty="0" smtClean="0">
+                <a:latin typeface="Times New Roman" panose="02020603050405020304" pitchFamily="18" charset="0"/>
+                <a:cs typeface="Times New Roman" panose="02020603050405020304" pitchFamily="18" charset="0"/>
+              </a:rPr>
+              <a:t>SEP Verification Switch</a:t>
+            </a:r>
+            <a:endParaRPr lang="en-US" sz="1200" dirty="0">
+              <a:latin typeface="Times New Roman" panose="02020603050405020304" pitchFamily="18" charset="0"/>
+              <a:cs typeface="Times New Roman" panose="02020603050405020304" pitchFamily="18" charset="0"/>
+            </a:endParaRPr>
+          </a:p>
+        </p:txBody>
+      </p:sp>
+      <p:cxnSp>
+        <p:nvCxnSpPr>
+          <p:cNvPr id="165" name="Straight Connector 164"/>
+          <p:cNvCxnSpPr/>
+          <p:nvPr/>
+        </p:nvCxnSpPr>
+        <p:spPr>
+          <a:xfrm>
+            <a:off x="7620000" y="1676400"/>
+            <a:ext cx="0" cy="838200"/>
+          </a:xfrm>
+          <a:prstGeom prst="line">
+            <a:avLst/>
+          </a:prstGeom>
+          <a:ln w="57150">
+            <a:solidFill>
+              <a:srgbClr val="FF0000"/>
+            </a:solidFill>
+          </a:ln>
+        </p:spPr>
+        <p:style>
+          <a:lnRef idx="1">
+            <a:schemeClr val="accent1"/>
+          </a:lnRef>
+          <a:fillRef idx="0">
+            <a:schemeClr val="accent1"/>
+          </a:fillRef>
+          <a:effectRef idx="0">
+            <a:schemeClr val="accent1"/>
+          </a:effectRef>
+          <a:fontRef idx="minor">
+            <a:schemeClr val="tx1"/>
+          </a:fontRef>
+        </p:style>
+      </p:cxnSp>
+      <p:cxnSp>
+        <p:nvCxnSpPr>
+          <p:cNvPr id="171" name="Straight Connector 170"/>
+          <p:cNvCxnSpPr/>
+          <p:nvPr/>
+        </p:nvCxnSpPr>
+        <p:spPr>
+          <a:xfrm>
+            <a:off x="7391400" y="1981200"/>
+            <a:ext cx="0" cy="533400"/>
+          </a:xfrm>
+          <a:prstGeom prst="line">
+            <a:avLst/>
+          </a:prstGeom>
+          <a:ln w="57150">
+            <a:solidFill>
+              <a:schemeClr val="tx1"/>
+            </a:solidFill>
+          </a:ln>
+        </p:spPr>
+        <p:style>
+          <a:lnRef idx="1">
+            <a:schemeClr val="accent1"/>
+          </a:lnRef>
+          <a:fillRef idx="0">
+            <a:schemeClr val="accent1"/>
+          </a:fillRef>
+          <a:effectRef idx="0">
+            <a:schemeClr val="accent1"/>
+          </a:effectRef>
+          <a:fontRef idx="minor">
+            <a:schemeClr val="tx1"/>
+          </a:fontRef>
+        </p:style>
+      </p:cxnSp>
+      <p:cxnSp>
+        <p:nvCxnSpPr>
+          <p:cNvPr id="174" name="Straight Connector 173"/>
+          <p:cNvCxnSpPr/>
+          <p:nvPr/>
+        </p:nvCxnSpPr>
+        <p:spPr>
+          <a:xfrm>
+            <a:off x="5334000" y="1295400"/>
+            <a:ext cx="2536094" cy="11876"/>
+          </a:xfrm>
+          <a:prstGeom prst="line">
+            <a:avLst/>
+          </a:prstGeom>
+          <a:ln w="57150">
+            <a:solidFill>
+              <a:srgbClr val="C00000"/>
+            </a:solidFill>
+          </a:ln>
+        </p:spPr>
+        <p:style>
+          <a:lnRef idx="1">
+            <a:schemeClr val="accent1"/>
+          </a:lnRef>
+          <a:fillRef idx="0">
+            <a:schemeClr val="accent1"/>
+          </a:fillRef>
+          <a:effectRef idx="0">
+            <a:schemeClr val="accent1"/>
+          </a:effectRef>
+          <a:fontRef idx="minor">
+            <a:schemeClr val="tx1"/>
+          </a:fontRef>
+        </p:style>
+      </p:cxnSp>
+      <p:sp>
+        <p:nvSpPr>
+          <p:cNvPr id="175" name="Rectangle 174"/>
+          <p:cNvSpPr/>
+          <p:nvPr/>
+        </p:nvSpPr>
+        <p:spPr>
+          <a:xfrm>
+            <a:off x="7782235" y="2514600"/>
+            <a:ext cx="142565" cy="152400"/>
+          </a:xfrm>
+          <a:prstGeom prst="rect">
+            <a:avLst/>
+          </a:prstGeom>
+          <a:solidFill>
+            <a:srgbClr val="C00000"/>
+          </a:solidFill>
+          <a:ln>
+            <a:solidFill>
+              <a:schemeClr val="tx1"/>
+            </a:solidFill>
+          </a:ln>
+        </p:spPr>
+        <p:style>
+          <a:lnRef idx="2">
+            <a:schemeClr val="accent1">
+              <a:shade val="50000"/>
+            </a:schemeClr>
+          </a:lnRef>
+          <a:fillRef idx="1">
+            <a:schemeClr val="accent1"/>
+          </a:fillRef>
+          <a:effectRef idx="0">
+            <a:schemeClr val="accent1"/>
+          </a:effectRef>
+          <a:fontRef idx="minor">
+            <a:schemeClr val="lt1"/>
+          </a:fontRef>
+        </p:style>
+        <p:txBody>
+          <a:bodyPr rtlCol="0" anchor="ctr"/>
+          <a:lstStyle/>
+          <a:p>
+            <a:pPr algn="ctr"/>
+            <a:endParaRPr lang="en-US"/>
+          </a:p>
+        </p:txBody>
+      </p:sp>
+      <p:cxnSp>
+        <p:nvCxnSpPr>
+          <p:cNvPr id="176" name="Straight Connector 175"/>
+          <p:cNvCxnSpPr/>
+          <p:nvPr/>
+        </p:nvCxnSpPr>
+        <p:spPr>
+          <a:xfrm>
+            <a:off x="7847802" y="2667000"/>
+            <a:ext cx="4917" cy="457200"/>
+          </a:xfrm>
+          <a:prstGeom prst="line">
+            <a:avLst/>
+          </a:prstGeom>
+          <a:ln w="57150">
+            <a:solidFill>
+              <a:srgbClr val="C00000"/>
+            </a:solidFill>
+          </a:ln>
+        </p:spPr>
+        <p:style>
+          <a:lnRef idx="1">
+            <a:schemeClr val="accent1"/>
+          </a:lnRef>
+          <a:fillRef idx="0">
+            <a:schemeClr val="accent1"/>
+          </a:fillRef>
+          <a:effectRef idx="0">
+            <a:schemeClr val="accent1"/>
+          </a:effectRef>
+          <a:fontRef idx="minor">
+            <a:schemeClr val="tx1"/>
+          </a:fontRef>
+        </p:style>
+      </p:cxnSp>
+      <p:sp>
+        <p:nvSpPr>
+          <p:cNvPr id="177" name="Rectangle 176"/>
+          <p:cNvSpPr/>
+          <p:nvPr/>
+        </p:nvSpPr>
+        <p:spPr>
+          <a:xfrm>
+            <a:off x="6248400" y="1231076"/>
+            <a:ext cx="142565" cy="152400"/>
+          </a:xfrm>
+          <a:prstGeom prst="rect">
+            <a:avLst/>
+          </a:prstGeom>
+          <a:solidFill>
+            <a:srgbClr val="C00000"/>
+          </a:solidFill>
+          <a:ln>
+            <a:solidFill>
+              <a:schemeClr val="tx1"/>
+            </a:solidFill>
+          </a:ln>
+        </p:spPr>
+        <p:style>
+          <a:lnRef idx="2">
+            <a:schemeClr val="accent1">
+              <a:shade val="50000"/>
+            </a:schemeClr>
+          </a:lnRef>
+          <a:fillRef idx="1">
+            <a:schemeClr val="accent1"/>
+          </a:fillRef>
+          <a:effectRef idx="0">
+            <a:schemeClr val="accent1"/>
+          </a:effectRef>
+          <a:fontRef idx="minor">
+            <a:schemeClr val="lt1"/>
+          </a:fontRef>
+        </p:style>
+        <p:txBody>
+          <a:bodyPr rtlCol="0" anchor="ctr"/>
+          <a:lstStyle/>
+          <a:p>
+            <a:pPr algn="ctr"/>
+            <a:endParaRPr lang="en-US"/>
+          </a:p>
+        </p:txBody>
+      </p:sp>
+      <p:cxnSp>
+        <p:nvCxnSpPr>
+          <p:cNvPr id="178" name="Straight Connector 177"/>
+          <p:cNvCxnSpPr/>
+          <p:nvPr/>
+        </p:nvCxnSpPr>
+        <p:spPr>
+          <a:xfrm>
+            <a:off x="7848600" y="1295400"/>
+            <a:ext cx="0" cy="1219200"/>
+          </a:xfrm>
+          <a:prstGeom prst="line">
+            <a:avLst/>
+          </a:prstGeom>
+          <a:ln w="57150">
+            <a:solidFill>
+              <a:srgbClr val="C00000"/>
             </a:solidFill>
           </a:ln>
         </p:spPr>

</xml_diff>